<commit_message>
Changes to plot titles, did some comparisons only over pearl, deleted images, etc
</commit_message>
<xml_diff>
--- a/Midterm Presentation.pptx
+++ b/Midterm Presentation.pptx
@@ -5,13 +5,24 @@
     <p:sldMasterId id="2147483696" r:id="rId1"/>
   </p:sldMasterIdLst>
   <p:notesMasterIdLst>
-    <p:notesMasterId r:id="rId6"/>
+    <p:notesMasterId r:id="rId17"/>
   </p:notesMasterIdLst>
   <p:sldIdLst>
     <p:sldId id="256" r:id="rId2"/>
     <p:sldId id="257" r:id="rId3"/>
     <p:sldId id="259" r:id="rId4"/>
-    <p:sldId id="258" r:id="rId5"/>
+    <p:sldId id="260" r:id="rId5"/>
+    <p:sldId id="263" r:id="rId6"/>
+    <p:sldId id="261" r:id="rId7"/>
+    <p:sldId id="264" r:id="rId8"/>
+    <p:sldId id="262" r:id="rId9"/>
+    <p:sldId id="258" r:id="rId10"/>
+    <p:sldId id="265" r:id="rId11"/>
+    <p:sldId id="266" r:id="rId12"/>
+    <p:sldId id="267" r:id="rId13"/>
+    <p:sldId id="268" r:id="rId14"/>
+    <p:sldId id="269" r:id="rId15"/>
+    <p:sldId id="270" r:id="rId16"/>
   </p:sldIdLst>
   <p:sldSz cx="12192000" cy="6858000"/>
   <p:notesSz cx="6858000" cy="9144000"/>
@@ -110,13 +121,18 @@
       </a:defRPr>
     </a:lvl9pPr>
   </p:defaultTextStyle>
+  <p:extLst>
+    <p:ext uri="{EFAFB233-063F-42B5-8137-9DF3F51BA10A}">
+      <p15:sldGuideLst xmlns:p15="http://schemas.microsoft.com/office/powerpoint/2012/main"/>
+    </p:ext>
+  </p:extLst>
 </p:presentation>
 </file>
 
 <file path=ppt/revisionInfo.xml><?xml version="1.0" encoding="utf-8"?>
 <p1510:revInfo xmlns:a="http://schemas.openxmlformats.org/drawingml/2006/main" xmlns:r="http://schemas.openxmlformats.org/officeDocument/2006/relationships" xmlns:p1510="http://schemas.microsoft.com/office/powerpoint/2015/10/main">
   <p1510:revLst>
-    <p1510:client id="{2C357A54-8BD3-45C1-896A-A820E7B30042}" v="4" dt="2025-06-24T23:52:50.010"/>
+    <p1510:client id="{2C357A54-8BD3-45C1-896A-A820E7B30042}" v="94" dt="2025-06-25T22:23:44.843"/>
   </p1510:revLst>
 </p1510:revInfo>
 </file>
@@ -125,8 +141,8 @@
 <pc:chgInfo xmlns:a="http://schemas.openxmlformats.org/drawingml/2006/main" xmlns:r="http://schemas.openxmlformats.org/officeDocument/2006/relationships" xmlns:ac="http://schemas.microsoft.com/office/drawing/2013/main/command" xmlns:pc="http://schemas.microsoft.com/office/powerpoint/2013/main/command">
   <pc:docChgLst>
     <pc:chgData name="Sallam Saka" userId="f204d973-d51e-47d8-884c-bdcba18d93b4" providerId="ADAL" clId="{2C357A54-8BD3-45C1-896A-A820E7B30042}"/>
-    <pc:docChg chg="undo custSel addSld delSld modSld">
-      <pc:chgData name="Sallam Saka" userId="f204d973-d51e-47d8-884c-bdcba18d93b4" providerId="ADAL" clId="{2C357A54-8BD3-45C1-896A-A820E7B30042}" dt="2025-06-25T00:35:31.231" v="3017" actId="20577"/>
+    <pc:docChg chg="undo redo custSel addSld delSld modSld">
+      <pc:chgData name="Sallam Saka" userId="f204d973-d51e-47d8-884c-bdcba18d93b4" providerId="ADAL" clId="{2C357A54-8BD3-45C1-896A-A820E7B30042}" dt="2025-06-25T22:30:31.620" v="6794" actId="20577"/>
       <pc:docMkLst>
         <pc:docMk/>
       </pc:docMkLst>
@@ -192,7 +208,7 @@
         </pc:spChg>
       </pc:sldChg>
       <pc:sldChg chg="modSp new mod modNotesTx">
-        <pc:chgData name="Sallam Saka" userId="f204d973-d51e-47d8-884c-bdcba18d93b4" providerId="ADAL" clId="{2C357A54-8BD3-45C1-896A-A820E7B30042}" dt="2025-06-24T23:45:01.624" v="941" actId="20577"/>
+        <pc:chgData name="Sallam Saka" userId="f204d973-d51e-47d8-884c-bdcba18d93b4" providerId="ADAL" clId="{2C357A54-8BD3-45C1-896A-A820E7B30042}" dt="2025-06-25T15:12:08.170" v="3268" actId="20577"/>
         <pc:sldMkLst>
           <pc:docMk/>
           <pc:sldMk cId="3785794011" sldId="258"/>
@@ -205,9 +221,17 @@
             <ac:spMk id="2" creationId="{228F138A-B317-6587-5172-0DFDDFB41F5C}"/>
           </ac:spMkLst>
         </pc:spChg>
+        <pc:spChg chg="mod">
+          <ac:chgData name="Sallam Saka" userId="f204d973-d51e-47d8-884c-bdcba18d93b4" providerId="ADAL" clId="{2C357A54-8BD3-45C1-896A-A820E7B30042}" dt="2025-06-25T15:10:55.853" v="3129" actId="20577"/>
+          <ac:spMkLst>
+            <pc:docMk/>
+            <pc:sldMk cId="3785794011" sldId="258"/>
+            <ac:spMk id="3" creationId="{98C48321-60F6-D765-157A-57E04F264760}"/>
+          </ac:spMkLst>
+        </pc:spChg>
       </pc:sldChg>
       <pc:sldChg chg="modSp new mod modNotesTx">
-        <pc:chgData name="Sallam Saka" userId="f204d973-d51e-47d8-884c-bdcba18d93b4" providerId="ADAL" clId="{2C357A54-8BD3-45C1-896A-A820E7B30042}" dt="2025-06-25T00:35:06.710" v="2959" actId="20577"/>
+        <pc:chgData name="Sallam Saka" userId="f204d973-d51e-47d8-884c-bdcba18d93b4" providerId="ADAL" clId="{2C357A54-8BD3-45C1-896A-A820E7B30042}" dt="2025-06-25T15:19:24.504" v="3650" actId="20577"/>
         <pc:sldMkLst>
           <pc:docMk/>
           <pc:sldMk cId="326719808" sldId="259"/>
@@ -226,6 +250,619 @@
             <pc:docMk/>
             <pc:sldMk cId="326719808" sldId="259"/>
             <ac:spMk id="3" creationId="{83D43D85-A5FA-277E-0DEE-2D0D16A57C8E}"/>
+          </ac:spMkLst>
+        </pc:spChg>
+      </pc:sldChg>
+      <pc:sldChg chg="addSp delSp modSp new mod modNotesTx">
+        <pc:chgData name="Sallam Saka" userId="f204d973-d51e-47d8-884c-bdcba18d93b4" providerId="ADAL" clId="{2C357A54-8BD3-45C1-896A-A820E7B30042}" dt="2025-06-25T16:40:02.675" v="4892" actId="6549"/>
+        <pc:sldMkLst>
+          <pc:docMk/>
+          <pc:sldMk cId="3115839712" sldId="260"/>
+        </pc:sldMkLst>
+        <pc:spChg chg="mod">
+          <ac:chgData name="Sallam Saka" userId="f204d973-d51e-47d8-884c-bdcba18d93b4" providerId="ADAL" clId="{2C357A54-8BD3-45C1-896A-A820E7B30042}" dt="2025-06-25T15:12:18.286" v="3276" actId="20577"/>
+          <ac:spMkLst>
+            <pc:docMk/>
+            <pc:sldMk cId="3115839712" sldId="260"/>
+            <ac:spMk id="2" creationId="{A10AF237-F5FA-D561-A35E-D9602B2E504C}"/>
+          </ac:spMkLst>
+        </pc:spChg>
+        <pc:spChg chg="mod">
+          <ac:chgData name="Sallam Saka" userId="f204d973-d51e-47d8-884c-bdcba18d93b4" providerId="ADAL" clId="{2C357A54-8BD3-45C1-896A-A820E7B30042}" dt="2025-06-25T16:39:32.675" v="4887" actId="21"/>
+          <ac:spMkLst>
+            <pc:docMk/>
+            <pc:sldMk cId="3115839712" sldId="260"/>
+            <ac:spMk id="3" creationId="{C98573D0-F533-77A5-F747-9017C082053A}"/>
+          </ac:spMkLst>
+        </pc:spChg>
+        <pc:spChg chg="add mod">
+          <ac:chgData name="Sallam Saka" userId="f204d973-d51e-47d8-884c-bdcba18d93b4" providerId="ADAL" clId="{2C357A54-8BD3-45C1-896A-A820E7B30042}" dt="2025-06-25T15:34:47.628" v="3811"/>
+          <ac:spMkLst>
+            <pc:docMk/>
+            <pc:sldMk cId="3115839712" sldId="260"/>
+            <ac:spMk id="4" creationId="{9CBAC6E6-01D0-E740-EF33-C6CDF4EFD614}"/>
+          </ac:spMkLst>
+        </pc:spChg>
+        <pc:spChg chg="add mod">
+          <ac:chgData name="Sallam Saka" userId="f204d973-d51e-47d8-884c-bdcba18d93b4" providerId="ADAL" clId="{2C357A54-8BD3-45C1-896A-A820E7B30042}" dt="2025-06-25T16:40:02.675" v="4892" actId="6549"/>
+          <ac:spMkLst>
+            <pc:docMk/>
+            <pc:sldMk cId="3115839712" sldId="260"/>
+            <ac:spMk id="5" creationId="{DFDD764A-EDD7-ACBB-21CA-873C557B1452}"/>
+          </ac:spMkLst>
+        </pc:spChg>
+        <pc:picChg chg="add del">
+          <ac:chgData name="Sallam Saka" userId="f204d973-d51e-47d8-884c-bdcba18d93b4" providerId="ADAL" clId="{2C357A54-8BD3-45C1-896A-A820E7B30042}" dt="2025-06-25T16:00:23.473" v="3922" actId="22"/>
+          <ac:picMkLst>
+            <pc:docMk/>
+            <pc:sldMk cId="3115839712" sldId="260"/>
+            <ac:picMk id="7" creationId="{273D485A-77A1-8ED9-D55F-39597244BAFD}"/>
+          </ac:picMkLst>
+        </pc:picChg>
+        <pc:picChg chg="add del">
+          <ac:chgData name="Sallam Saka" userId="f204d973-d51e-47d8-884c-bdcba18d93b4" providerId="ADAL" clId="{2C357A54-8BD3-45C1-896A-A820E7B30042}" dt="2025-06-25T16:00:26.498" v="3924" actId="22"/>
+          <ac:picMkLst>
+            <pc:docMk/>
+            <pc:sldMk cId="3115839712" sldId="260"/>
+            <ac:picMk id="9" creationId="{0A4BFFF6-33A2-AF20-74DD-1A01D6E135E8}"/>
+          </ac:picMkLst>
+        </pc:picChg>
+        <pc:picChg chg="add del mod">
+          <ac:chgData name="Sallam Saka" userId="f204d973-d51e-47d8-884c-bdcba18d93b4" providerId="ADAL" clId="{2C357A54-8BD3-45C1-896A-A820E7B30042}" dt="2025-06-25T15:49:38.184" v="3920" actId="21"/>
+          <ac:picMkLst>
+            <pc:docMk/>
+            <pc:sldMk cId="3115839712" sldId="260"/>
+            <ac:picMk id="1026" creationId="{FEE58B97-2451-D6CD-4C0D-94AF709C9BA3}"/>
+          </ac:picMkLst>
+        </pc:picChg>
+      </pc:sldChg>
+      <pc:sldChg chg="addSp delSp modSp new mod modNotesTx">
+        <pc:chgData name="Sallam Saka" userId="f204d973-d51e-47d8-884c-bdcba18d93b4" providerId="ADAL" clId="{2C357A54-8BD3-45C1-896A-A820E7B30042}" dt="2025-06-25T18:21:17.691" v="5331" actId="20577"/>
+        <pc:sldMkLst>
+          <pc:docMk/>
+          <pc:sldMk cId="1698663498" sldId="261"/>
+        </pc:sldMkLst>
+        <pc:spChg chg="mod">
+          <ac:chgData name="Sallam Saka" userId="f204d973-d51e-47d8-884c-bdcba18d93b4" providerId="ADAL" clId="{2C357A54-8BD3-45C1-896A-A820E7B30042}" dt="2025-06-25T15:12:24.250" v="3283" actId="20577"/>
+          <ac:spMkLst>
+            <pc:docMk/>
+            <pc:sldMk cId="1698663498" sldId="261"/>
+            <ac:spMk id="2" creationId="{1AAD20B9-82AF-74D4-AEEC-8835A41FE362}"/>
+          </ac:spMkLst>
+        </pc:spChg>
+        <pc:spChg chg="mod">
+          <ac:chgData name="Sallam Saka" userId="f204d973-d51e-47d8-884c-bdcba18d93b4" providerId="ADAL" clId="{2C357A54-8BD3-45C1-896A-A820E7B30042}" dt="2025-06-25T18:21:07.327" v="5325" actId="20577"/>
+          <ac:spMkLst>
+            <pc:docMk/>
+            <pc:sldMk cId="1698663498" sldId="261"/>
+            <ac:spMk id="3" creationId="{127DF538-3A2C-6D79-A95B-94A8B89BF874}"/>
+          </ac:spMkLst>
+        </pc:spChg>
+        <pc:spChg chg="add mod">
+          <ac:chgData name="Sallam Saka" userId="f204d973-d51e-47d8-884c-bdcba18d93b4" providerId="ADAL" clId="{2C357A54-8BD3-45C1-896A-A820E7B30042}" dt="2025-06-25T16:34:48.042" v="4877"/>
+          <ac:spMkLst>
+            <pc:docMk/>
+            <pc:sldMk cId="1698663498" sldId="261"/>
+            <ac:spMk id="4" creationId="{6F358CD9-055D-C8EE-C816-91D4BEDB5D3B}"/>
+          </ac:spMkLst>
+        </pc:spChg>
+        <pc:spChg chg="add mod">
+          <ac:chgData name="Sallam Saka" userId="f204d973-d51e-47d8-884c-bdcba18d93b4" providerId="ADAL" clId="{2C357A54-8BD3-45C1-896A-A820E7B30042}" dt="2025-06-25T16:34:52.703" v="4880"/>
+          <ac:spMkLst>
+            <pc:docMk/>
+            <pc:sldMk cId="1698663498" sldId="261"/>
+            <ac:spMk id="5" creationId="{8545D35E-D8BD-FE00-69A3-50E3EFCDBBD8}"/>
+          </ac:spMkLst>
+        </pc:spChg>
+        <pc:spChg chg="add del">
+          <ac:chgData name="Sallam Saka" userId="f204d973-d51e-47d8-884c-bdcba18d93b4" providerId="ADAL" clId="{2C357A54-8BD3-45C1-896A-A820E7B30042}" dt="2025-06-25T16:39:06.162" v="4884" actId="22"/>
+          <ac:spMkLst>
+            <pc:docMk/>
+            <pc:sldMk cId="1698663498" sldId="261"/>
+            <ac:spMk id="7" creationId="{7AD9EDC9-A9E2-E95F-9850-2D436EA3540A}"/>
+          </ac:spMkLst>
+        </pc:spChg>
+        <pc:spChg chg="add mod">
+          <ac:chgData name="Sallam Saka" userId="f204d973-d51e-47d8-884c-bdcba18d93b4" providerId="ADAL" clId="{2C357A54-8BD3-45C1-896A-A820E7B30042}" dt="2025-06-25T17:15:27.632" v="5307" actId="20577"/>
+          <ac:spMkLst>
+            <pc:docMk/>
+            <pc:sldMk cId="1698663498" sldId="261"/>
+            <ac:spMk id="8" creationId="{19DEF9B9-1BB5-DCDB-1CB4-24979F5354BC}"/>
+          </ac:spMkLst>
+        </pc:spChg>
+      </pc:sldChg>
+      <pc:sldChg chg="addSp modSp new mod">
+        <pc:chgData name="Sallam Saka" userId="f204d973-d51e-47d8-884c-bdcba18d93b4" providerId="ADAL" clId="{2C357A54-8BD3-45C1-896A-A820E7B30042}" dt="2025-06-25T18:42:02.377" v="5646" actId="20577"/>
+        <pc:sldMkLst>
+          <pc:docMk/>
+          <pc:sldMk cId="1720524664" sldId="262"/>
+        </pc:sldMkLst>
+        <pc:spChg chg="mod">
+          <ac:chgData name="Sallam Saka" userId="f204d973-d51e-47d8-884c-bdcba18d93b4" providerId="ADAL" clId="{2C357A54-8BD3-45C1-896A-A820E7B30042}" dt="2025-06-25T15:12:30.886" v="3294" actId="20577"/>
+          <ac:spMkLst>
+            <pc:docMk/>
+            <pc:sldMk cId="1720524664" sldId="262"/>
+            <ac:spMk id="2" creationId="{4E1D867A-3907-26F3-B77B-2E6213623970}"/>
+          </ac:spMkLst>
+        </pc:spChg>
+        <pc:spChg chg="mod">
+          <ac:chgData name="Sallam Saka" userId="f204d973-d51e-47d8-884c-bdcba18d93b4" providerId="ADAL" clId="{2C357A54-8BD3-45C1-896A-A820E7B30042}" dt="2025-06-25T18:42:02.377" v="5646" actId="20577"/>
+          <ac:spMkLst>
+            <pc:docMk/>
+            <pc:sldMk cId="1720524664" sldId="262"/>
+            <ac:spMk id="3" creationId="{EBD5F899-0003-11DD-8D27-1542F1D54871}"/>
+          </ac:spMkLst>
+        </pc:spChg>
+        <pc:spChg chg="add mod">
+          <ac:chgData name="Sallam Saka" userId="f204d973-d51e-47d8-884c-bdcba18d93b4" providerId="ADAL" clId="{2C357A54-8BD3-45C1-896A-A820E7B30042}" dt="2025-06-25T18:36:48.284" v="5482" actId="20577"/>
+          <ac:spMkLst>
+            <pc:docMk/>
+            <pc:sldMk cId="1720524664" sldId="262"/>
+            <ac:spMk id="4" creationId="{6F5125E3-CA90-5995-4C23-D4F6B9782029}"/>
+          </ac:spMkLst>
+        </pc:spChg>
+      </pc:sldChg>
+      <pc:sldChg chg="addSp delSp modSp new mod modNotesTx">
+        <pc:chgData name="Sallam Saka" userId="f204d973-d51e-47d8-884c-bdcba18d93b4" providerId="ADAL" clId="{2C357A54-8BD3-45C1-896A-A820E7B30042}" dt="2025-06-25T16:49:45.598" v="4947" actId="20577"/>
+        <pc:sldMkLst>
+          <pc:docMk/>
+          <pc:sldMk cId="1802762808" sldId="263"/>
+        </pc:sldMkLst>
+        <pc:spChg chg="mod">
+          <ac:chgData name="Sallam Saka" userId="f204d973-d51e-47d8-884c-bdcba18d93b4" providerId="ADAL" clId="{2C357A54-8BD3-45C1-896A-A820E7B30042}" dt="2025-06-25T16:49:45.598" v="4947" actId="20577"/>
+          <ac:spMkLst>
+            <pc:docMk/>
+            <pc:sldMk cId="1802762808" sldId="263"/>
+            <ac:spMk id="2" creationId="{0AB5D44B-E76F-8C50-8F71-67FA4C8EC1FD}"/>
+          </ac:spMkLst>
+        </pc:spChg>
+        <pc:spChg chg="del">
+          <ac:chgData name="Sallam Saka" userId="f204d973-d51e-47d8-884c-bdcba18d93b4" providerId="ADAL" clId="{2C357A54-8BD3-45C1-896A-A820E7B30042}" dt="2025-06-25T16:00:29.898" v="3926" actId="22"/>
+          <ac:spMkLst>
+            <pc:docMk/>
+            <pc:sldMk cId="1802762808" sldId="263"/>
+            <ac:spMk id="3" creationId="{C2305095-3023-06C2-1800-82A37DB46FB8}"/>
+          </ac:spMkLst>
+        </pc:spChg>
+        <pc:picChg chg="add mod ord">
+          <ac:chgData name="Sallam Saka" userId="f204d973-d51e-47d8-884c-bdcba18d93b4" providerId="ADAL" clId="{2C357A54-8BD3-45C1-896A-A820E7B30042}" dt="2025-06-25T16:00:29.898" v="3926" actId="22"/>
+          <ac:picMkLst>
+            <pc:docMk/>
+            <pc:sldMk cId="1802762808" sldId="263"/>
+            <ac:picMk id="5" creationId="{5093AC52-076A-19B3-548B-24FB5D266B1C}"/>
+          </ac:picMkLst>
+        </pc:picChg>
+      </pc:sldChg>
+      <pc:sldChg chg="addSp delSp modSp new mod">
+        <pc:chgData name="Sallam Saka" userId="f204d973-d51e-47d8-884c-bdcba18d93b4" providerId="ADAL" clId="{2C357A54-8BD3-45C1-896A-A820E7B30042}" dt="2025-06-25T16:49:40.555" v="4939" actId="20577"/>
+        <pc:sldMkLst>
+          <pc:docMk/>
+          <pc:sldMk cId="3022207675" sldId="264"/>
+        </pc:sldMkLst>
+        <pc:spChg chg="mod">
+          <ac:chgData name="Sallam Saka" userId="f204d973-d51e-47d8-884c-bdcba18d93b4" providerId="ADAL" clId="{2C357A54-8BD3-45C1-896A-A820E7B30042}" dt="2025-06-25T16:49:40.555" v="4939" actId="20577"/>
+          <ac:spMkLst>
+            <pc:docMk/>
+            <pc:sldMk cId="3022207675" sldId="264"/>
+            <ac:spMk id="2" creationId="{7FF0FC23-4914-3EA5-8765-713C6EE3180A}"/>
+          </ac:spMkLst>
+        </pc:spChg>
+        <pc:spChg chg="add del">
+          <ac:chgData name="Sallam Saka" userId="f204d973-d51e-47d8-884c-bdcba18d93b4" providerId="ADAL" clId="{2C357A54-8BD3-45C1-896A-A820E7B30042}" dt="2025-06-25T16:49:27.653" v="4912" actId="22"/>
+          <ac:spMkLst>
+            <pc:docMk/>
+            <pc:sldMk cId="3022207675" sldId="264"/>
+            <ac:spMk id="3" creationId="{A5B01D6A-BEDA-0AE7-F0CB-0A94451621DC}"/>
+          </ac:spMkLst>
+        </pc:spChg>
+        <pc:picChg chg="add del mod ord">
+          <ac:chgData name="Sallam Saka" userId="f204d973-d51e-47d8-884c-bdcba18d93b4" providerId="ADAL" clId="{2C357A54-8BD3-45C1-896A-A820E7B30042}" dt="2025-06-25T16:48:32.043" v="4899" actId="22"/>
+          <ac:picMkLst>
+            <pc:docMk/>
+            <pc:sldMk cId="3022207675" sldId="264"/>
+            <ac:picMk id="5" creationId="{1EB882AE-7698-C5D6-4618-790BC01E3DC9}"/>
+          </ac:picMkLst>
+        </pc:picChg>
+        <pc:picChg chg="add del mod ord">
+          <ac:chgData name="Sallam Saka" userId="f204d973-d51e-47d8-884c-bdcba18d93b4" providerId="ADAL" clId="{2C357A54-8BD3-45C1-896A-A820E7B30042}" dt="2025-06-25T16:49:06.399" v="4911" actId="22"/>
+          <ac:picMkLst>
+            <pc:docMk/>
+            <pc:sldMk cId="3022207675" sldId="264"/>
+            <ac:picMk id="7" creationId="{4CFA1426-CBD5-C6B6-281D-F32F48CEAD4B}"/>
+          </ac:picMkLst>
+        </pc:picChg>
+        <pc:picChg chg="add mod ord">
+          <ac:chgData name="Sallam Saka" userId="f204d973-d51e-47d8-884c-bdcba18d93b4" providerId="ADAL" clId="{2C357A54-8BD3-45C1-896A-A820E7B30042}" dt="2025-06-25T16:49:27.653" v="4912" actId="22"/>
+          <ac:picMkLst>
+            <pc:docMk/>
+            <pc:sldMk cId="3022207675" sldId="264"/>
+            <ac:picMk id="9" creationId="{58A53F7E-36DE-6D3E-9C02-3E148F2EFD41}"/>
+          </ac:picMkLst>
+        </pc:picChg>
+      </pc:sldChg>
+      <pc:sldChg chg="addSp delSp modSp new mod setBg modNotesTx">
+        <pc:chgData name="Sallam Saka" userId="f204d973-d51e-47d8-884c-bdcba18d93b4" providerId="ADAL" clId="{2C357A54-8BD3-45C1-896A-A820E7B30042}" dt="2025-06-25T22:24:16.435" v="6766" actId="255"/>
+        <pc:sldMkLst>
+          <pc:docMk/>
+          <pc:sldMk cId="787353098" sldId="265"/>
+        </pc:sldMkLst>
+        <pc:spChg chg="del mod ord">
+          <ac:chgData name="Sallam Saka" userId="f204d973-d51e-47d8-884c-bdcba18d93b4" providerId="ADAL" clId="{2C357A54-8BD3-45C1-896A-A820E7B30042}" dt="2025-06-25T18:49:11.725" v="5653" actId="478"/>
+          <ac:spMkLst>
+            <pc:docMk/>
+            <pc:sldMk cId="787353098" sldId="265"/>
+            <ac:spMk id="2" creationId="{B482808D-EF07-96BF-B35D-07304F648A52}"/>
+          </ac:spMkLst>
+        </pc:spChg>
+        <pc:spChg chg="del">
+          <ac:chgData name="Sallam Saka" userId="f204d973-d51e-47d8-884c-bdcba18d93b4" providerId="ADAL" clId="{2C357A54-8BD3-45C1-896A-A820E7B30042}" dt="2025-06-25T18:48:41.843" v="5648" actId="22"/>
+          <ac:spMkLst>
+            <pc:docMk/>
+            <pc:sldMk cId="787353098" sldId="265"/>
+            <ac:spMk id="3" creationId="{33973D1F-4445-9163-B92D-5F0A1CCABB83}"/>
+          </ac:spMkLst>
+        </pc:spChg>
+        <pc:spChg chg="add del">
+          <ac:chgData name="Sallam Saka" userId="f204d973-d51e-47d8-884c-bdcba18d93b4" providerId="ADAL" clId="{2C357A54-8BD3-45C1-896A-A820E7B30042}" dt="2025-06-25T18:53:16.486" v="5657" actId="931"/>
+          <ac:spMkLst>
+            <pc:docMk/>
+            <pc:sldMk cId="787353098" sldId="265"/>
+            <ac:spMk id="9" creationId="{A2A07205-0626-578A-953B-72A7859B3A04}"/>
+          </ac:spMkLst>
+        </pc:spChg>
+        <pc:spChg chg="add del mod">
+          <ac:chgData name="Sallam Saka" userId="f204d973-d51e-47d8-884c-bdcba18d93b4" providerId="ADAL" clId="{2C357A54-8BD3-45C1-896A-A820E7B30042}" dt="2025-06-25T19:02:33.323" v="5668" actId="478"/>
+          <ac:spMkLst>
+            <pc:docMk/>
+            <pc:sldMk cId="787353098" sldId="265"/>
+            <ac:spMk id="12" creationId="{4A5C94A2-65DD-27B0-2BC6-9F10A6663C56}"/>
+          </ac:spMkLst>
+        </pc:spChg>
+        <pc:spChg chg="add mod">
+          <ac:chgData name="Sallam Saka" userId="f204d973-d51e-47d8-884c-bdcba18d93b4" providerId="ADAL" clId="{2C357A54-8BD3-45C1-896A-A820E7B30042}" dt="2025-06-25T19:07:19.073" v="5851" actId="1076"/>
+          <ac:spMkLst>
+            <pc:docMk/>
+            <pc:sldMk cId="787353098" sldId="265"/>
+            <ac:spMk id="17" creationId="{BCEDE207-2D29-3BA0-8137-E728DEB0B53F}"/>
+          </ac:spMkLst>
+        </pc:spChg>
+        <pc:spChg chg="add mod">
+          <ac:chgData name="Sallam Saka" userId="f204d973-d51e-47d8-884c-bdcba18d93b4" providerId="ADAL" clId="{2C357A54-8BD3-45C1-896A-A820E7B30042}" dt="2025-06-25T19:04:24.374" v="5746"/>
+          <ac:spMkLst>
+            <pc:docMk/>
+            <pc:sldMk cId="787353098" sldId="265"/>
+            <ac:spMk id="18" creationId="{9B35AA09-F6BE-E195-C359-5AD11520CFB8}"/>
+          </ac:spMkLst>
+        </pc:spChg>
+        <pc:spChg chg="add mod">
+          <ac:chgData name="Sallam Saka" userId="f204d973-d51e-47d8-884c-bdcba18d93b4" providerId="ADAL" clId="{2C357A54-8BD3-45C1-896A-A820E7B30042}" dt="2025-06-25T19:04:27.370" v="5751"/>
+          <ac:spMkLst>
+            <pc:docMk/>
+            <pc:sldMk cId="787353098" sldId="265"/>
+            <ac:spMk id="19" creationId="{735C3FCD-CA8C-F630-4934-32FC01976C8C}"/>
+          </ac:spMkLst>
+        </pc:spChg>
+        <pc:spChg chg="add mod">
+          <ac:chgData name="Sallam Saka" userId="f204d973-d51e-47d8-884c-bdcba18d93b4" providerId="ADAL" clId="{2C357A54-8BD3-45C1-896A-A820E7B30042}" dt="2025-06-25T22:24:16.435" v="6766" actId="255"/>
+          <ac:spMkLst>
+            <pc:docMk/>
+            <pc:sldMk cId="787353098" sldId="265"/>
+            <ac:spMk id="20" creationId="{ADA9F779-9C45-C0C7-3740-B7ADB7A824FF}"/>
+          </ac:spMkLst>
+        </pc:spChg>
+        <pc:picChg chg="add del mod ord modCrop">
+          <ac:chgData name="Sallam Saka" userId="f204d973-d51e-47d8-884c-bdcba18d93b4" providerId="ADAL" clId="{2C357A54-8BD3-45C1-896A-A820E7B30042}" dt="2025-06-25T18:57:18.967" v="5661" actId="478"/>
+          <ac:picMkLst>
+            <pc:docMk/>
+            <pc:sldMk cId="787353098" sldId="265"/>
+            <ac:picMk id="5" creationId="{25BD9269-144C-6F5E-6F4A-15940ACFC49C}"/>
+          </ac:picMkLst>
+        </pc:picChg>
+        <pc:picChg chg="add del mod">
+          <ac:chgData name="Sallam Saka" userId="f204d973-d51e-47d8-884c-bdcba18d93b4" providerId="ADAL" clId="{2C357A54-8BD3-45C1-896A-A820E7B30042}" dt="2025-06-25T19:02:30.188" v="5667" actId="478"/>
+          <ac:picMkLst>
+            <pc:docMk/>
+            <pc:sldMk cId="787353098" sldId="265"/>
+            <ac:picMk id="7" creationId="{7744A196-0EA5-DFBE-A92F-D52835E2D468}"/>
+          </ac:picMkLst>
+        </pc:picChg>
+        <pc:picChg chg="add mod">
+          <ac:chgData name="Sallam Saka" userId="f204d973-d51e-47d8-884c-bdcba18d93b4" providerId="ADAL" clId="{2C357A54-8BD3-45C1-896A-A820E7B30042}" dt="2025-06-25T19:03:28.780" v="5680" actId="14100"/>
+          <ac:picMkLst>
+            <pc:docMk/>
+            <pc:sldMk cId="787353098" sldId="265"/>
+            <ac:picMk id="10" creationId="{AE605676-4273-BBEE-A5F9-B82B5EF126E7}"/>
+          </ac:picMkLst>
+        </pc:picChg>
+        <pc:picChg chg="add del mod">
+          <ac:chgData name="Sallam Saka" userId="f204d973-d51e-47d8-884c-bdcba18d93b4" providerId="ADAL" clId="{2C357A54-8BD3-45C1-896A-A820E7B30042}" dt="2025-06-25T19:02:41.879" v="5671" actId="478"/>
+          <ac:picMkLst>
+            <pc:docMk/>
+            <pc:sldMk cId="787353098" sldId="265"/>
+            <ac:picMk id="14" creationId="{9B64F075-149D-735E-E465-DA6ED1D1CE31}"/>
+          </ac:picMkLst>
+        </pc:picChg>
+        <pc:picChg chg="add mod">
+          <ac:chgData name="Sallam Saka" userId="f204d973-d51e-47d8-884c-bdcba18d93b4" providerId="ADAL" clId="{2C357A54-8BD3-45C1-896A-A820E7B30042}" dt="2025-06-25T19:03:31.275" v="5681" actId="14100"/>
+          <ac:picMkLst>
+            <pc:docMk/>
+            <pc:sldMk cId="787353098" sldId="265"/>
+            <ac:picMk id="16" creationId="{A71DB449-03FF-37B3-5371-ADC848A92267}"/>
+          </ac:picMkLst>
+        </pc:picChg>
+        <pc:inkChg chg="add del">
+          <ac:chgData name="Sallam Saka" userId="f204d973-d51e-47d8-884c-bdcba18d93b4" providerId="ADAL" clId="{2C357A54-8BD3-45C1-896A-A820E7B30042}" dt="2025-06-25T19:07:37.485" v="5855" actId="9405"/>
+          <ac:inkMkLst>
+            <pc:docMk/>
+            <pc:sldMk cId="787353098" sldId="265"/>
+            <ac:inkMk id="21" creationId="{42B1DDD8-0C54-0383-5B57-711B063611C1}"/>
+          </ac:inkMkLst>
+        </pc:inkChg>
+        <pc:inkChg chg="add">
+          <ac:chgData name="Sallam Saka" userId="f204d973-d51e-47d8-884c-bdcba18d93b4" providerId="ADAL" clId="{2C357A54-8BD3-45C1-896A-A820E7B30042}" dt="2025-06-25T19:07:34.362" v="5853"/>
+          <ac:inkMkLst>
+            <pc:docMk/>
+            <pc:sldMk cId="787353098" sldId="265"/>
+            <ac:inkMk id="22" creationId="{28ED67E4-3300-7E41-C769-4339EAE94D9F}"/>
+          </ac:inkMkLst>
+        </pc:inkChg>
+        <pc:cxnChg chg="add mod">
+          <ac:chgData name="Sallam Saka" userId="f204d973-d51e-47d8-884c-bdcba18d93b4" providerId="ADAL" clId="{2C357A54-8BD3-45C1-896A-A820E7B30042}" dt="2025-06-25T19:09:07.112" v="5864" actId="1038"/>
+          <ac:cxnSpMkLst>
+            <pc:docMk/>
+            <pc:sldMk cId="787353098" sldId="265"/>
+            <ac:cxnSpMk id="24" creationId="{F5CB48F1-5C12-993D-A3CA-B6EBE26FE468}"/>
+          </ac:cxnSpMkLst>
+        </pc:cxnChg>
+      </pc:sldChg>
+      <pc:sldChg chg="addSp delSp modSp new mod modNotesTx">
+        <pc:chgData name="Sallam Saka" userId="f204d973-d51e-47d8-884c-bdcba18d93b4" providerId="ADAL" clId="{2C357A54-8BD3-45C1-896A-A820E7B30042}" dt="2025-06-25T22:25:50.723" v="6780" actId="20577"/>
+        <pc:sldMkLst>
+          <pc:docMk/>
+          <pc:sldMk cId="2635246491" sldId="266"/>
+        </pc:sldMkLst>
+        <pc:spChg chg="del">
+          <ac:chgData name="Sallam Saka" userId="f204d973-d51e-47d8-884c-bdcba18d93b4" providerId="ADAL" clId="{2C357A54-8BD3-45C1-896A-A820E7B30042}" dt="2025-06-25T20:08:13.624" v="6533" actId="478"/>
+          <ac:spMkLst>
+            <pc:docMk/>
+            <pc:sldMk cId="2635246491" sldId="266"/>
+            <ac:spMk id="2" creationId="{F461ECDF-194F-0963-0946-85ADCF1C76A1}"/>
+          </ac:spMkLst>
+        </pc:spChg>
+        <pc:spChg chg="del">
+          <ac:chgData name="Sallam Saka" userId="f204d973-d51e-47d8-884c-bdcba18d93b4" providerId="ADAL" clId="{2C357A54-8BD3-45C1-896A-A820E7B30042}" dt="2025-06-25T20:08:11.624" v="6532" actId="478"/>
+          <ac:spMkLst>
+            <pc:docMk/>
+            <pc:sldMk cId="2635246491" sldId="266"/>
+            <ac:spMk id="3" creationId="{822CDA63-87CD-7E97-6EEB-609778187B02}"/>
+          </ac:spMkLst>
+        </pc:spChg>
+        <pc:spChg chg="add mod">
+          <ac:chgData name="Sallam Saka" userId="f204d973-d51e-47d8-884c-bdcba18d93b4" providerId="ADAL" clId="{2C357A54-8BD3-45C1-896A-A820E7B30042}" dt="2025-06-25T22:25:50.723" v="6780" actId="20577"/>
+          <ac:spMkLst>
+            <pc:docMk/>
+            <pc:sldMk cId="2635246491" sldId="266"/>
+            <ac:spMk id="12" creationId="{24C40DBC-A911-9BF3-6E80-0130B12C596F}"/>
+          </ac:spMkLst>
+        </pc:spChg>
+        <pc:grpChg chg="add mod">
+          <ac:chgData name="Sallam Saka" userId="f204d973-d51e-47d8-884c-bdcba18d93b4" providerId="ADAL" clId="{2C357A54-8BD3-45C1-896A-A820E7B30042}" dt="2025-06-25T22:00:17.150" v="6627" actId="1076"/>
+          <ac:grpSpMkLst>
+            <pc:docMk/>
+            <pc:sldMk cId="2635246491" sldId="266"/>
+            <ac:grpSpMk id="11" creationId="{FBBFF5EB-21CA-2963-A5C5-D876AD4464FA}"/>
+          </ac:grpSpMkLst>
+        </pc:grpChg>
+        <pc:picChg chg="add del">
+          <ac:chgData name="Sallam Saka" userId="f204d973-d51e-47d8-884c-bdcba18d93b4" providerId="ADAL" clId="{2C357A54-8BD3-45C1-896A-A820E7B30042}" dt="2025-06-25T19:28:42.283" v="6526" actId="22"/>
+          <ac:picMkLst>
+            <pc:docMk/>
+            <pc:sldMk cId="2635246491" sldId="266"/>
+            <ac:picMk id="5" creationId="{F9043ED7-2C7E-6135-6F5C-452599598E88}"/>
+          </ac:picMkLst>
+        </pc:picChg>
+        <pc:picChg chg="add mod ord modCrop">
+          <ac:chgData name="Sallam Saka" userId="f204d973-d51e-47d8-884c-bdcba18d93b4" providerId="ADAL" clId="{2C357A54-8BD3-45C1-896A-A820E7B30042}" dt="2025-06-25T20:14:10.022" v="6601" actId="164"/>
+          <ac:picMkLst>
+            <pc:docMk/>
+            <pc:sldMk cId="2635246491" sldId="266"/>
+            <ac:picMk id="7" creationId="{C027E1F7-9BE4-85B2-66CB-63B1C9A72DF9}"/>
+          </ac:picMkLst>
+        </pc:picChg>
+        <pc:picChg chg="add del mod modCrop">
+          <ac:chgData name="Sallam Saka" userId="f204d973-d51e-47d8-884c-bdcba18d93b4" providerId="ADAL" clId="{2C357A54-8BD3-45C1-896A-A820E7B30042}" dt="2025-06-25T20:13:24.460" v="6591" actId="478"/>
+          <ac:picMkLst>
+            <pc:docMk/>
+            <pc:sldMk cId="2635246491" sldId="266"/>
+            <ac:picMk id="9" creationId="{F3EFEA7D-315F-CB24-66C1-EB2ED860B7CC}"/>
+          </ac:picMkLst>
+        </pc:picChg>
+        <pc:picChg chg="add mod modCrop">
+          <ac:chgData name="Sallam Saka" userId="f204d973-d51e-47d8-884c-bdcba18d93b4" providerId="ADAL" clId="{2C357A54-8BD3-45C1-896A-A820E7B30042}" dt="2025-06-25T20:14:10.022" v="6601" actId="164"/>
+          <ac:picMkLst>
+            <pc:docMk/>
+            <pc:sldMk cId="2635246491" sldId="266"/>
+            <ac:picMk id="10" creationId="{F6D63B18-6C06-13E7-8576-7084473443C3}"/>
+          </ac:picMkLst>
+        </pc:picChg>
+      </pc:sldChg>
+      <pc:sldChg chg="new">
+        <pc:chgData name="Sallam Saka" userId="f204d973-d51e-47d8-884c-bdcba18d93b4" providerId="ADAL" clId="{2C357A54-8BD3-45C1-896A-A820E7B30042}" dt="2025-06-25T20:14:57.703" v="6616" actId="680"/>
+        <pc:sldMkLst>
+          <pc:docMk/>
+          <pc:sldMk cId="56333691" sldId="267"/>
+        </pc:sldMkLst>
+      </pc:sldChg>
+      <pc:sldChg chg="addSp delSp modSp new mod">
+        <pc:chgData name="Sallam Saka" userId="f204d973-d51e-47d8-884c-bdcba18d93b4" providerId="ADAL" clId="{2C357A54-8BD3-45C1-896A-A820E7B30042}" dt="2025-06-25T22:24:05.488" v="6765" actId="255"/>
+        <pc:sldMkLst>
+          <pc:docMk/>
+          <pc:sldMk cId="3182023264" sldId="268"/>
+        </pc:sldMkLst>
+        <pc:spChg chg="del mod">
+          <ac:chgData name="Sallam Saka" userId="f204d973-d51e-47d8-884c-bdcba18d93b4" providerId="ADAL" clId="{2C357A54-8BD3-45C1-896A-A820E7B30042}" dt="2025-06-25T22:20:00.452" v="6715" actId="478"/>
+          <ac:spMkLst>
+            <pc:docMk/>
+            <pc:sldMk cId="3182023264" sldId="268"/>
+            <ac:spMk id="2" creationId="{09BFAC75-54B1-7D01-E1C9-769EBB05C3D8}"/>
+          </ac:spMkLst>
+        </pc:spChg>
+        <pc:spChg chg="del">
+          <ac:chgData name="Sallam Saka" userId="f204d973-d51e-47d8-884c-bdcba18d93b4" providerId="ADAL" clId="{2C357A54-8BD3-45C1-896A-A820E7B30042}" dt="2025-06-25T22:10:15.696" v="6634" actId="478"/>
+          <ac:spMkLst>
+            <pc:docMk/>
+            <pc:sldMk cId="3182023264" sldId="268"/>
+            <ac:spMk id="3" creationId="{A4F26033-E61A-1039-D1A8-006912079406}"/>
+          </ac:spMkLst>
+        </pc:spChg>
+        <pc:spChg chg="del">
+          <ac:chgData name="Sallam Saka" userId="f204d973-d51e-47d8-884c-bdcba18d93b4" providerId="ADAL" clId="{2C357A54-8BD3-45C1-896A-A820E7B30042}" dt="2025-06-25T22:09:59.650" v="6631" actId="22"/>
+          <ac:spMkLst>
+            <pc:docMk/>
+            <pc:sldMk cId="3182023264" sldId="268"/>
+            <ac:spMk id="4" creationId="{055535BD-3BE8-3068-8818-46A5CC69B55C}"/>
+          </ac:spMkLst>
+        </pc:spChg>
+        <pc:spChg chg="add del mod">
+          <ac:chgData name="Sallam Saka" userId="f204d973-d51e-47d8-884c-bdcba18d93b4" providerId="ADAL" clId="{2C357A54-8BD3-45C1-896A-A820E7B30042}" dt="2025-06-25T22:18:22.008" v="6700" actId="478"/>
+          <ac:spMkLst>
+            <pc:docMk/>
+            <pc:sldMk cId="3182023264" sldId="268"/>
+            <ac:spMk id="14" creationId="{F19E28ED-12EF-3EB6-0B20-B38BF1E9964E}"/>
+          </ac:spMkLst>
+        </pc:spChg>
+        <pc:spChg chg="add del mod">
+          <ac:chgData name="Sallam Saka" userId="f204d973-d51e-47d8-884c-bdcba18d93b4" providerId="ADAL" clId="{2C357A54-8BD3-45C1-896A-A820E7B30042}" dt="2025-06-25T22:20:02.627" v="6716" actId="478"/>
+          <ac:spMkLst>
+            <pc:docMk/>
+            <pc:sldMk cId="3182023264" sldId="268"/>
+            <ac:spMk id="18" creationId="{9DF6CF75-FFF3-2355-9D4C-79ADD047FBC2}"/>
+          </ac:spMkLst>
+        </pc:spChg>
+        <pc:spChg chg="add mod">
+          <ac:chgData name="Sallam Saka" userId="f204d973-d51e-47d8-884c-bdcba18d93b4" providerId="ADAL" clId="{2C357A54-8BD3-45C1-896A-A820E7B30042}" dt="2025-06-25T22:23:09.938" v="6758" actId="1076"/>
+          <ac:spMkLst>
+            <pc:docMk/>
+            <pc:sldMk cId="3182023264" sldId="268"/>
+            <ac:spMk id="19" creationId="{063791FB-A7C2-39EA-ACEC-618611B55E7F}"/>
+          </ac:spMkLst>
+        </pc:spChg>
+        <pc:spChg chg="add mod">
+          <ac:chgData name="Sallam Saka" userId="f204d973-d51e-47d8-884c-bdcba18d93b4" providerId="ADAL" clId="{2C357A54-8BD3-45C1-896A-A820E7B30042}" dt="2025-06-25T22:24:05.488" v="6765" actId="255"/>
+          <ac:spMkLst>
+            <pc:docMk/>
+            <pc:sldMk cId="3182023264" sldId="268"/>
+            <ac:spMk id="20" creationId="{A41CE1FD-7196-AFDB-300A-A2A03CD923BC}"/>
+          </ac:spMkLst>
+        </pc:spChg>
+        <pc:spChg chg="add mod">
+          <ac:chgData name="Sallam Saka" userId="f204d973-d51e-47d8-884c-bdcba18d93b4" providerId="ADAL" clId="{2C357A54-8BD3-45C1-896A-A820E7B30042}" dt="2025-06-25T22:23:03.572" v="6757" actId="1076"/>
+          <ac:spMkLst>
+            <pc:docMk/>
+            <pc:sldMk cId="3182023264" sldId="268"/>
+            <ac:spMk id="22" creationId="{E7102492-FD6C-DD13-8F6B-B56F34B86660}"/>
+          </ac:spMkLst>
+        </pc:spChg>
+        <pc:grpChg chg="add mod">
+          <ac:chgData name="Sallam Saka" userId="f204d973-d51e-47d8-884c-bdcba18d93b4" providerId="ADAL" clId="{2C357A54-8BD3-45C1-896A-A820E7B30042}" dt="2025-06-25T22:22:57.444" v="6756" actId="14100"/>
+          <ac:grpSpMkLst>
+            <pc:docMk/>
+            <pc:sldMk cId="3182023264" sldId="268"/>
+            <ac:grpSpMk id="11" creationId="{1EC8DB55-7239-3F5D-6BDF-E53F8E8D3C8D}"/>
+          </ac:grpSpMkLst>
+        </pc:grpChg>
+        <pc:grpChg chg="add mod">
+          <ac:chgData name="Sallam Saka" userId="f204d973-d51e-47d8-884c-bdcba18d93b4" providerId="ADAL" clId="{2C357A54-8BD3-45C1-896A-A820E7B30042}" dt="2025-06-25T22:23:22.881" v="6760" actId="14100"/>
+          <ac:grpSpMkLst>
+            <pc:docMk/>
+            <pc:sldMk cId="3182023264" sldId="268"/>
+            <ac:grpSpMk id="16" creationId="{ABA456BA-8571-EC80-46D3-B3B41652B64E}"/>
+          </ac:grpSpMkLst>
+        </pc:grpChg>
+        <pc:picChg chg="add del mod ord modCrop">
+          <ac:chgData name="Sallam Saka" userId="f204d973-d51e-47d8-884c-bdcba18d93b4" providerId="ADAL" clId="{2C357A54-8BD3-45C1-896A-A820E7B30042}" dt="2025-06-25T22:18:12.489" v="6697" actId="21"/>
+          <ac:picMkLst>
+            <pc:docMk/>
+            <pc:sldMk cId="3182023264" sldId="268"/>
+            <ac:picMk id="6" creationId="{E59250D2-47E6-4188-F8EF-9ACA62700943}"/>
+          </ac:picMkLst>
+        </pc:picChg>
+        <pc:picChg chg="add mod modCrop">
+          <ac:chgData name="Sallam Saka" userId="f204d973-d51e-47d8-884c-bdcba18d93b4" providerId="ADAL" clId="{2C357A54-8BD3-45C1-896A-A820E7B30042}" dt="2025-06-25T22:15:54.360" v="6688" actId="164"/>
+          <ac:picMkLst>
+            <pc:docMk/>
+            <pc:sldMk cId="3182023264" sldId="268"/>
+            <ac:picMk id="8" creationId="{30D8A99A-11CC-EABE-2789-BBC207CCB786}"/>
+          </ac:picMkLst>
+        </pc:picChg>
+        <pc:picChg chg="add mod modCrop">
+          <ac:chgData name="Sallam Saka" userId="f204d973-d51e-47d8-884c-bdcba18d93b4" providerId="ADAL" clId="{2C357A54-8BD3-45C1-896A-A820E7B30042}" dt="2025-06-25T22:15:54.360" v="6688" actId="164"/>
+          <ac:picMkLst>
+            <pc:docMk/>
+            <pc:sldMk cId="3182023264" sldId="268"/>
+            <ac:picMk id="9" creationId="{C622486C-FC38-B043-7F3A-F7C1573C4415}"/>
+          </ac:picMkLst>
+        </pc:picChg>
+        <pc:picChg chg="add del mod">
+          <ac:chgData name="Sallam Saka" userId="f204d973-d51e-47d8-884c-bdcba18d93b4" providerId="ADAL" clId="{2C357A54-8BD3-45C1-896A-A820E7B30042}" dt="2025-06-25T22:16:41.233" v="6694" actId="478"/>
+          <ac:picMkLst>
+            <pc:docMk/>
+            <pc:sldMk cId="3182023264" sldId="268"/>
+            <ac:picMk id="10" creationId="{86E208AC-5197-541F-76D4-EA090EE5FA92}"/>
+          </ac:picMkLst>
+        </pc:picChg>
+        <pc:picChg chg="add mod">
+          <ac:chgData name="Sallam Saka" userId="f204d973-d51e-47d8-884c-bdcba18d93b4" providerId="ADAL" clId="{2C357A54-8BD3-45C1-896A-A820E7B30042}" dt="2025-06-25T22:18:19.993" v="6699" actId="164"/>
+          <ac:picMkLst>
+            <pc:docMk/>
+            <pc:sldMk cId="3182023264" sldId="268"/>
+            <ac:picMk id="12" creationId="{A0EFA2B7-40BF-6436-EF9F-7C8F3BF9E922}"/>
+          </ac:picMkLst>
+        </pc:picChg>
+        <pc:picChg chg="add mod">
+          <ac:chgData name="Sallam Saka" userId="f204d973-d51e-47d8-884c-bdcba18d93b4" providerId="ADAL" clId="{2C357A54-8BD3-45C1-896A-A820E7B30042}" dt="2025-06-25T22:18:19.993" v="6699" actId="164"/>
+          <ac:picMkLst>
+            <pc:docMk/>
+            <pc:sldMk cId="3182023264" sldId="268"/>
+            <ac:picMk id="15" creationId="{E59250D2-47E6-4188-F8EF-9ACA62700943}"/>
+          </ac:picMkLst>
+        </pc:picChg>
+        <pc:picChg chg="add del">
+          <ac:chgData name="Sallam Saka" userId="f204d973-d51e-47d8-884c-bdcba18d93b4" providerId="ADAL" clId="{2C357A54-8BD3-45C1-896A-A820E7B30042}" dt="2025-06-25T22:21:01.589" v="6728" actId="478"/>
+          <ac:picMkLst>
+            <pc:docMk/>
+            <pc:sldMk cId="3182023264" sldId="268"/>
+            <ac:picMk id="21" creationId="{D28E26F1-665A-50F3-BD4A-C529EC9C5ACE}"/>
+          </ac:picMkLst>
+        </pc:picChg>
+        <pc:cxnChg chg="add mod">
+          <ac:chgData name="Sallam Saka" userId="f204d973-d51e-47d8-884c-bdcba18d93b4" providerId="ADAL" clId="{2C357A54-8BD3-45C1-896A-A820E7B30042}" dt="2025-06-25T22:23:49.798" v="6764" actId="14100"/>
+          <ac:cxnSpMkLst>
+            <pc:docMk/>
+            <pc:sldMk cId="3182023264" sldId="268"/>
+            <ac:cxnSpMk id="23" creationId="{0BF18332-45E5-DC6D-D012-A939A67AE366}"/>
+          </ac:cxnSpMkLst>
+        </pc:cxnChg>
+      </pc:sldChg>
+      <pc:sldChg chg="new">
+        <pc:chgData name="Sallam Saka" userId="f204d973-d51e-47d8-884c-bdcba18d93b4" providerId="ADAL" clId="{2C357A54-8BD3-45C1-896A-A820E7B30042}" dt="2025-06-25T22:30:12.774" v="6781" actId="680"/>
+        <pc:sldMkLst>
+          <pc:docMk/>
+          <pc:sldMk cId="3966488039" sldId="269"/>
+        </pc:sldMkLst>
+      </pc:sldChg>
+      <pc:sldChg chg="modSp new mod">
+        <pc:chgData name="Sallam Saka" userId="f204d973-d51e-47d8-884c-bdcba18d93b4" providerId="ADAL" clId="{2C357A54-8BD3-45C1-896A-A820E7B30042}" dt="2025-06-25T22:30:31.620" v="6794" actId="20577"/>
+        <pc:sldMkLst>
+          <pc:docMk/>
+          <pc:sldMk cId="1793765436" sldId="270"/>
+        </pc:sldMkLst>
+        <pc:spChg chg="mod">
+          <ac:chgData name="Sallam Saka" userId="f204d973-d51e-47d8-884c-bdcba18d93b4" providerId="ADAL" clId="{2C357A54-8BD3-45C1-896A-A820E7B30042}" dt="2025-06-25T22:30:31.620" v="6794" actId="20577"/>
+          <ac:spMkLst>
+            <pc:docMk/>
+            <pc:sldMk cId="1793765436" sldId="270"/>
+            <ac:spMk id="2" creationId="{A46EB721-D92D-34D3-1523-E5F037A6470F}"/>
           </ac:spMkLst>
         </pc:spChg>
       </pc:sldChg>
@@ -316,7 +953,7 @@
           <a:p>
             <a:fld id="{9EC6EA57-E00F-4EA4-8324-57F699D5F3BD}" type="datetimeFigureOut">
               <a:rPr lang="en-CA" smtClean="0"/>
-              <a:t>2025-06-24</a:t>
+              <a:t>2025-06-25</a:t>
             </a:fld>
             <a:endParaRPr lang="en-CA"/>
           </a:p>
@@ -746,7 +1383,15 @@
             </a:r>
             <a:r>
               <a:rPr lang="en-CA" dirty="0"/>
-              <a:t> my research focuses on are ACE-FTS, OSIRIS and other instruments at PEARL. So far, the data I have been working with are Ozone profiles and partial and/or total column data. The objective/end goal of my research is to </a:t>
+              <a:t> my research focuses on are ACE-FTS which is short for Atmospheric Chemistry Experiment – Fourier Transform Spectrometer, OSIRIS, short for Optical </a:t>
+            </a:r>
+            <a:r>
+              <a:rPr lang="en-CA" dirty="0" err="1"/>
+              <a:t>Spectrogrraph</a:t>
+            </a:r>
+            <a:r>
+              <a:rPr lang="en-CA" dirty="0"/>
+              <a:t> and Infrared Imaging System and other instruments like PEARL FTIR, also known as Bruker FTIR, at PEARL, the Polar Environment Atmospheric Research Laboratory located in Eureka Nunavut. So far, the data I have been working with are Ozone profiles and partial and/or total column data. The objective/end goal of my research is to </a:t>
             </a:r>
             <a:r>
               <a:rPr lang="en-CA" dirty="0" err="1"/>
@@ -847,10 +1492,60 @@
           <a:bodyPr/>
           <a:lstStyle/>
           <a:p>
+            <a:pPr marL="0" marR="0" lvl="0" indent="0" algn="l" defTabSz="914400" rtl="0" eaLnBrk="1" fontAlgn="auto" latinLnBrk="0" hangingPunct="1">
+              <a:lnSpc>
+                <a:spcPct val="100000"/>
+              </a:lnSpc>
+              <a:spcBef>
+                <a:spcPts val="0"/>
+              </a:spcBef>
+              <a:spcAft>
+                <a:spcPts val="0"/>
+              </a:spcAft>
+              <a:buClrTx/>
+              <a:buSzTx/>
+              <a:buFontTx/>
+              <a:buNone/>
+              <a:tabLst/>
+              <a:defRPr/>
+            </a:pPr>
             <a:r>
               <a:rPr lang="en-CA" dirty="0"/>
-              <a:t>Began by reading research papers to get a feel of what I would be doing and understanding atmospheric physics, then, I began creating basic plots.</a:t>
-            </a:r>
+              <a:t>ACE-FTS is one of the two main instruments on the SCI-SAT with the other main instrument being ACE-MAESTRO which stands for </a:t>
+            </a:r>
+            <a:r>
+              <a:rPr lang="en-US" sz="1200" b="0" i="0" kern="1200" dirty="0">
+                <a:solidFill>
+                  <a:schemeClr val="tx1"/>
+                </a:solidFill>
+                <a:effectLst/>
+                <a:latin typeface="+mn-lt"/>
+                <a:ea typeface="+mn-ea"/>
+                <a:cs typeface="+mn-cs"/>
+              </a:rPr>
+              <a:t>Measurement of Aerosol Extinction in the Stratosphere and Troposphere Retrieved by Occultation</a:t>
+            </a:r>
+            <a:r>
+              <a:rPr lang="en-CA" dirty="0"/>
+              <a:t>. SCI-SAT was launched in 2003 which is when ACE-FTS had its first recorded spectra. Routine measurements began in February of 2004. ACE-FTS measures in the limb viewing geometry which I will showcase on the next slide. ACE-FTS uses Fourier Transform to produce absorption spectra. ACE-FTS operates in the wavenumber range: 750–4400 cm</a:t>
+            </a:r>
+            <a:r>
+              <a:rPr lang="en-CA" baseline="30000" dirty="0"/>
+              <a:t>−1  </a:t>
+            </a:r>
+            <a:r>
+              <a:rPr lang="en-CA" baseline="0" dirty="0"/>
+              <a:t>which represents the middle infrared range. Most of the information from this slide is gotten from the Bernath paper, </a:t>
+            </a:r>
+            <a:r>
+              <a:rPr lang="en-US" sz="1200" dirty="0">
+                <a:solidFill>
+                  <a:srgbClr val="646464"/>
+                </a:solidFill>
+              </a:rPr>
+              <a:t>Atmospheric Chemistry Experiment (ACE), published in 2005.</a:t>
+            </a:r>
+            <a:endParaRPr lang="en-CA" baseline="30000" dirty="0"/>
           </a:p>
         </p:txBody>
       </p:sp>
@@ -880,7 +1575,538 @@
     </p:spTree>
     <p:extLst>
       <p:ext uri="{BB962C8B-B14F-4D97-AF65-F5344CB8AC3E}">
+        <p14:creationId xmlns:p14="http://schemas.microsoft.com/office/powerpoint/2010/main" val="3864935624"/>
+      </p:ext>
+    </p:extLst>
+  </p:cSld>
+  <p:clrMapOvr>
+    <a:masterClrMapping/>
+  </p:clrMapOvr>
+</p:notes>
+</file>
+
+<file path=ppt/notesSlides/notesSlide4.xml><?xml version="1.0" encoding="utf-8"?>
+<p:notes xmlns:a="http://schemas.openxmlformats.org/drawingml/2006/main" xmlns:r="http://schemas.openxmlformats.org/officeDocument/2006/relationships" xmlns:p="http://schemas.openxmlformats.org/presentationml/2006/main">
+  <p:cSld>
+    <p:spTree>
+      <p:nvGrpSpPr>
+        <p:cNvPr id="1" name=""/>
+        <p:cNvGrpSpPr/>
+        <p:nvPr/>
+      </p:nvGrpSpPr>
+      <p:grpSpPr>
+        <a:xfrm>
+          <a:off x="0" y="0"/>
+          <a:ext cx="0" cy="0"/>
+          <a:chOff x="0" y="0"/>
+          <a:chExt cx="0" cy="0"/>
+        </a:xfrm>
+      </p:grpSpPr>
+      <p:sp>
+        <p:nvSpPr>
+          <p:cNvPr id="2" name="Slide Image Placeholder 1"/>
+          <p:cNvSpPr>
+            <a:spLocks noGrp="1" noRot="1" noChangeAspect="1"/>
+          </p:cNvSpPr>
+          <p:nvPr>
+            <p:ph type="sldImg"/>
+          </p:nvPr>
+        </p:nvSpPr>
+        <p:spPr/>
+      </p:sp>
+      <p:sp>
+        <p:nvSpPr>
+          <p:cNvPr id="3" name="Notes Placeholder 2"/>
+          <p:cNvSpPr>
+            <a:spLocks noGrp="1"/>
+          </p:cNvSpPr>
+          <p:nvPr>
+            <p:ph type="body" idx="1"/>
+          </p:nvPr>
+        </p:nvSpPr>
+        <p:spPr/>
+        <p:txBody>
+          <a:bodyPr/>
+          <a:lstStyle/>
+          <a:p>
+            <a:r>
+              <a:rPr lang="en-CA" dirty="0"/>
+              <a:t>So, as the satellite orbits the earth, it gets to experience a sunset and sunrise from its perspective which is when it performs it measurements. Measurements are taken by analyzing direct sunlight through a slit of the atmosphere</a:t>
+            </a:r>
+          </a:p>
+        </p:txBody>
+      </p:sp>
+      <p:sp>
+        <p:nvSpPr>
+          <p:cNvPr id="4" name="Slide Number Placeholder 3"/>
+          <p:cNvSpPr>
+            <a:spLocks noGrp="1"/>
+          </p:cNvSpPr>
+          <p:nvPr>
+            <p:ph type="sldNum" sz="quarter" idx="5"/>
+          </p:nvPr>
+        </p:nvSpPr>
+        <p:spPr/>
+        <p:txBody>
+          <a:bodyPr/>
+          <a:lstStyle/>
+          <a:p>
+            <a:fld id="{8B41CBF8-1438-49AC-8524-04FF51CA9B3F}" type="slidenum">
+              <a:rPr lang="en-CA" smtClean="0"/>
+              <a:t>5</a:t>
+            </a:fld>
+            <a:endParaRPr lang="en-CA"/>
+          </a:p>
+        </p:txBody>
+      </p:sp>
+    </p:spTree>
+    <p:extLst>
+      <p:ext uri="{BB962C8B-B14F-4D97-AF65-F5344CB8AC3E}">
+        <p14:creationId xmlns:p14="http://schemas.microsoft.com/office/powerpoint/2010/main" val="875071752"/>
+      </p:ext>
+    </p:extLst>
+  </p:cSld>
+  <p:clrMapOvr>
+    <a:masterClrMapping/>
+  </p:clrMapOvr>
+</p:notes>
+</file>
+
+<file path=ppt/notesSlides/notesSlide5.xml><?xml version="1.0" encoding="utf-8"?>
+<p:notes xmlns:a="http://schemas.openxmlformats.org/drawingml/2006/main" xmlns:r="http://schemas.openxmlformats.org/officeDocument/2006/relationships" xmlns:p="http://schemas.openxmlformats.org/presentationml/2006/main">
+  <p:cSld>
+    <p:spTree>
+      <p:nvGrpSpPr>
+        <p:cNvPr id="1" name=""/>
+        <p:cNvGrpSpPr/>
+        <p:nvPr/>
+      </p:nvGrpSpPr>
+      <p:grpSpPr>
+        <a:xfrm>
+          <a:off x="0" y="0"/>
+          <a:ext cx="0" cy="0"/>
+          <a:chOff x="0" y="0"/>
+          <a:chExt cx="0" cy="0"/>
+        </a:xfrm>
+      </p:grpSpPr>
+      <p:sp>
+        <p:nvSpPr>
+          <p:cNvPr id="2" name="Slide Image Placeholder 1"/>
+          <p:cNvSpPr>
+            <a:spLocks noGrp="1" noRot="1" noChangeAspect="1"/>
+          </p:cNvSpPr>
+          <p:nvPr>
+            <p:ph type="sldImg"/>
+          </p:nvPr>
+        </p:nvSpPr>
+        <p:spPr/>
+      </p:sp>
+      <p:sp>
+        <p:nvSpPr>
+          <p:cNvPr id="3" name="Notes Placeholder 2"/>
+          <p:cNvSpPr>
+            <a:spLocks noGrp="1"/>
+          </p:cNvSpPr>
+          <p:nvPr>
+            <p:ph type="body" idx="1"/>
+          </p:nvPr>
+        </p:nvSpPr>
+        <p:spPr/>
+        <p:txBody>
+          <a:bodyPr/>
+          <a:lstStyle/>
+          <a:p>
+            <a:pPr marL="0" marR="0" lvl="0" indent="0" algn="l" defTabSz="914400" rtl="0" eaLnBrk="1" fontAlgn="auto" latinLnBrk="0" hangingPunct="1">
+              <a:lnSpc>
+                <a:spcPct val="100000"/>
+              </a:lnSpc>
+              <a:spcBef>
+                <a:spcPts val="0"/>
+              </a:spcBef>
+              <a:spcAft>
+                <a:spcPts val="0"/>
+              </a:spcAft>
+              <a:buClrTx/>
+              <a:buSzTx/>
+              <a:buFontTx/>
+              <a:buNone/>
+              <a:tabLst/>
+              <a:defRPr/>
+            </a:pPr>
+            <a:r>
+              <a:rPr lang="en-CA" dirty="0"/>
+              <a:t>ODIN was launched in 2001 and has made measurements since then. </a:t>
+            </a:r>
+          </a:p>
+          <a:p>
+            <a:pPr marL="0" marR="0" lvl="0" indent="0" algn="l" defTabSz="914400" rtl="0" eaLnBrk="1" fontAlgn="auto" latinLnBrk="0" hangingPunct="1">
+              <a:lnSpc>
+                <a:spcPct val="100000"/>
+              </a:lnSpc>
+              <a:spcBef>
+                <a:spcPts val="0"/>
+              </a:spcBef>
+              <a:spcAft>
+                <a:spcPts val="0"/>
+              </a:spcAft>
+              <a:buClrTx/>
+              <a:buSzTx/>
+              <a:buFontTx/>
+              <a:buNone/>
+              <a:tabLst/>
+              <a:defRPr/>
+            </a:pPr>
+            <a:r>
+              <a:rPr lang="en-US" dirty="0"/>
+              <a:t>But measures sunlight scattered by the atmosphere</a:t>
+            </a:r>
+          </a:p>
+          <a:p>
+            <a:pPr marL="0" marR="0" lvl="0" indent="0" algn="l" defTabSz="914400" rtl="0" eaLnBrk="1" fontAlgn="auto" latinLnBrk="0" hangingPunct="1">
+              <a:lnSpc>
+                <a:spcPct val="100000"/>
+              </a:lnSpc>
+              <a:spcBef>
+                <a:spcPts val="0"/>
+              </a:spcBef>
+              <a:spcAft>
+                <a:spcPts val="0"/>
+              </a:spcAft>
+              <a:buClrTx/>
+              <a:buSzTx/>
+              <a:buFontTx/>
+              <a:buNone/>
+              <a:tabLst/>
+              <a:defRPr/>
+            </a:pPr>
+            <a:endParaRPr lang="en-US" dirty="0"/>
+          </a:p>
+          <a:p>
+            <a:pPr marL="0" marR="0" lvl="0" indent="0" algn="l" defTabSz="914400" rtl="0" eaLnBrk="1" fontAlgn="auto" latinLnBrk="0" hangingPunct="1">
+              <a:lnSpc>
+                <a:spcPct val="100000"/>
+              </a:lnSpc>
+              <a:spcBef>
+                <a:spcPts val="0"/>
+              </a:spcBef>
+              <a:spcAft>
+                <a:spcPts val="0"/>
+              </a:spcAft>
+              <a:buClrTx/>
+              <a:buSzTx/>
+              <a:buFontTx/>
+              <a:buNone/>
+              <a:tabLst/>
+              <a:defRPr/>
+            </a:pPr>
+            <a:r>
+              <a:rPr lang="en-US" dirty="0"/>
+              <a:t>IRI observes both scattered sunlight and airglow emissions from 2 infrared atmospheric band</a:t>
+            </a:r>
+            <a:r>
+              <a:rPr lang="en-CA" dirty="0"/>
+              <a:t>s</a:t>
+            </a:r>
+            <a:endParaRPr lang="en-CA" baseline="30000" dirty="0"/>
+          </a:p>
+        </p:txBody>
+      </p:sp>
+      <p:sp>
+        <p:nvSpPr>
+          <p:cNvPr id="4" name="Slide Number Placeholder 3"/>
+          <p:cNvSpPr>
+            <a:spLocks noGrp="1"/>
+          </p:cNvSpPr>
+          <p:nvPr>
+            <p:ph type="sldNum" sz="quarter" idx="5"/>
+          </p:nvPr>
+        </p:nvSpPr>
+        <p:spPr/>
+        <p:txBody>
+          <a:bodyPr/>
+          <a:lstStyle/>
+          <a:p>
+            <a:fld id="{8B41CBF8-1438-49AC-8524-04FF51CA9B3F}" type="slidenum">
+              <a:rPr lang="en-CA" smtClean="0"/>
+              <a:t>6</a:t>
+            </a:fld>
+            <a:endParaRPr lang="en-CA"/>
+          </a:p>
+        </p:txBody>
+      </p:sp>
+    </p:spTree>
+    <p:extLst>
+      <p:ext uri="{BB962C8B-B14F-4D97-AF65-F5344CB8AC3E}">
+        <p14:creationId xmlns:p14="http://schemas.microsoft.com/office/powerpoint/2010/main" val="898554534"/>
+      </p:ext>
+    </p:extLst>
+  </p:cSld>
+  <p:clrMapOvr>
+    <a:masterClrMapping/>
+  </p:clrMapOvr>
+</p:notes>
+</file>
+
+<file path=ppt/notesSlides/notesSlide6.xml><?xml version="1.0" encoding="utf-8"?>
+<p:notes xmlns:a="http://schemas.openxmlformats.org/drawingml/2006/main" xmlns:r="http://schemas.openxmlformats.org/officeDocument/2006/relationships" xmlns:p="http://schemas.openxmlformats.org/presentationml/2006/main">
+  <p:cSld>
+    <p:spTree>
+      <p:nvGrpSpPr>
+        <p:cNvPr id="1" name=""/>
+        <p:cNvGrpSpPr/>
+        <p:nvPr/>
+      </p:nvGrpSpPr>
+      <p:grpSpPr>
+        <a:xfrm>
+          <a:off x="0" y="0"/>
+          <a:ext cx="0" cy="0"/>
+          <a:chOff x="0" y="0"/>
+          <a:chExt cx="0" cy="0"/>
+        </a:xfrm>
+      </p:grpSpPr>
+      <p:sp>
+        <p:nvSpPr>
+          <p:cNvPr id="2" name="Slide Image Placeholder 1"/>
+          <p:cNvSpPr>
+            <a:spLocks noGrp="1" noRot="1" noChangeAspect="1"/>
+          </p:cNvSpPr>
+          <p:nvPr>
+            <p:ph type="sldImg"/>
+          </p:nvPr>
+        </p:nvSpPr>
+        <p:spPr/>
+      </p:sp>
+      <p:sp>
+        <p:nvSpPr>
+          <p:cNvPr id="3" name="Notes Placeholder 2"/>
+          <p:cNvSpPr>
+            <a:spLocks noGrp="1"/>
+          </p:cNvSpPr>
+          <p:nvPr>
+            <p:ph type="body" idx="1"/>
+          </p:nvPr>
+        </p:nvSpPr>
+        <p:spPr/>
+        <p:txBody>
+          <a:bodyPr/>
+          <a:lstStyle/>
+          <a:p>
+            <a:r>
+              <a:rPr lang="en-CA" dirty="0"/>
+              <a:t>Began by reading research papers to get a feel of what I would be doing and to understand atmospheric physics, I simultaneously began creating basic plots to showcase the measurements made by the ACE-FTS instrument.</a:t>
+            </a:r>
+          </a:p>
+        </p:txBody>
+      </p:sp>
+      <p:sp>
+        <p:nvSpPr>
+          <p:cNvPr id="4" name="Slide Number Placeholder 3"/>
+          <p:cNvSpPr>
+            <a:spLocks noGrp="1"/>
+          </p:cNvSpPr>
+          <p:nvPr>
+            <p:ph type="sldNum" sz="quarter" idx="5"/>
+          </p:nvPr>
+        </p:nvSpPr>
+        <p:spPr/>
+        <p:txBody>
+          <a:bodyPr/>
+          <a:lstStyle/>
+          <a:p>
+            <a:fld id="{8B41CBF8-1438-49AC-8524-04FF51CA9B3F}" type="slidenum">
+              <a:rPr lang="en-CA" smtClean="0"/>
+              <a:t>9</a:t>
+            </a:fld>
+            <a:endParaRPr lang="en-CA"/>
+          </a:p>
+        </p:txBody>
+      </p:sp>
+    </p:spTree>
+    <p:extLst>
+      <p:ext uri="{BB962C8B-B14F-4D97-AF65-F5344CB8AC3E}">
         <p14:creationId xmlns:p14="http://schemas.microsoft.com/office/powerpoint/2010/main" val="2045583088"/>
+      </p:ext>
+    </p:extLst>
+  </p:cSld>
+  <p:clrMapOvr>
+    <a:masterClrMapping/>
+  </p:clrMapOvr>
+</p:notes>
+</file>
+
+<file path=ppt/notesSlides/notesSlide7.xml><?xml version="1.0" encoding="utf-8"?>
+<p:notes xmlns:a="http://schemas.openxmlformats.org/drawingml/2006/main" xmlns:r="http://schemas.openxmlformats.org/officeDocument/2006/relationships" xmlns:p="http://schemas.openxmlformats.org/presentationml/2006/main">
+  <p:cSld>
+    <p:spTree>
+      <p:nvGrpSpPr>
+        <p:cNvPr id="1" name=""/>
+        <p:cNvGrpSpPr/>
+        <p:nvPr/>
+      </p:nvGrpSpPr>
+      <p:grpSpPr>
+        <a:xfrm>
+          <a:off x="0" y="0"/>
+          <a:ext cx="0" cy="0"/>
+          <a:chOff x="0" y="0"/>
+          <a:chExt cx="0" cy="0"/>
+        </a:xfrm>
+      </p:grpSpPr>
+      <p:sp>
+        <p:nvSpPr>
+          <p:cNvPr id="2" name="Slide Image Placeholder 1"/>
+          <p:cNvSpPr>
+            <a:spLocks noGrp="1" noRot="1" noChangeAspect="1"/>
+          </p:cNvSpPr>
+          <p:nvPr>
+            <p:ph type="sldImg"/>
+          </p:nvPr>
+        </p:nvSpPr>
+        <p:spPr/>
+      </p:sp>
+      <p:sp>
+        <p:nvSpPr>
+          <p:cNvPr id="3" name="Notes Placeholder 2"/>
+          <p:cNvSpPr>
+            <a:spLocks noGrp="1"/>
+          </p:cNvSpPr>
+          <p:nvPr>
+            <p:ph type="body" idx="1"/>
+          </p:nvPr>
+        </p:nvSpPr>
+        <p:spPr/>
+        <p:txBody>
+          <a:bodyPr/>
+          <a:lstStyle/>
+          <a:p>
+            <a:r>
+              <a:rPr lang="en-CA" dirty="0"/>
+              <a:t>One of my first few projects was to create a climatology plot for the ACE FTS instrument. I also replicated the plot from the OSIRIS data. (talk about </a:t>
+            </a:r>
+            <a:r>
+              <a:rPr lang="en-CA" dirty="0" err="1"/>
+              <a:t>whats</a:t>
+            </a:r>
+            <a:r>
+              <a:rPr lang="en-CA" dirty="0"/>
+              <a:t> happening in the graphs? Is it expected or unexpected?). After this, I moved on to looking at the data from various latitude bands and seasons, using line plots. This allows less significant differences to be shown since comparing by slight differences in colors is difficult.</a:t>
+            </a:r>
+          </a:p>
+        </p:txBody>
+      </p:sp>
+      <p:sp>
+        <p:nvSpPr>
+          <p:cNvPr id="4" name="Slide Number Placeholder 3"/>
+          <p:cNvSpPr>
+            <a:spLocks noGrp="1"/>
+          </p:cNvSpPr>
+          <p:nvPr>
+            <p:ph type="sldNum" sz="quarter" idx="5"/>
+          </p:nvPr>
+        </p:nvSpPr>
+        <p:spPr/>
+        <p:txBody>
+          <a:bodyPr/>
+          <a:lstStyle/>
+          <a:p>
+            <a:fld id="{8B41CBF8-1438-49AC-8524-04FF51CA9B3F}" type="slidenum">
+              <a:rPr lang="en-CA" smtClean="0"/>
+              <a:t>10</a:t>
+            </a:fld>
+            <a:endParaRPr lang="en-CA"/>
+          </a:p>
+        </p:txBody>
+      </p:sp>
+    </p:spTree>
+    <p:extLst>
+      <p:ext uri="{BB962C8B-B14F-4D97-AF65-F5344CB8AC3E}">
+        <p14:creationId xmlns:p14="http://schemas.microsoft.com/office/powerpoint/2010/main" val="608648157"/>
+      </p:ext>
+    </p:extLst>
+  </p:cSld>
+  <p:clrMapOvr>
+    <a:masterClrMapping/>
+  </p:clrMapOvr>
+</p:notes>
+</file>
+
+<file path=ppt/notesSlides/notesSlide8.xml><?xml version="1.0" encoding="utf-8"?>
+<p:notes xmlns:a="http://schemas.openxmlformats.org/drawingml/2006/main" xmlns:r="http://schemas.openxmlformats.org/officeDocument/2006/relationships" xmlns:p="http://schemas.openxmlformats.org/presentationml/2006/main">
+  <p:cSld>
+    <p:spTree>
+      <p:nvGrpSpPr>
+        <p:cNvPr id="1" name=""/>
+        <p:cNvGrpSpPr/>
+        <p:nvPr/>
+      </p:nvGrpSpPr>
+      <p:grpSpPr>
+        <a:xfrm>
+          <a:off x="0" y="0"/>
+          <a:ext cx="0" cy="0"/>
+          <a:chOff x="0" y="0"/>
+          <a:chExt cx="0" cy="0"/>
+        </a:xfrm>
+      </p:grpSpPr>
+      <p:sp>
+        <p:nvSpPr>
+          <p:cNvPr id="2" name="Slide Image Placeholder 1"/>
+          <p:cNvSpPr>
+            <a:spLocks noGrp="1" noRot="1" noChangeAspect="1"/>
+          </p:cNvSpPr>
+          <p:nvPr>
+            <p:ph type="sldImg"/>
+          </p:nvPr>
+        </p:nvSpPr>
+        <p:spPr/>
+      </p:sp>
+      <p:sp>
+        <p:nvSpPr>
+          <p:cNvPr id="3" name="Notes Placeholder 2"/>
+          <p:cNvSpPr>
+            <a:spLocks noGrp="1"/>
+          </p:cNvSpPr>
+          <p:nvPr>
+            <p:ph type="body" idx="1"/>
+          </p:nvPr>
+        </p:nvSpPr>
+        <p:spPr/>
+        <p:txBody>
+          <a:bodyPr/>
+          <a:lstStyle/>
+          <a:p>
+            <a:r>
+              <a:rPr lang="en-CA" dirty="0"/>
+              <a:t>OSIRIS PLOT</a:t>
+            </a:r>
+          </a:p>
+        </p:txBody>
+      </p:sp>
+      <p:sp>
+        <p:nvSpPr>
+          <p:cNvPr id="4" name="Slide Number Placeholder 3"/>
+          <p:cNvSpPr>
+            <a:spLocks noGrp="1"/>
+          </p:cNvSpPr>
+          <p:nvPr>
+            <p:ph type="sldNum" sz="quarter" idx="5"/>
+          </p:nvPr>
+        </p:nvSpPr>
+        <p:spPr/>
+        <p:txBody>
+          <a:bodyPr/>
+          <a:lstStyle/>
+          <a:p>
+            <a:fld id="{8B41CBF8-1438-49AC-8524-04FF51CA9B3F}" type="slidenum">
+              <a:rPr lang="en-CA" smtClean="0"/>
+              <a:t>11</a:t>
+            </a:fld>
+            <a:endParaRPr lang="en-CA"/>
+          </a:p>
+        </p:txBody>
+      </p:sp>
+    </p:spTree>
+    <p:extLst>
+      <p:ext uri="{BB962C8B-B14F-4D97-AF65-F5344CB8AC3E}">
+        <p14:creationId xmlns:p14="http://schemas.microsoft.com/office/powerpoint/2010/main" val="903031912"/>
       </p:ext>
     </p:extLst>
   </p:cSld>
@@ -1053,7 +2279,7 @@
           <a:p>
             <a:fld id="{1160EA64-D806-43AC-9DF2-F8C432F32B4C}" type="datetimeFigureOut">
               <a:rPr lang="en-US" dirty="0"/>
-              <a:t>6/24/2025</a:t>
+              <a:t>6/25/2025</a:t>
             </a:fld>
             <a:endParaRPr lang="en-US" dirty="0"/>
           </a:p>
@@ -1219,7 +2445,7 @@
           <a:p>
             <a:fld id="{E9F9C37B-1D36-470B-8223-D6C91242EC14}" type="datetimeFigureOut">
               <a:rPr lang="en-US" dirty="0"/>
-              <a:t>6/24/2025</a:t>
+              <a:t>6/25/2025</a:t>
             </a:fld>
             <a:endParaRPr lang="en-US" dirty="0"/>
           </a:p>
@@ -1394,7 +2620,7 @@
           <a:p>
             <a:fld id="{67C6F52A-A82B-47A2-A83A-8C4C91F2D59F}" type="datetimeFigureOut">
               <a:rPr lang="en-US" dirty="0"/>
-              <a:t>6/24/2025</a:t>
+              <a:t>6/25/2025</a:t>
             </a:fld>
             <a:endParaRPr lang="en-US" dirty="0"/>
           </a:p>
@@ -1559,7 +2785,7 @@
           <a:p>
             <a:fld id="{F070A7B3-6521-4DCA-87E5-044747A908C1}" type="datetimeFigureOut">
               <a:rPr lang="en-US" dirty="0"/>
-              <a:t>6/24/2025</a:t>
+              <a:t>6/25/2025</a:t>
             </a:fld>
             <a:endParaRPr lang="en-US" dirty="0"/>
           </a:p>
@@ -1823,7 +3049,7 @@
           <a:p>
             <a:fld id="{1160EA64-D806-43AC-9DF2-F8C432F32B4C}" type="datetimeFigureOut">
               <a:rPr lang="en-US" dirty="0"/>
-              <a:t>6/24/2025</a:t>
+              <a:t>6/25/2025</a:t>
             </a:fld>
             <a:endParaRPr lang="en-US" dirty="0"/>
           </a:p>
@@ -2051,7 +3277,7 @@
           <a:p>
             <a:fld id="{AB134690-1557-4C89-A502-4959FE7FAD70}" type="datetimeFigureOut">
               <a:rPr lang="en-US" dirty="0"/>
-              <a:t>6/24/2025</a:t>
+              <a:t>6/25/2025</a:t>
             </a:fld>
             <a:endParaRPr lang="en-US" dirty="0"/>
           </a:p>
@@ -2405,7 +3631,7 @@
           <a:p>
             <a:fld id="{4F7D4976-E339-4826-83B7-FBD03F55ECF8}" type="datetimeFigureOut">
               <a:rPr lang="en-US" dirty="0"/>
-              <a:t>6/24/2025</a:t>
+              <a:t>6/25/2025</a:t>
             </a:fld>
             <a:endParaRPr lang="en-US" dirty="0"/>
           </a:p>
@@ -2541,7 +3767,7 @@
           <a:p>
             <a:fld id="{E1037C31-9E7A-4F99-8774-A0E530DE1A42}" type="datetimeFigureOut">
               <a:rPr lang="en-US" dirty="0"/>
-              <a:t>6/24/2025</a:t>
+              <a:t>6/25/2025</a:t>
             </a:fld>
             <a:endParaRPr lang="en-US" dirty="0"/>
           </a:p>
@@ -2631,7 +3857,7 @@
           <a:p>
             <a:fld id="{C278504F-A551-4DE0-9316-4DCD1D8CC752}" type="datetimeFigureOut">
               <a:rPr lang="en-US" dirty="0"/>
-              <a:t>6/24/2025</a:t>
+              <a:t>6/25/2025</a:t>
             </a:fld>
             <a:endParaRPr lang="en-US" dirty="0"/>
           </a:p>
@@ -2983,7 +4209,7 @@
           <a:p>
             <a:fld id="{D1BE4249-C0D0-4B06-8692-E8BB871AF643}" type="datetimeFigureOut">
               <a:rPr lang="en-US" dirty="0"/>
-              <a:t>6/24/2025</a:t>
+              <a:t>6/25/2025</a:t>
             </a:fld>
             <a:endParaRPr lang="en-US" dirty="0"/>
           </a:p>
@@ -3335,7 +4561,7 @@
           <a:p>
             <a:fld id="{042B0DB6-F5C7-45FB-8CF3-31B45F9C2DAC}" type="datetimeFigureOut">
               <a:rPr lang="en-US" dirty="0"/>
-              <a:t>6/24/2025</a:t>
+              <a:t>6/25/2025</a:t>
             </a:fld>
             <a:endParaRPr lang="en-US" dirty="0"/>
           </a:p>
@@ -3572,7 +4798,7 @@
           <a:p>
             <a:fld id="{1160EA64-D806-43AC-9DF2-F8C432F32B4C}" type="datetimeFigureOut">
               <a:rPr lang="en-US" dirty="0"/>
-              <a:t>6/24/2025</a:t>
+              <a:t>6/25/2025</a:t>
             </a:fld>
             <a:endParaRPr lang="en-US" dirty="0"/>
           </a:p>
@@ -4096,6 +5322,1062 @@
 </p:sld>
 </file>
 
+<file path=ppt/slides/slide10.xml><?xml version="1.0" encoding="utf-8"?>
+<p:sld xmlns:a="http://schemas.openxmlformats.org/drawingml/2006/main" xmlns:r="http://schemas.openxmlformats.org/officeDocument/2006/relationships" xmlns:p="http://schemas.openxmlformats.org/presentationml/2006/main">
+  <p:cSld>
+    <p:bg>
+      <p:bgPr>
+        <a:solidFill>
+          <a:schemeClr val="bg1">
+            <a:lumMod val="95000"/>
+          </a:schemeClr>
+        </a:solidFill>
+        <a:effectLst/>
+      </p:bgPr>
+    </p:bg>
+    <p:spTree>
+      <p:nvGrpSpPr>
+        <p:cNvPr id="1" name=""/>
+        <p:cNvGrpSpPr/>
+        <p:nvPr/>
+      </p:nvGrpSpPr>
+      <p:grpSpPr>
+        <a:xfrm>
+          <a:off x="0" y="0"/>
+          <a:ext cx="0" cy="0"/>
+          <a:chOff x="0" y="0"/>
+          <a:chExt cx="0" cy="0"/>
+        </a:xfrm>
+      </p:grpSpPr>
+      <p:pic>
+        <p:nvPicPr>
+          <p:cNvPr id="10" name="Picture 9">
+            <a:extLst>
+              <a:ext uri="{FF2B5EF4-FFF2-40B4-BE49-F238E27FC236}">
+                <a16:creationId xmlns:a16="http://schemas.microsoft.com/office/drawing/2014/main" id="{AE605676-4273-BBEE-A5F9-B82B5EF126E7}"/>
+              </a:ext>
+            </a:extLst>
+          </p:cNvPr>
+          <p:cNvPicPr>
+            <a:picLocks noChangeAspect="1"/>
+          </p:cNvPicPr>
+          <p:nvPr/>
+        </p:nvPicPr>
+        <p:blipFill>
+          <a:blip r:embed="rId3"/>
+          <a:stretch>
+            <a:fillRect/>
+          </a:stretch>
+        </p:blipFill>
+        <p:spPr>
+          <a:xfrm>
+            <a:off x="1" y="717212"/>
+            <a:ext cx="6040118" cy="6140787"/>
+          </a:xfrm>
+          <a:prstGeom prst="rect">
+            <a:avLst/>
+          </a:prstGeom>
+        </p:spPr>
+      </p:pic>
+      <p:pic>
+        <p:nvPicPr>
+          <p:cNvPr id="16" name="Picture 15">
+            <a:extLst>
+              <a:ext uri="{FF2B5EF4-FFF2-40B4-BE49-F238E27FC236}">
+                <a16:creationId xmlns:a16="http://schemas.microsoft.com/office/drawing/2014/main" id="{A71DB449-03FF-37B3-5371-ADC848A92267}"/>
+              </a:ext>
+            </a:extLst>
+          </p:cNvPr>
+          <p:cNvPicPr>
+            <a:picLocks noChangeAspect="1"/>
+          </p:cNvPicPr>
+          <p:nvPr/>
+        </p:nvPicPr>
+        <p:blipFill>
+          <a:blip r:embed="rId4"/>
+          <a:stretch>
+            <a:fillRect/>
+          </a:stretch>
+        </p:blipFill>
+        <p:spPr>
+          <a:xfrm>
+            <a:off x="6095999" y="716696"/>
+            <a:ext cx="6095999" cy="6141304"/>
+          </a:xfrm>
+          <a:prstGeom prst="rect">
+            <a:avLst/>
+          </a:prstGeom>
+        </p:spPr>
+      </p:pic>
+      <p:sp>
+        <p:nvSpPr>
+          <p:cNvPr id="17" name="Title 1">
+            <a:extLst>
+              <a:ext uri="{FF2B5EF4-FFF2-40B4-BE49-F238E27FC236}">
+                <a16:creationId xmlns:a16="http://schemas.microsoft.com/office/drawing/2014/main" id="{BCEDE207-2D29-3BA0-8137-E728DEB0B53F}"/>
+              </a:ext>
+            </a:extLst>
+          </p:cNvPr>
+          <p:cNvSpPr>
+            <a:spLocks noGrp="1"/>
+          </p:cNvSpPr>
+          <p:nvPr>
+            <p:ph type="title"/>
+          </p:nvPr>
+        </p:nvSpPr>
+        <p:spPr>
+          <a:xfrm>
+            <a:off x="1973125" y="64057"/>
+            <a:ext cx="2093870" cy="588579"/>
+          </a:xfrm>
+        </p:spPr>
+        <p:txBody>
+          <a:bodyPr>
+            <a:normAutofit fontScale="90000"/>
+          </a:bodyPr>
+          <a:lstStyle/>
+          <a:p>
+            <a:r>
+              <a:rPr lang="en-CA" dirty="0"/>
+              <a:t>ACE-FTS</a:t>
+            </a:r>
+          </a:p>
+        </p:txBody>
+      </p:sp>
+      <p:sp>
+        <p:nvSpPr>
+          <p:cNvPr id="20" name="Title 1">
+            <a:extLst>
+              <a:ext uri="{FF2B5EF4-FFF2-40B4-BE49-F238E27FC236}">
+                <a16:creationId xmlns:a16="http://schemas.microsoft.com/office/drawing/2014/main" id="{ADA9F779-9C45-C0C7-3740-B7ADB7A824FF}"/>
+              </a:ext>
+            </a:extLst>
+          </p:cNvPr>
+          <p:cNvSpPr txBox="1">
+            <a:spLocks/>
+          </p:cNvSpPr>
+          <p:nvPr/>
+        </p:nvSpPr>
+        <p:spPr bwMode="black">
+          <a:xfrm>
+            <a:off x="8097062" y="64057"/>
+            <a:ext cx="2093871" cy="588579"/>
+          </a:xfrm>
+          <a:prstGeom prst="rect">
+            <a:avLst/>
+          </a:prstGeom>
+          <a:solidFill>
+            <a:srgbClr val="FFFFFF"/>
+          </a:solidFill>
+          <a:ln w="31750" cap="sq">
+            <a:solidFill>
+              <a:srgbClr val="404040"/>
+            </a:solidFill>
+            <a:miter lim="800000"/>
+          </a:ln>
+        </p:spPr>
+        <p:txBody>
+          <a:bodyPr vert="horz" lIns="182880" tIns="182880" rIns="182880" bIns="182880" rtlCol="0" anchor="ctr">
+            <a:noAutofit/>
+          </a:bodyPr>
+          <a:lstStyle>
+            <a:lvl1pPr algn="ctr" defTabSz="914400" rtl="0" eaLnBrk="1" latinLnBrk="0" hangingPunct="1">
+              <a:lnSpc>
+                <a:spcPct val="90000"/>
+              </a:lnSpc>
+              <a:spcBef>
+                <a:spcPct val="0"/>
+              </a:spcBef>
+              <a:buNone/>
+              <a:defRPr sz="2800" kern="1200" cap="all" spc="200" baseline="0">
+                <a:solidFill>
+                  <a:srgbClr val="262626"/>
+                </a:solidFill>
+                <a:latin typeface="+mj-lt"/>
+                <a:ea typeface="+mj-ea"/>
+                <a:cs typeface="+mj-cs"/>
+              </a:defRPr>
+            </a:lvl1pPr>
+          </a:lstStyle>
+          <a:p>
+            <a:r>
+              <a:rPr lang="en-CA" sz="2500" dirty="0"/>
+              <a:t>OSIRIS</a:t>
+            </a:r>
+          </a:p>
+        </p:txBody>
+      </p:sp>
+      <p:cxnSp>
+        <p:nvCxnSpPr>
+          <p:cNvPr id="24" name="Straight Connector 23">
+            <a:extLst>
+              <a:ext uri="{FF2B5EF4-FFF2-40B4-BE49-F238E27FC236}">
+                <a16:creationId xmlns:a16="http://schemas.microsoft.com/office/drawing/2014/main" id="{F5CB48F1-5C12-993D-A3CA-B6EBE26FE468}"/>
+              </a:ext>
+            </a:extLst>
+          </p:cNvPr>
+          <p:cNvCxnSpPr>
+            <a:cxnSpLocks/>
+          </p:cNvCxnSpPr>
+          <p:nvPr/>
+        </p:nvCxnSpPr>
+        <p:spPr>
+          <a:xfrm flipV="1">
+            <a:off x="6071649" y="0"/>
+            <a:ext cx="0" cy="6857999"/>
+          </a:xfrm>
+          <a:prstGeom prst="line">
+            <a:avLst/>
+          </a:prstGeom>
+          <a:ln w="57150">
+            <a:solidFill>
+              <a:schemeClr val="tx1"/>
+            </a:solidFill>
+          </a:ln>
+        </p:spPr>
+        <p:style>
+          <a:lnRef idx="1">
+            <a:schemeClr val="accent1"/>
+          </a:lnRef>
+          <a:fillRef idx="0">
+            <a:schemeClr val="accent1"/>
+          </a:fillRef>
+          <a:effectRef idx="0">
+            <a:schemeClr val="accent1"/>
+          </a:effectRef>
+          <a:fontRef idx="minor">
+            <a:schemeClr val="tx1"/>
+          </a:fontRef>
+        </p:style>
+      </p:cxnSp>
+    </p:spTree>
+    <p:extLst>
+      <p:ext uri="{BB962C8B-B14F-4D97-AF65-F5344CB8AC3E}">
+        <p14:creationId xmlns:p14="http://schemas.microsoft.com/office/powerpoint/2010/main" val="787353098"/>
+      </p:ext>
+    </p:extLst>
+  </p:cSld>
+  <p:clrMapOvr>
+    <a:masterClrMapping/>
+  </p:clrMapOvr>
+</p:sld>
+</file>
+
+<file path=ppt/slides/slide11.xml><?xml version="1.0" encoding="utf-8"?>
+<p:sld xmlns:a="http://schemas.openxmlformats.org/drawingml/2006/main" xmlns:r="http://schemas.openxmlformats.org/officeDocument/2006/relationships" xmlns:p="http://schemas.openxmlformats.org/presentationml/2006/main">
+  <p:cSld>
+    <p:spTree>
+      <p:nvGrpSpPr>
+        <p:cNvPr id="1" name=""/>
+        <p:cNvGrpSpPr/>
+        <p:nvPr/>
+      </p:nvGrpSpPr>
+      <p:grpSpPr>
+        <a:xfrm>
+          <a:off x="0" y="0"/>
+          <a:ext cx="0" cy="0"/>
+          <a:chOff x="0" y="0"/>
+          <a:chExt cx="0" cy="0"/>
+        </a:xfrm>
+      </p:grpSpPr>
+      <p:grpSp>
+        <p:nvGrpSpPr>
+          <p:cNvPr id="11" name="Group 10">
+            <a:extLst>
+              <a:ext uri="{FF2B5EF4-FFF2-40B4-BE49-F238E27FC236}">
+                <a16:creationId xmlns:a16="http://schemas.microsoft.com/office/drawing/2014/main" id="{FBBFF5EB-21CA-2963-A5C5-D876AD4464FA}"/>
+              </a:ext>
+            </a:extLst>
+          </p:cNvPr>
+          <p:cNvGrpSpPr/>
+          <p:nvPr/>
+        </p:nvGrpSpPr>
+        <p:grpSpPr>
+          <a:xfrm>
+            <a:off x="1981221" y="1338798"/>
+            <a:ext cx="8229557" cy="5397062"/>
+            <a:chOff x="168165" y="515006"/>
+            <a:chExt cx="7178523" cy="4740167"/>
+          </a:xfrm>
+        </p:grpSpPr>
+        <p:pic>
+          <p:nvPicPr>
+            <p:cNvPr id="10" name="Picture 9">
+              <a:extLst>
+                <a:ext uri="{FF2B5EF4-FFF2-40B4-BE49-F238E27FC236}">
+                  <a16:creationId xmlns:a16="http://schemas.microsoft.com/office/drawing/2014/main" id="{F6D63B18-6C06-13E7-8576-7084473443C3}"/>
+                </a:ext>
+              </a:extLst>
+            </p:cNvPr>
+            <p:cNvPicPr>
+              <a:picLocks noChangeAspect="1"/>
+            </p:cNvPicPr>
+            <p:nvPr/>
+          </p:nvPicPr>
+          <p:blipFill>
+            <a:blip r:embed="rId3"/>
+            <a:srcRect l="18613" t="9" r="17014" b="97926"/>
+            <a:stretch>
+              <a:fillRect/>
+            </a:stretch>
+          </p:blipFill>
+          <p:spPr>
+            <a:xfrm>
+              <a:off x="168165" y="515006"/>
+              <a:ext cx="7178523" cy="233009"/>
+            </a:xfrm>
+            <a:prstGeom prst="rect">
+              <a:avLst/>
+            </a:prstGeom>
+          </p:spPr>
+        </p:pic>
+        <p:pic>
+          <p:nvPicPr>
+            <p:cNvPr id="7" name="Picture 6">
+              <a:extLst>
+                <a:ext uri="{FF2B5EF4-FFF2-40B4-BE49-F238E27FC236}">
+                  <a16:creationId xmlns:a16="http://schemas.microsoft.com/office/drawing/2014/main" id="{C027E1F7-9BE4-85B2-66CB-63B1C9A72DF9}"/>
+                </a:ext>
+              </a:extLst>
+            </p:cNvPr>
+            <p:cNvPicPr>
+              <a:picLocks noChangeAspect="1"/>
+            </p:cNvPicPr>
+            <p:nvPr/>
+          </p:nvPicPr>
+          <p:blipFill>
+            <a:blip r:embed="rId3"/>
+            <a:srcRect l="-1" t="3611" r="48776" b="64598"/>
+            <a:stretch>
+              <a:fillRect/>
+            </a:stretch>
+          </p:blipFill>
+          <p:spPr>
+            <a:xfrm>
+              <a:off x="168165" y="748015"/>
+              <a:ext cx="7178523" cy="4507158"/>
+            </a:xfrm>
+            <a:prstGeom prst="rect">
+              <a:avLst/>
+            </a:prstGeom>
+          </p:spPr>
+        </p:pic>
+      </p:grpSp>
+      <p:sp>
+        <p:nvSpPr>
+          <p:cNvPr id="12" name="Title 1">
+            <a:extLst>
+              <a:ext uri="{FF2B5EF4-FFF2-40B4-BE49-F238E27FC236}">
+                <a16:creationId xmlns:a16="http://schemas.microsoft.com/office/drawing/2014/main" id="{24C40DBC-A911-9BF3-6E80-0130B12C596F}"/>
+              </a:ext>
+            </a:extLst>
+          </p:cNvPr>
+          <p:cNvSpPr>
+            <a:spLocks noGrp="1"/>
+          </p:cNvSpPr>
+          <p:nvPr>
+            <p:ph type="title"/>
+          </p:nvPr>
+        </p:nvSpPr>
+        <p:spPr>
+          <a:xfrm>
+            <a:off x="2600142" y="336723"/>
+            <a:ext cx="6991714" cy="869425"/>
+          </a:xfrm>
+        </p:spPr>
+        <p:txBody>
+          <a:bodyPr/>
+          <a:lstStyle/>
+          <a:p>
+            <a:r>
+              <a:rPr lang="en-CA" dirty="0"/>
+              <a:t>NO OZONE HOLE? </a:t>
+            </a:r>
+          </a:p>
+        </p:txBody>
+      </p:sp>
+    </p:spTree>
+    <p:extLst>
+      <p:ext uri="{BB962C8B-B14F-4D97-AF65-F5344CB8AC3E}">
+        <p14:creationId xmlns:p14="http://schemas.microsoft.com/office/powerpoint/2010/main" val="2635246491"/>
+      </p:ext>
+    </p:extLst>
+  </p:cSld>
+  <p:clrMapOvr>
+    <a:masterClrMapping/>
+  </p:clrMapOvr>
+</p:sld>
+</file>
+
+<file path=ppt/slides/slide12.xml><?xml version="1.0" encoding="utf-8"?>
+<p:sld xmlns:a="http://schemas.openxmlformats.org/drawingml/2006/main" xmlns:r="http://schemas.openxmlformats.org/officeDocument/2006/relationships" xmlns:p="http://schemas.openxmlformats.org/presentationml/2006/main">
+  <p:cSld>
+    <p:spTree>
+      <p:nvGrpSpPr>
+        <p:cNvPr id="1" name=""/>
+        <p:cNvGrpSpPr/>
+        <p:nvPr/>
+      </p:nvGrpSpPr>
+      <p:grpSpPr>
+        <a:xfrm>
+          <a:off x="0" y="0"/>
+          <a:ext cx="0" cy="0"/>
+          <a:chOff x="0" y="0"/>
+          <a:chExt cx="0" cy="0"/>
+        </a:xfrm>
+      </p:grpSpPr>
+      <p:sp>
+        <p:nvSpPr>
+          <p:cNvPr id="2" name="Title 1">
+            <a:extLst>
+              <a:ext uri="{FF2B5EF4-FFF2-40B4-BE49-F238E27FC236}">
+                <a16:creationId xmlns:a16="http://schemas.microsoft.com/office/drawing/2014/main" id="{B1E33F58-D219-71B0-899C-AC64DA4EA566}"/>
+              </a:ext>
+            </a:extLst>
+          </p:cNvPr>
+          <p:cNvSpPr>
+            <a:spLocks noGrp="1"/>
+          </p:cNvSpPr>
+          <p:nvPr>
+            <p:ph type="title"/>
+          </p:nvPr>
+        </p:nvSpPr>
+        <p:spPr/>
+        <p:txBody>
+          <a:bodyPr/>
+          <a:lstStyle/>
+          <a:p>
+            <a:endParaRPr lang="en-CA" dirty="0"/>
+          </a:p>
+        </p:txBody>
+      </p:sp>
+      <p:sp>
+        <p:nvSpPr>
+          <p:cNvPr id="3" name="Content Placeholder 2">
+            <a:extLst>
+              <a:ext uri="{FF2B5EF4-FFF2-40B4-BE49-F238E27FC236}">
+                <a16:creationId xmlns:a16="http://schemas.microsoft.com/office/drawing/2014/main" id="{02701640-DD03-C95C-2123-D0E1D90D0B9C}"/>
+              </a:ext>
+            </a:extLst>
+          </p:cNvPr>
+          <p:cNvSpPr>
+            <a:spLocks noGrp="1"/>
+          </p:cNvSpPr>
+          <p:nvPr>
+            <p:ph idx="1"/>
+          </p:nvPr>
+        </p:nvSpPr>
+        <p:spPr/>
+        <p:txBody>
+          <a:bodyPr/>
+          <a:lstStyle/>
+          <a:p>
+            <a:endParaRPr lang="en-CA"/>
+          </a:p>
+        </p:txBody>
+      </p:sp>
+    </p:spTree>
+    <p:extLst>
+      <p:ext uri="{BB962C8B-B14F-4D97-AF65-F5344CB8AC3E}">
+        <p14:creationId xmlns:p14="http://schemas.microsoft.com/office/powerpoint/2010/main" val="56333691"/>
+      </p:ext>
+    </p:extLst>
+  </p:cSld>
+  <p:clrMapOvr>
+    <a:masterClrMapping/>
+  </p:clrMapOvr>
+</p:sld>
+</file>
+
+<file path=ppt/slides/slide13.xml><?xml version="1.0" encoding="utf-8"?>
+<p:sld xmlns:a="http://schemas.openxmlformats.org/drawingml/2006/main" xmlns:r="http://schemas.openxmlformats.org/officeDocument/2006/relationships" xmlns:p="http://schemas.openxmlformats.org/presentationml/2006/main">
+  <p:cSld>
+    <p:spTree>
+      <p:nvGrpSpPr>
+        <p:cNvPr id="1" name=""/>
+        <p:cNvGrpSpPr/>
+        <p:nvPr/>
+      </p:nvGrpSpPr>
+      <p:grpSpPr>
+        <a:xfrm>
+          <a:off x="0" y="0"/>
+          <a:ext cx="0" cy="0"/>
+          <a:chOff x="0" y="0"/>
+          <a:chExt cx="0" cy="0"/>
+        </a:xfrm>
+      </p:grpSpPr>
+      <p:grpSp>
+        <p:nvGrpSpPr>
+          <p:cNvPr id="11" name="Group 10">
+            <a:extLst>
+              <a:ext uri="{FF2B5EF4-FFF2-40B4-BE49-F238E27FC236}">
+                <a16:creationId xmlns:a16="http://schemas.microsoft.com/office/drawing/2014/main" id="{1EC8DB55-7239-3F5D-6BDF-E53F8E8D3C8D}"/>
+              </a:ext>
+            </a:extLst>
+          </p:cNvPr>
+          <p:cNvGrpSpPr/>
+          <p:nvPr/>
+        </p:nvGrpSpPr>
+        <p:grpSpPr>
+          <a:xfrm>
+            <a:off x="-2" y="1483822"/>
+            <a:ext cx="6096002" cy="5374178"/>
+            <a:chOff x="294289" y="2099135"/>
+            <a:chExt cx="5412828" cy="4825776"/>
+          </a:xfrm>
+        </p:grpSpPr>
+        <p:pic>
+          <p:nvPicPr>
+            <p:cNvPr id="8" name="Picture 7">
+              <a:extLst>
+                <a:ext uri="{FF2B5EF4-FFF2-40B4-BE49-F238E27FC236}">
+                  <a16:creationId xmlns:a16="http://schemas.microsoft.com/office/drawing/2014/main" id="{30D8A99A-11CC-EABE-2789-BBC207CCB786}"/>
+                </a:ext>
+              </a:extLst>
+            </p:cNvPr>
+            <p:cNvPicPr>
+              <a:picLocks noChangeAspect="1"/>
+            </p:cNvPicPr>
+            <p:nvPr/>
+          </p:nvPicPr>
+          <p:blipFill>
+            <a:blip r:embed="rId2"/>
+            <a:srcRect l="53420" t="5917" r="-211" b="48851"/>
+            <a:stretch>
+              <a:fillRect/>
+            </a:stretch>
+          </p:blipFill>
+          <p:spPr>
+            <a:xfrm>
+              <a:off x="294289" y="2359768"/>
+              <a:ext cx="5412828" cy="4565143"/>
+            </a:xfrm>
+            <a:prstGeom prst="rect">
+              <a:avLst/>
+            </a:prstGeom>
+          </p:spPr>
+        </p:pic>
+        <p:pic>
+          <p:nvPicPr>
+            <p:cNvPr id="9" name="Picture 8">
+              <a:extLst>
+                <a:ext uri="{FF2B5EF4-FFF2-40B4-BE49-F238E27FC236}">
+                  <a16:creationId xmlns:a16="http://schemas.microsoft.com/office/drawing/2014/main" id="{C622486C-FC38-B043-7F3A-F7C1573C4415}"/>
+                </a:ext>
+              </a:extLst>
+            </p:cNvPr>
+            <p:cNvPicPr>
+              <a:picLocks noChangeAspect="1"/>
+            </p:cNvPicPr>
+            <p:nvPr/>
+          </p:nvPicPr>
+          <p:blipFill>
+            <a:blip r:embed="rId2"/>
+            <a:srcRect l="16840" t="-463" r="17851" b="96859"/>
+            <a:stretch>
+              <a:fillRect/>
+            </a:stretch>
+          </p:blipFill>
+          <p:spPr>
+            <a:xfrm>
+              <a:off x="294289" y="2099135"/>
+              <a:ext cx="5412828" cy="260633"/>
+            </a:xfrm>
+            <a:prstGeom prst="rect">
+              <a:avLst/>
+            </a:prstGeom>
+          </p:spPr>
+        </p:pic>
+      </p:grpSp>
+      <p:grpSp>
+        <p:nvGrpSpPr>
+          <p:cNvPr id="16" name="Group 15">
+            <a:extLst>
+              <a:ext uri="{FF2B5EF4-FFF2-40B4-BE49-F238E27FC236}">
+                <a16:creationId xmlns:a16="http://schemas.microsoft.com/office/drawing/2014/main" id="{ABA456BA-8571-EC80-46D3-B3B41652B64E}"/>
+              </a:ext>
+            </a:extLst>
+          </p:cNvPr>
+          <p:cNvGrpSpPr/>
+          <p:nvPr/>
+        </p:nvGrpSpPr>
+        <p:grpSpPr>
+          <a:xfrm>
+            <a:off x="6096000" y="1483822"/>
+            <a:ext cx="6096002" cy="5374178"/>
+            <a:chOff x="6096000" y="193744"/>
+            <a:chExt cx="5213131" cy="4591192"/>
+          </a:xfrm>
+        </p:grpSpPr>
+        <p:pic>
+          <p:nvPicPr>
+            <p:cNvPr id="12" name="Picture 11">
+              <a:extLst>
+                <a:ext uri="{FF2B5EF4-FFF2-40B4-BE49-F238E27FC236}">
+                  <a16:creationId xmlns:a16="http://schemas.microsoft.com/office/drawing/2014/main" id="{A0EFA2B7-40BF-6436-EF9F-7C8F3BF9E922}"/>
+                </a:ext>
+              </a:extLst>
+            </p:cNvPr>
+            <p:cNvPicPr>
+              <a:picLocks noChangeAspect="1"/>
+            </p:cNvPicPr>
+            <p:nvPr/>
+          </p:nvPicPr>
+          <p:blipFill>
+            <a:blip r:embed="rId2"/>
+            <a:srcRect l="16840" t="-463" r="17851" b="96859"/>
+            <a:stretch>
+              <a:fillRect/>
+            </a:stretch>
+          </p:blipFill>
+          <p:spPr>
+            <a:xfrm>
+              <a:off x="6096000" y="193744"/>
+              <a:ext cx="5213131" cy="251017"/>
+            </a:xfrm>
+            <a:prstGeom prst="rect">
+              <a:avLst/>
+            </a:prstGeom>
+          </p:spPr>
+        </p:pic>
+        <p:pic>
+          <p:nvPicPr>
+            <p:cNvPr id="15" name="Content Placeholder 5">
+              <a:extLst>
+                <a:ext uri="{FF2B5EF4-FFF2-40B4-BE49-F238E27FC236}">
+                  <a16:creationId xmlns:a16="http://schemas.microsoft.com/office/drawing/2014/main" id="{E59250D2-47E6-4188-F8EF-9ACA62700943}"/>
+                </a:ext>
+              </a:extLst>
+            </p:cNvPr>
+            <p:cNvPicPr>
+              <a:picLocks noChangeAspect="1"/>
+            </p:cNvPicPr>
+            <p:nvPr/>
+          </p:nvPicPr>
+          <p:blipFill>
+            <a:blip r:embed="rId3"/>
+            <a:srcRect l="53379" t="6022" r="161" b="49644"/>
+            <a:stretch>
+              <a:fillRect/>
+            </a:stretch>
+          </p:blipFill>
+          <p:spPr>
+            <a:xfrm>
+              <a:off x="6096000" y="444761"/>
+              <a:ext cx="5213131" cy="4340175"/>
+            </a:xfrm>
+            <a:prstGeom prst="rect">
+              <a:avLst/>
+            </a:prstGeom>
+          </p:spPr>
+        </p:pic>
+      </p:grpSp>
+      <p:sp>
+        <p:nvSpPr>
+          <p:cNvPr id="19" name="Title 1">
+            <a:extLst>
+              <a:ext uri="{FF2B5EF4-FFF2-40B4-BE49-F238E27FC236}">
+                <a16:creationId xmlns:a16="http://schemas.microsoft.com/office/drawing/2014/main" id="{063791FB-A7C2-39EA-ACEC-618611B55E7F}"/>
+              </a:ext>
+            </a:extLst>
+          </p:cNvPr>
+          <p:cNvSpPr>
+            <a:spLocks noGrp="1"/>
+          </p:cNvSpPr>
+          <p:nvPr>
+            <p:ph type="title"/>
+          </p:nvPr>
+        </p:nvSpPr>
+        <p:spPr>
+          <a:xfrm>
+            <a:off x="2001064" y="876085"/>
+            <a:ext cx="2093870" cy="588579"/>
+          </a:xfrm>
+        </p:spPr>
+        <p:txBody>
+          <a:bodyPr>
+            <a:normAutofit fontScale="90000"/>
+          </a:bodyPr>
+          <a:lstStyle/>
+          <a:p>
+            <a:r>
+              <a:rPr lang="en-CA" dirty="0"/>
+              <a:t>ACE-FTS</a:t>
+            </a:r>
+          </a:p>
+        </p:txBody>
+      </p:sp>
+      <p:sp>
+        <p:nvSpPr>
+          <p:cNvPr id="20" name="Title 1">
+            <a:extLst>
+              <a:ext uri="{FF2B5EF4-FFF2-40B4-BE49-F238E27FC236}">
+                <a16:creationId xmlns:a16="http://schemas.microsoft.com/office/drawing/2014/main" id="{A41CE1FD-7196-AFDB-300A-A2A03CD923BC}"/>
+              </a:ext>
+            </a:extLst>
+          </p:cNvPr>
+          <p:cNvSpPr txBox="1">
+            <a:spLocks/>
+          </p:cNvSpPr>
+          <p:nvPr/>
+        </p:nvSpPr>
+        <p:spPr bwMode="black">
+          <a:xfrm>
+            <a:off x="8132380" y="876084"/>
+            <a:ext cx="2093871" cy="588579"/>
+          </a:xfrm>
+          <a:prstGeom prst="rect">
+            <a:avLst/>
+          </a:prstGeom>
+          <a:solidFill>
+            <a:srgbClr val="FFFFFF"/>
+          </a:solidFill>
+          <a:ln w="31750" cap="sq">
+            <a:solidFill>
+              <a:srgbClr val="404040"/>
+            </a:solidFill>
+            <a:miter lim="800000"/>
+          </a:ln>
+        </p:spPr>
+        <p:txBody>
+          <a:bodyPr vert="horz" lIns="182880" tIns="182880" rIns="182880" bIns="182880" rtlCol="0" anchor="ctr">
+            <a:noAutofit/>
+          </a:bodyPr>
+          <a:lstStyle>
+            <a:lvl1pPr algn="ctr" defTabSz="914400" rtl="0" eaLnBrk="1" latinLnBrk="0" hangingPunct="1">
+              <a:lnSpc>
+                <a:spcPct val="90000"/>
+              </a:lnSpc>
+              <a:spcBef>
+                <a:spcPct val="0"/>
+              </a:spcBef>
+              <a:buNone/>
+              <a:defRPr sz="2800" kern="1200" cap="all" spc="200" baseline="0">
+                <a:solidFill>
+                  <a:srgbClr val="262626"/>
+                </a:solidFill>
+                <a:latin typeface="+mj-lt"/>
+                <a:ea typeface="+mj-ea"/>
+                <a:cs typeface="+mj-cs"/>
+              </a:defRPr>
+            </a:lvl1pPr>
+          </a:lstStyle>
+          <a:p>
+            <a:r>
+              <a:rPr lang="en-CA" sz="2500" dirty="0"/>
+              <a:t>OSIRIS</a:t>
+            </a:r>
+          </a:p>
+        </p:txBody>
+      </p:sp>
+      <p:sp>
+        <p:nvSpPr>
+          <p:cNvPr id="22" name="Title 1">
+            <a:extLst>
+              <a:ext uri="{FF2B5EF4-FFF2-40B4-BE49-F238E27FC236}">
+                <a16:creationId xmlns:a16="http://schemas.microsoft.com/office/drawing/2014/main" id="{E7102492-FD6C-DD13-8F6B-B56F34B86660}"/>
+              </a:ext>
+            </a:extLst>
+          </p:cNvPr>
+          <p:cNvSpPr txBox="1">
+            <a:spLocks/>
+          </p:cNvSpPr>
+          <p:nvPr/>
+        </p:nvSpPr>
+        <p:spPr bwMode="black">
+          <a:xfrm>
+            <a:off x="4059620" y="54415"/>
+            <a:ext cx="4072760" cy="756745"/>
+          </a:xfrm>
+          <a:prstGeom prst="rect">
+            <a:avLst/>
+          </a:prstGeom>
+          <a:solidFill>
+            <a:srgbClr val="FFFFFF"/>
+          </a:solidFill>
+          <a:ln w="31750" cap="sq">
+            <a:solidFill>
+              <a:srgbClr val="404040"/>
+            </a:solidFill>
+            <a:miter lim="800000"/>
+          </a:ln>
+        </p:spPr>
+        <p:txBody>
+          <a:bodyPr vert="horz" lIns="182880" tIns="182880" rIns="182880" bIns="182880" rtlCol="0" anchor="ctr">
+            <a:normAutofit fontScale="97500"/>
+          </a:bodyPr>
+          <a:lstStyle>
+            <a:lvl1pPr algn="ctr" defTabSz="914400" rtl="0" eaLnBrk="1" latinLnBrk="0" hangingPunct="1">
+              <a:lnSpc>
+                <a:spcPct val="90000"/>
+              </a:lnSpc>
+              <a:spcBef>
+                <a:spcPct val="0"/>
+              </a:spcBef>
+              <a:buNone/>
+              <a:defRPr sz="2800" kern="1200" cap="all" spc="200" baseline="0">
+                <a:solidFill>
+                  <a:srgbClr val="262626"/>
+                </a:solidFill>
+                <a:latin typeface="+mj-lt"/>
+                <a:ea typeface="+mj-ea"/>
+                <a:cs typeface="+mj-cs"/>
+              </a:defRPr>
+            </a:lvl1pPr>
+          </a:lstStyle>
+          <a:p>
+            <a:r>
+              <a:rPr lang="en-CA" dirty="0"/>
+              <a:t>Some discrepancy</a:t>
+            </a:r>
+          </a:p>
+        </p:txBody>
+      </p:sp>
+      <p:cxnSp>
+        <p:nvCxnSpPr>
+          <p:cNvPr id="23" name="Straight Connector 22">
+            <a:extLst>
+              <a:ext uri="{FF2B5EF4-FFF2-40B4-BE49-F238E27FC236}">
+                <a16:creationId xmlns:a16="http://schemas.microsoft.com/office/drawing/2014/main" id="{0BF18332-45E5-DC6D-D012-A939A67AE366}"/>
+              </a:ext>
+            </a:extLst>
+          </p:cNvPr>
+          <p:cNvCxnSpPr>
+            <a:cxnSpLocks/>
+            <a:endCxn id="22" idx="2"/>
+          </p:cNvCxnSpPr>
+          <p:nvPr/>
+        </p:nvCxnSpPr>
+        <p:spPr>
+          <a:xfrm flipV="1">
+            <a:off x="6071649" y="811160"/>
+            <a:ext cx="24351" cy="6046839"/>
+          </a:xfrm>
+          <a:prstGeom prst="line">
+            <a:avLst/>
+          </a:prstGeom>
+          <a:ln w="57150">
+            <a:solidFill>
+              <a:schemeClr val="tx1"/>
+            </a:solidFill>
+          </a:ln>
+        </p:spPr>
+        <p:style>
+          <a:lnRef idx="1">
+            <a:schemeClr val="accent1"/>
+          </a:lnRef>
+          <a:fillRef idx="0">
+            <a:schemeClr val="accent1"/>
+          </a:fillRef>
+          <a:effectRef idx="0">
+            <a:schemeClr val="accent1"/>
+          </a:effectRef>
+          <a:fontRef idx="minor">
+            <a:schemeClr val="tx1"/>
+          </a:fontRef>
+        </p:style>
+      </p:cxnSp>
+    </p:spTree>
+    <p:extLst>
+      <p:ext uri="{BB962C8B-B14F-4D97-AF65-F5344CB8AC3E}">
+        <p14:creationId xmlns:p14="http://schemas.microsoft.com/office/powerpoint/2010/main" val="3182023264"/>
+      </p:ext>
+    </p:extLst>
+  </p:cSld>
+  <p:clrMapOvr>
+    <a:masterClrMapping/>
+  </p:clrMapOvr>
+</p:sld>
+</file>
+
+<file path=ppt/slides/slide14.xml><?xml version="1.0" encoding="utf-8"?>
+<p:sld xmlns:a="http://schemas.openxmlformats.org/drawingml/2006/main" xmlns:r="http://schemas.openxmlformats.org/officeDocument/2006/relationships" xmlns:p="http://schemas.openxmlformats.org/presentationml/2006/main">
+  <p:cSld>
+    <p:spTree>
+      <p:nvGrpSpPr>
+        <p:cNvPr id="1" name=""/>
+        <p:cNvGrpSpPr/>
+        <p:nvPr/>
+      </p:nvGrpSpPr>
+      <p:grpSpPr>
+        <a:xfrm>
+          <a:off x="0" y="0"/>
+          <a:ext cx="0" cy="0"/>
+          <a:chOff x="0" y="0"/>
+          <a:chExt cx="0" cy="0"/>
+        </a:xfrm>
+      </p:grpSpPr>
+      <p:sp>
+        <p:nvSpPr>
+          <p:cNvPr id="2" name="Title 1">
+            <a:extLst>
+              <a:ext uri="{FF2B5EF4-FFF2-40B4-BE49-F238E27FC236}">
+                <a16:creationId xmlns:a16="http://schemas.microsoft.com/office/drawing/2014/main" id="{91BEE49F-B0E2-B8A9-1C93-012209314FE7}"/>
+              </a:ext>
+            </a:extLst>
+          </p:cNvPr>
+          <p:cNvSpPr>
+            <a:spLocks noGrp="1"/>
+          </p:cNvSpPr>
+          <p:nvPr>
+            <p:ph type="title"/>
+          </p:nvPr>
+        </p:nvSpPr>
+        <p:spPr/>
+        <p:txBody>
+          <a:bodyPr/>
+          <a:lstStyle/>
+          <a:p>
+            <a:endParaRPr lang="en-CA" dirty="0"/>
+          </a:p>
+        </p:txBody>
+      </p:sp>
+      <p:sp>
+        <p:nvSpPr>
+          <p:cNvPr id="3" name="Content Placeholder 2">
+            <a:extLst>
+              <a:ext uri="{FF2B5EF4-FFF2-40B4-BE49-F238E27FC236}">
+                <a16:creationId xmlns:a16="http://schemas.microsoft.com/office/drawing/2014/main" id="{A4DD6506-298B-36E0-956E-6628B5F58F7B}"/>
+              </a:ext>
+            </a:extLst>
+          </p:cNvPr>
+          <p:cNvSpPr>
+            <a:spLocks noGrp="1"/>
+          </p:cNvSpPr>
+          <p:nvPr>
+            <p:ph sz="half" idx="1"/>
+          </p:nvPr>
+        </p:nvSpPr>
+        <p:spPr/>
+        <p:txBody>
+          <a:bodyPr/>
+          <a:lstStyle/>
+          <a:p>
+            <a:endParaRPr lang="en-CA"/>
+          </a:p>
+        </p:txBody>
+      </p:sp>
+      <p:sp>
+        <p:nvSpPr>
+          <p:cNvPr id="4" name="Content Placeholder 3">
+            <a:extLst>
+              <a:ext uri="{FF2B5EF4-FFF2-40B4-BE49-F238E27FC236}">
+                <a16:creationId xmlns:a16="http://schemas.microsoft.com/office/drawing/2014/main" id="{F5F495C1-001D-B12A-D9FA-A7C8D9D70E16}"/>
+              </a:ext>
+            </a:extLst>
+          </p:cNvPr>
+          <p:cNvSpPr>
+            <a:spLocks noGrp="1"/>
+          </p:cNvSpPr>
+          <p:nvPr>
+            <p:ph sz="half" idx="2"/>
+          </p:nvPr>
+        </p:nvSpPr>
+        <p:spPr/>
+        <p:txBody>
+          <a:bodyPr/>
+          <a:lstStyle/>
+          <a:p>
+            <a:endParaRPr lang="en-CA"/>
+          </a:p>
+        </p:txBody>
+      </p:sp>
+    </p:spTree>
+    <p:extLst>
+      <p:ext uri="{BB962C8B-B14F-4D97-AF65-F5344CB8AC3E}">
+        <p14:creationId xmlns:p14="http://schemas.microsoft.com/office/powerpoint/2010/main" val="3966488039"/>
+      </p:ext>
+    </p:extLst>
+  </p:cSld>
+  <p:clrMapOvr>
+    <a:masterClrMapping/>
+  </p:clrMapOvr>
+</p:sld>
+</file>
+
+<file path=ppt/slides/slide15.xml><?xml version="1.0" encoding="utf-8"?>
+<p:sld xmlns:a="http://schemas.openxmlformats.org/drawingml/2006/main" xmlns:r="http://schemas.openxmlformats.org/officeDocument/2006/relationships" xmlns:p="http://schemas.openxmlformats.org/presentationml/2006/main">
+  <p:cSld>
+    <p:spTree>
+      <p:nvGrpSpPr>
+        <p:cNvPr id="1" name=""/>
+        <p:cNvGrpSpPr/>
+        <p:nvPr/>
+      </p:nvGrpSpPr>
+      <p:grpSpPr>
+        <a:xfrm>
+          <a:off x="0" y="0"/>
+          <a:ext cx="0" cy="0"/>
+          <a:chOff x="0" y="0"/>
+          <a:chExt cx="0" cy="0"/>
+        </a:xfrm>
+      </p:grpSpPr>
+      <p:sp>
+        <p:nvSpPr>
+          <p:cNvPr id="2" name="Title 1">
+            <a:extLst>
+              <a:ext uri="{FF2B5EF4-FFF2-40B4-BE49-F238E27FC236}">
+                <a16:creationId xmlns:a16="http://schemas.microsoft.com/office/drawing/2014/main" id="{A46EB721-D92D-34D3-1523-E5F037A6470F}"/>
+              </a:ext>
+            </a:extLst>
+          </p:cNvPr>
+          <p:cNvSpPr>
+            <a:spLocks noGrp="1"/>
+          </p:cNvSpPr>
+          <p:nvPr>
+            <p:ph type="title"/>
+          </p:nvPr>
+        </p:nvSpPr>
+        <p:spPr/>
+        <p:txBody>
+          <a:bodyPr/>
+          <a:lstStyle/>
+          <a:p>
+            <a:r>
+              <a:rPr lang="en-CA" dirty="0"/>
+              <a:t>FUTURE PLANS</a:t>
+            </a:r>
+          </a:p>
+        </p:txBody>
+      </p:sp>
+      <p:sp>
+        <p:nvSpPr>
+          <p:cNvPr id="3" name="Content Placeholder 2">
+            <a:extLst>
+              <a:ext uri="{FF2B5EF4-FFF2-40B4-BE49-F238E27FC236}">
+                <a16:creationId xmlns:a16="http://schemas.microsoft.com/office/drawing/2014/main" id="{E8F051E9-66DD-440A-1D1A-45960DC18F3F}"/>
+              </a:ext>
+            </a:extLst>
+          </p:cNvPr>
+          <p:cNvSpPr>
+            <a:spLocks noGrp="1"/>
+          </p:cNvSpPr>
+          <p:nvPr>
+            <p:ph idx="1"/>
+          </p:nvPr>
+        </p:nvSpPr>
+        <p:spPr/>
+        <p:txBody>
+          <a:bodyPr/>
+          <a:lstStyle/>
+          <a:p>
+            <a:endParaRPr lang="en-CA"/>
+          </a:p>
+        </p:txBody>
+      </p:sp>
+    </p:spTree>
+    <p:extLst>
+      <p:ext uri="{BB962C8B-B14F-4D97-AF65-F5344CB8AC3E}">
+        <p14:creationId xmlns:p14="http://schemas.microsoft.com/office/powerpoint/2010/main" val="1793765436"/>
+      </p:ext>
+    </p:extLst>
+  </p:cSld>
+  <p:clrMapOvr>
+    <a:masterClrMapping/>
+  </p:clrMapOvr>
+</p:sld>
+</file>
+
 <file path=ppt/slides/slide2.xml><?xml version="1.0" encoding="utf-8"?>
 <p:sld xmlns:a="http://schemas.openxmlformats.org/drawingml/2006/main" xmlns:r="http://schemas.openxmlformats.org/officeDocument/2006/relationships" xmlns:p="http://schemas.openxmlformats.org/presentationml/2006/main">
   <p:cSld>
@@ -4377,6 +6659,706 @@
           <p:cNvPr id="2" name="Title 1">
             <a:extLst>
               <a:ext uri="{FF2B5EF4-FFF2-40B4-BE49-F238E27FC236}">
+                <a16:creationId xmlns:a16="http://schemas.microsoft.com/office/drawing/2014/main" id="{A10AF237-F5FA-D561-A35E-D9602B2E504C}"/>
+              </a:ext>
+            </a:extLst>
+          </p:cNvPr>
+          <p:cNvSpPr>
+            <a:spLocks noGrp="1"/>
+          </p:cNvSpPr>
+          <p:nvPr>
+            <p:ph type="title"/>
+          </p:nvPr>
+        </p:nvSpPr>
+        <p:spPr/>
+        <p:txBody>
+          <a:bodyPr/>
+          <a:lstStyle/>
+          <a:p>
+            <a:r>
+              <a:rPr lang="en-CA" dirty="0"/>
+              <a:t>ACE-FTS</a:t>
+            </a:r>
+          </a:p>
+        </p:txBody>
+      </p:sp>
+      <p:sp>
+        <p:nvSpPr>
+          <p:cNvPr id="3" name="Content Placeholder 2">
+            <a:extLst>
+              <a:ext uri="{FF2B5EF4-FFF2-40B4-BE49-F238E27FC236}">
+                <a16:creationId xmlns:a16="http://schemas.microsoft.com/office/drawing/2014/main" id="{C98573D0-F533-77A5-F747-9017C082053A}"/>
+              </a:ext>
+            </a:extLst>
+          </p:cNvPr>
+          <p:cNvSpPr>
+            <a:spLocks noGrp="1"/>
+          </p:cNvSpPr>
+          <p:nvPr>
+            <p:ph idx="1"/>
+          </p:nvPr>
+        </p:nvSpPr>
+        <p:spPr/>
+        <p:txBody>
+          <a:bodyPr/>
+          <a:lstStyle/>
+          <a:p>
+            <a:r>
+              <a:rPr lang="en-CA" dirty="0"/>
+              <a:t>ACE-FTS is one of the two main instruments on the SCI-SAT</a:t>
+            </a:r>
+          </a:p>
+          <a:p>
+            <a:r>
+              <a:rPr lang="en-CA" dirty="0"/>
+              <a:t>SCI-SAT was launched in 2003</a:t>
+            </a:r>
+          </a:p>
+          <a:p>
+            <a:r>
+              <a:rPr lang="en-CA" dirty="0"/>
+              <a:t>ACE-FTS measures in the limb viewing geometry</a:t>
+            </a:r>
+          </a:p>
+          <a:p>
+            <a:r>
+              <a:rPr lang="en-CA" dirty="0"/>
+              <a:t>ACE-FTS uses Fourier Transform to produce absorption spectra</a:t>
+            </a:r>
+          </a:p>
+          <a:p>
+            <a:r>
+              <a:rPr lang="en-CA" dirty="0"/>
+              <a:t>ACE-FTS operates in the wavenumber range: 750–4400 cm</a:t>
+            </a:r>
+            <a:r>
+              <a:rPr lang="en-CA" baseline="30000" dirty="0"/>
+              <a:t>−1 </a:t>
+            </a:r>
+          </a:p>
+          <a:p>
+            <a:endParaRPr lang="en-CA" dirty="0"/>
+          </a:p>
+          <a:p>
+            <a:endParaRPr lang="en-CA" dirty="0"/>
+          </a:p>
+        </p:txBody>
+      </p:sp>
+      <p:sp>
+        <p:nvSpPr>
+          <p:cNvPr id="5" name="TextBox 4">
+            <a:extLst>
+              <a:ext uri="{FF2B5EF4-FFF2-40B4-BE49-F238E27FC236}">
+                <a16:creationId xmlns:a16="http://schemas.microsoft.com/office/drawing/2014/main" id="{DFDD764A-EDD7-ACBB-21CA-873C557B1452}"/>
+              </a:ext>
+            </a:extLst>
+          </p:cNvPr>
+          <p:cNvSpPr txBox="1"/>
+          <p:nvPr/>
+        </p:nvSpPr>
+        <p:spPr>
+          <a:xfrm>
+            <a:off x="457200" y="6126480"/>
+            <a:ext cx="8226932" cy="246221"/>
+          </a:xfrm>
+          <a:prstGeom prst="rect">
+            <a:avLst/>
+          </a:prstGeom>
+          <a:noFill/>
+        </p:spPr>
+        <p:txBody>
+          <a:bodyPr wrap="none">
+            <a:spAutoFit/>
+          </a:bodyPr>
+          <a:lstStyle/>
+          <a:p>
+            <a:r>
+              <a:rPr lang="en-CA" sz="1000" dirty="0">
+                <a:solidFill>
+                  <a:srgbClr val="646464"/>
+                </a:solidFill>
+              </a:rPr>
+              <a:t>1. </a:t>
+            </a:r>
+            <a:r>
+              <a:rPr lang="en-US" sz="1000" dirty="0">
+                <a:solidFill>
+                  <a:srgbClr val="646464"/>
+                </a:solidFill>
+              </a:rPr>
+              <a:t>Bernath, P. F., et al. (2005), Atmospheric Chemistry Experiment (ACE): Mission overview, </a:t>
+            </a:r>
+            <a:r>
+              <a:rPr lang="en-US" sz="1000" dirty="0" err="1">
+                <a:solidFill>
+                  <a:srgbClr val="646464"/>
+                </a:solidFill>
+              </a:rPr>
+              <a:t>Geophys</a:t>
+            </a:r>
+            <a:r>
+              <a:rPr lang="en-US" sz="1000" dirty="0">
+                <a:solidFill>
+                  <a:srgbClr val="646464"/>
+                </a:solidFill>
+              </a:rPr>
+              <a:t>. Res. Lett., 32, L15S01, doi:10.1029/2005GL022386</a:t>
+            </a:r>
+            <a:endParaRPr sz="1000" dirty="0">
+              <a:solidFill>
+                <a:srgbClr val="646464"/>
+              </a:solidFill>
+            </a:endParaRPr>
+          </a:p>
+        </p:txBody>
+      </p:sp>
+    </p:spTree>
+    <p:extLst>
+      <p:ext uri="{BB962C8B-B14F-4D97-AF65-F5344CB8AC3E}">
+        <p14:creationId xmlns:p14="http://schemas.microsoft.com/office/powerpoint/2010/main" val="3115839712"/>
+      </p:ext>
+    </p:extLst>
+  </p:cSld>
+  <p:clrMapOvr>
+    <a:masterClrMapping/>
+  </p:clrMapOvr>
+</p:sld>
+</file>
+
+<file path=ppt/slides/slide5.xml><?xml version="1.0" encoding="utf-8"?>
+<p:sld xmlns:a="http://schemas.openxmlformats.org/drawingml/2006/main" xmlns:r="http://schemas.openxmlformats.org/officeDocument/2006/relationships" xmlns:p="http://schemas.openxmlformats.org/presentationml/2006/main">
+  <p:cSld>
+    <p:spTree>
+      <p:nvGrpSpPr>
+        <p:cNvPr id="1" name=""/>
+        <p:cNvGrpSpPr/>
+        <p:nvPr/>
+      </p:nvGrpSpPr>
+      <p:grpSpPr>
+        <a:xfrm>
+          <a:off x="0" y="0"/>
+          <a:ext cx="0" cy="0"/>
+          <a:chOff x="0" y="0"/>
+          <a:chExt cx="0" cy="0"/>
+        </a:xfrm>
+      </p:grpSpPr>
+      <p:sp>
+        <p:nvSpPr>
+          <p:cNvPr id="2" name="Title 1">
+            <a:extLst>
+              <a:ext uri="{FF2B5EF4-FFF2-40B4-BE49-F238E27FC236}">
+                <a16:creationId xmlns:a16="http://schemas.microsoft.com/office/drawing/2014/main" id="{0AB5D44B-E76F-8C50-8F71-67FA4C8EC1FD}"/>
+              </a:ext>
+            </a:extLst>
+          </p:cNvPr>
+          <p:cNvSpPr>
+            <a:spLocks noGrp="1"/>
+          </p:cNvSpPr>
+          <p:nvPr>
+            <p:ph type="title"/>
+          </p:nvPr>
+        </p:nvSpPr>
+        <p:spPr/>
+        <p:txBody>
+          <a:bodyPr/>
+          <a:lstStyle/>
+          <a:p>
+            <a:r>
+              <a:rPr lang="en-CA" dirty="0"/>
+              <a:t>ACE-FTS Measurement geometry</a:t>
+            </a:r>
+          </a:p>
+        </p:txBody>
+      </p:sp>
+      <p:pic>
+        <p:nvPicPr>
+          <p:cNvPr id="5" name="Content Placeholder 4">
+            <a:extLst>
+              <a:ext uri="{FF2B5EF4-FFF2-40B4-BE49-F238E27FC236}">
+                <a16:creationId xmlns:a16="http://schemas.microsoft.com/office/drawing/2014/main" id="{5093AC52-076A-19B3-548B-24FB5D266B1C}"/>
+              </a:ext>
+            </a:extLst>
+          </p:cNvPr>
+          <p:cNvPicPr>
+            <a:picLocks noGrp="1" noChangeAspect="1"/>
+          </p:cNvPicPr>
+          <p:nvPr>
+            <p:ph idx="1"/>
+          </p:nvPr>
+        </p:nvPicPr>
+        <p:blipFill>
+          <a:blip r:embed="rId3"/>
+          <a:stretch>
+            <a:fillRect/>
+          </a:stretch>
+        </p:blipFill>
+        <p:spPr>
+          <a:xfrm>
+            <a:off x="2495031" y="2638425"/>
+            <a:ext cx="7201938" cy="3101975"/>
+          </a:xfrm>
+        </p:spPr>
+      </p:pic>
+    </p:spTree>
+    <p:extLst>
+      <p:ext uri="{BB962C8B-B14F-4D97-AF65-F5344CB8AC3E}">
+        <p14:creationId xmlns:p14="http://schemas.microsoft.com/office/powerpoint/2010/main" val="1802762808"/>
+      </p:ext>
+    </p:extLst>
+  </p:cSld>
+  <p:clrMapOvr>
+    <a:masterClrMapping/>
+  </p:clrMapOvr>
+</p:sld>
+</file>
+
+<file path=ppt/slides/slide6.xml><?xml version="1.0" encoding="utf-8"?>
+<p:sld xmlns:a="http://schemas.openxmlformats.org/drawingml/2006/main" xmlns:r="http://schemas.openxmlformats.org/officeDocument/2006/relationships" xmlns:p="http://schemas.openxmlformats.org/presentationml/2006/main">
+  <p:cSld>
+    <p:spTree>
+      <p:nvGrpSpPr>
+        <p:cNvPr id="1" name=""/>
+        <p:cNvGrpSpPr/>
+        <p:nvPr/>
+      </p:nvGrpSpPr>
+      <p:grpSpPr>
+        <a:xfrm>
+          <a:off x="0" y="0"/>
+          <a:ext cx="0" cy="0"/>
+          <a:chOff x="0" y="0"/>
+          <a:chExt cx="0" cy="0"/>
+        </a:xfrm>
+      </p:grpSpPr>
+      <p:sp>
+        <p:nvSpPr>
+          <p:cNvPr id="2" name="Title 1">
+            <a:extLst>
+              <a:ext uri="{FF2B5EF4-FFF2-40B4-BE49-F238E27FC236}">
+                <a16:creationId xmlns:a16="http://schemas.microsoft.com/office/drawing/2014/main" id="{1AAD20B9-82AF-74D4-AEEC-8835A41FE362}"/>
+              </a:ext>
+            </a:extLst>
+          </p:cNvPr>
+          <p:cNvSpPr>
+            <a:spLocks noGrp="1"/>
+          </p:cNvSpPr>
+          <p:nvPr>
+            <p:ph type="title"/>
+          </p:nvPr>
+        </p:nvSpPr>
+        <p:spPr/>
+        <p:txBody>
+          <a:bodyPr/>
+          <a:lstStyle/>
+          <a:p>
+            <a:r>
+              <a:rPr lang="en-CA" dirty="0"/>
+              <a:t>OSIRIS</a:t>
+            </a:r>
+          </a:p>
+        </p:txBody>
+      </p:sp>
+      <p:sp>
+        <p:nvSpPr>
+          <p:cNvPr id="3" name="Content Placeholder 2">
+            <a:extLst>
+              <a:ext uri="{FF2B5EF4-FFF2-40B4-BE49-F238E27FC236}">
+                <a16:creationId xmlns:a16="http://schemas.microsoft.com/office/drawing/2014/main" id="{127DF538-3A2C-6D79-A95B-94A8B89BF874}"/>
+              </a:ext>
+            </a:extLst>
+          </p:cNvPr>
+          <p:cNvSpPr>
+            <a:spLocks noGrp="1"/>
+          </p:cNvSpPr>
+          <p:nvPr>
+            <p:ph idx="1"/>
+          </p:nvPr>
+        </p:nvSpPr>
+        <p:spPr/>
+        <p:txBody>
+          <a:bodyPr>
+            <a:normAutofit/>
+          </a:bodyPr>
+          <a:lstStyle/>
+          <a:p>
+            <a:r>
+              <a:rPr lang="en-CA" dirty="0"/>
+              <a:t>OSIRIS is on-board the ODIN satellite</a:t>
+            </a:r>
+          </a:p>
+          <a:p>
+            <a:r>
+              <a:rPr lang="en-CA" dirty="0"/>
+              <a:t>ODIN was launched in 2001</a:t>
+            </a:r>
+          </a:p>
+          <a:p>
+            <a:r>
+              <a:rPr lang="en-US" dirty="0"/>
+              <a:t>OSIRIS is also pointed toward the limb of earth’s atmosphere</a:t>
+            </a:r>
+          </a:p>
+          <a:p>
+            <a:r>
+              <a:rPr lang="en-CA" dirty="0"/>
+              <a:t>OS obtains spectra of scattered sunlight over the range: 280–800 nm</a:t>
+            </a:r>
+          </a:p>
+          <a:p>
+            <a:r>
+              <a:rPr lang="en-US" dirty="0"/>
+              <a:t>IRI observes both scattered sunlight and airglow emission</a:t>
+            </a:r>
+            <a:endParaRPr lang="en-CA" dirty="0"/>
+          </a:p>
+        </p:txBody>
+      </p:sp>
+      <p:sp>
+        <p:nvSpPr>
+          <p:cNvPr id="8" name="TextBox 7">
+            <a:extLst>
+              <a:ext uri="{FF2B5EF4-FFF2-40B4-BE49-F238E27FC236}">
+                <a16:creationId xmlns:a16="http://schemas.microsoft.com/office/drawing/2014/main" id="{19DEF9B9-1BB5-DCDB-1CB4-24979F5354BC}"/>
+              </a:ext>
+            </a:extLst>
+          </p:cNvPr>
+          <p:cNvSpPr txBox="1"/>
+          <p:nvPr/>
+        </p:nvSpPr>
+        <p:spPr>
+          <a:xfrm>
+            <a:off x="457200" y="6126480"/>
+            <a:ext cx="8922635" cy="400110"/>
+          </a:xfrm>
+          <a:prstGeom prst="rect">
+            <a:avLst/>
+          </a:prstGeom>
+          <a:noFill/>
+        </p:spPr>
+        <p:txBody>
+          <a:bodyPr wrap="none">
+            <a:spAutoFit/>
+          </a:bodyPr>
+          <a:lstStyle/>
+          <a:p>
+            <a:pPr marL="228600" indent="-228600">
+              <a:buAutoNum type="arabicPeriod"/>
+            </a:pPr>
+            <a:r>
+              <a:rPr lang="en-US" sz="1000" dirty="0">
+                <a:solidFill>
+                  <a:srgbClr val="646464"/>
+                </a:solidFill>
+              </a:rPr>
+              <a:t>McLinden, C. A., and Coauthors, 2012: OSIRIS: A Decade of Scattered Light. Bull. Amer. Meteor. Soc., 93, 1845–1863, https://doi.org/10.1175/BAMS-D-11-00135.1</a:t>
+            </a:r>
+          </a:p>
+          <a:p>
+            <a:pPr marL="228600" indent="-228600">
+              <a:buAutoNum type="arabicPeriod"/>
+            </a:pPr>
+            <a:r>
+              <a:rPr lang="en-US" sz="1000" dirty="0">
+                <a:solidFill>
+                  <a:srgbClr val="646464"/>
+                </a:solidFill>
+              </a:rPr>
+              <a:t>Llewellyn, E. J., et al. 2004. The OSIRIS instrument on the Odin spacecraft. Canadian Journal of Physics. 82(6): 411-422. https://doi.org/10.1139/p04-005</a:t>
+            </a:r>
+          </a:p>
+        </p:txBody>
+      </p:sp>
+    </p:spTree>
+    <p:extLst>
+      <p:ext uri="{BB962C8B-B14F-4D97-AF65-F5344CB8AC3E}">
+        <p14:creationId xmlns:p14="http://schemas.microsoft.com/office/powerpoint/2010/main" val="1698663498"/>
+      </p:ext>
+    </p:extLst>
+  </p:cSld>
+  <p:clrMapOvr>
+    <a:masterClrMapping/>
+  </p:clrMapOvr>
+</p:sld>
+</file>
+
+<file path=ppt/slides/slide7.xml><?xml version="1.0" encoding="utf-8"?>
+<p:sld xmlns:a="http://schemas.openxmlformats.org/drawingml/2006/main" xmlns:r="http://schemas.openxmlformats.org/officeDocument/2006/relationships" xmlns:p="http://schemas.openxmlformats.org/presentationml/2006/main">
+  <p:cSld>
+    <p:spTree>
+      <p:nvGrpSpPr>
+        <p:cNvPr id="1" name=""/>
+        <p:cNvGrpSpPr/>
+        <p:nvPr/>
+      </p:nvGrpSpPr>
+      <p:grpSpPr>
+        <a:xfrm>
+          <a:off x="0" y="0"/>
+          <a:ext cx="0" cy="0"/>
+          <a:chOff x="0" y="0"/>
+          <a:chExt cx="0" cy="0"/>
+        </a:xfrm>
+      </p:grpSpPr>
+      <p:sp>
+        <p:nvSpPr>
+          <p:cNvPr id="2" name="Title 1">
+            <a:extLst>
+              <a:ext uri="{FF2B5EF4-FFF2-40B4-BE49-F238E27FC236}">
+                <a16:creationId xmlns:a16="http://schemas.microsoft.com/office/drawing/2014/main" id="{7FF0FC23-4914-3EA5-8765-713C6EE3180A}"/>
+              </a:ext>
+            </a:extLst>
+          </p:cNvPr>
+          <p:cNvSpPr>
+            <a:spLocks noGrp="1"/>
+          </p:cNvSpPr>
+          <p:nvPr>
+            <p:ph type="title"/>
+          </p:nvPr>
+        </p:nvSpPr>
+        <p:spPr/>
+        <p:txBody>
+          <a:bodyPr/>
+          <a:lstStyle/>
+          <a:p>
+            <a:r>
+              <a:rPr lang="en-CA" dirty="0"/>
+              <a:t>OSIRIS MEASUREMENT GEOMETRY</a:t>
+            </a:r>
+          </a:p>
+        </p:txBody>
+      </p:sp>
+      <p:pic>
+        <p:nvPicPr>
+          <p:cNvPr id="9" name="Content Placeholder 8">
+            <a:extLst>
+              <a:ext uri="{FF2B5EF4-FFF2-40B4-BE49-F238E27FC236}">
+                <a16:creationId xmlns:a16="http://schemas.microsoft.com/office/drawing/2014/main" id="{58A53F7E-36DE-6D3E-9C02-3E148F2EFD41}"/>
+              </a:ext>
+            </a:extLst>
+          </p:cNvPr>
+          <p:cNvPicPr>
+            <a:picLocks noGrp="1" noChangeAspect="1"/>
+          </p:cNvPicPr>
+          <p:nvPr>
+            <p:ph idx="1"/>
+          </p:nvPr>
+        </p:nvPicPr>
+        <p:blipFill>
+          <a:blip r:embed="rId2"/>
+          <a:stretch>
+            <a:fillRect/>
+          </a:stretch>
+        </p:blipFill>
+        <p:spPr>
+          <a:xfrm>
+            <a:off x="2230438" y="2696769"/>
+            <a:ext cx="7731125" cy="2985286"/>
+          </a:xfrm>
+        </p:spPr>
+      </p:pic>
+    </p:spTree>
+    <p:extLst>
+      <p:ext uri="{BB962C8B-B14F-4D97-AF65-F5344CB8AC3E}">
+        <p14:creationId xmlns:p14="http://schemas.microsoft.com/office/powerpoint/2010/main" val="3022207675"/>
+      </p:ext>
+    </p:extLst>
+  </p:cSld>
+  <p:clrMapOvr>
+    <a:masterClrMapping/>
+  </p:clrMapOvr>
+</p:sld>
+</file>
+
+<file path=ppt/slides/slide8.xml><?xml version="1.0" encoding="utf-8"?>
+<p:sld xmlns:a="http://schemas.openxmlformats.org/drawingml/2006/main" xmlns:r="http://schemas.openxmlformats.org/officeDocument/2006/relationships" xmlns:p="http://schemas.openxmlformats.org/presentationml/2006/main">
+  <p:cSld>
+    <p:spTree>
+      <p:nvGrpSpPr>
+        <p:cNvPr id="1" name=""/>
+        <p:cNvGrpSpPr/>
+        <p:nvPr/>
+      </p:nvGrpSpPr>
+      <p:grpSpPr>
+        <a:xfrm>
+          <a:off x="0" y="0"/>
+          <a:ext cx="0" cy="0"/>
+          <a:chOff x="0" y="0"/>
+          <a:chExt cx="0" cy="0"/>
+        </a:xfrm>
+      </p:grpSpPr>
+      <p:sp>
+        <p:nvSpPr>
+          <p:cNvPr id="2" name="Title 1">
+            <a:extLst>
+              <a:ext uri="{FF2B5EF4-FFF2-40B4-BE49-F238E27FC236}">
+                <a16:creationId xmlns:a16="http://schemas.microsoft.com/office/drawing/2014/main" id="{4E1D867A-3907-26F3-B77B-2E6213623970}"/>
+              </a:ext>
+            </a:extLst>
+          </p:cNvPr>
+          <p:cNvSpPr>
+            <a:spLocks noGrp="1"/>
+          </p:cNvSpPr>
+          <p:nvPr>
+            <p:ph type="title"/>
+          </p:nvPr>
+        </p:nvSpPr>
+        <p:spPr/>
+        <p:txBody>
+          <a:bodyPr/>
+          <a:lstStyle/>
+          <a:p>
+            <a:r>
+              <a:rPr lang="en-CA" dirty="0"/>
+              <a:t>PEARL FTIR</a:t>
+            </a:r>
+          </a:p>
+        </p:txBody>
+      </p:sp>
+      <p:sp>
+        <p:nvSpPr>
+          <p:cNvPr id="3" name="Content Placeholder 2">
+            <a:extLst>
+              <a:ext uri="{FF2B5EF4-FFF2-40B4-BE49-F238E27FC236}">
+                <a16:creationId xmlns:a16="http://schemas.microsoft.com/office/drawing/2014/main" id="{EBD5F899-0003-11DD-8D27-1542F1D54871}"/>
+              </a:ext>
+            </a:extLst>
+          </p:cNvPr>
+          <p:cNvSpPr>
+            <a:spLocks noGrp="1"/>
+          </p:cNvSpPr>
+          <p:nvPr>
+            <p:ph idx="1"/>
+          </p:nvPr>
+        </p:nvSpPr>
+        <p:spPr/>
+        <p:txBody>
+          <a:bodyPr/>
+          <a:lstStyle/>
+          <a:p>
+            <a:r>
+              <a:rPr lang="en-CA" dirty="0"/>
+              <a:t>Also known as Bruker FTIR</a:t>
+            </a:r>
+          </a:p>
+          <a:p>
+            <a:r>
+              <a:rPr lang="en-CA" dirty="0"/>
+              <a:t>Installed permanently at PEARL in July, 2006</a:t>
+            </a:r>
+          </a:p>
+          <a:p>
+            <a:r>
+              <a:rPr lang="en-CA" dirty="0"/>
+              <a:t>Measures atmospheric solar absorption while the sun is up</a:t>
+            </a:r>
+          </a:p>
+          <a:p>
+            <a:r>
+              <a:rPr lang="en-CA" dirty="0"/>
+              <a:t>Wavenumber ranges: 1800-8500 cm</a:t>
+            </a:r>
+            <a:r>
+              <a:rPr lang="en-CA" baseline="30000" dirty="0"/>
+              <a:t>-1 </a:t>
+            </a:r>
+            <a:r>
+              <a:rPr lang="en-CA" dirty="0"/>
+              <a:t>and</a:t>
+            </a:r>
+            <a:r>
+              <a:rPr lang="en-CA" baseline="30000" dirty="0"/>
+              <a:t> </a:t>
+            </a:r>
+            <a:r>
+              <a:rPr lang="en-CA" dirty="0"/>
+              <a:t>500-5000 cm</a:t>
+            </a:r>
+            <a:r>
+              <a:rPr lang="en-CA" baseline="30000" dirty="0"/>
+              <a:t>-1</a:t>
+            </a:r>
+            <a:endParaRPr lang="en-CA" dirty="0"/>
+          </a:p>
+          <a:p>
+            <a:endParaRPr lang="en-CA" dirty="0"/>
+          </a:p>
+        </p:txBody>
+      </p:sp>
+      <p:sp>
+        <p:nvSpPr>
+          <p:cNvPr id="4" name="TextBox 3">
+            <a:extLst>
+              <a:ext uri="{FF2B5EF4-FFF2-40B4-BE49-F238E27FC236}">
+                <a16:creationId xmlns:a16="http://schemas.microsoft.com/office/drawing/2014/main" id="{6F5125E3-CA90-5995-4C23-D4F6B9782029}"/>
+              </a:ext>
+            </a:extLst>
+          </p:cNvPr>
+          <p:cNvSpPr txBox="1"/>
+          <p:nvPr/>
+        </p:nvSpPr>
+        <p:spPr>
+          <a:xfrm>
+            <a:off x="457200" y="6126480"/>
+            <a:ext cx="4036682" cy="246221"/>
+          </a:xfrm>
+          <a:prstGeom prst="rect">
+            <a:avLst/>
+          </a:prstGeom>
+          <a:noFill/>
+        </p:spPr>
+        <p:txBody>
+          <a:bodyPr wrap="none">
+            <a:spAutoFit/>
+          </a:bodyPr>
+          <a:lstStyle/>
+          <a:p>
+            <a:pPr marL="228600" indent="-228600">
+              <a:buAutoNum type="arabicPeriod"/>
+            </a:pPr>
+            <a:r>
+              <a:rPr lang="en-US" sz="1000" dirty="0">
+                <a:solidFill>
+                  <a:srgbClr val="646464"/>
+                </a:solidFill>
+              </a:rPr>
+              <a:t>https://eureka.physics.utoronto.ca/Eureka2020/Our_Instruments.html</a:t>
+            </a:r>
+          </a:p>
+        </p:txBody>
+      </p:sp>
+    </p:spTree>
+    <p:extLst>
+      <p:ext uri="{BB962C8B-B14F-4D97-AF65-F5344CB8AC3E}">
+        <p14:creationId xmlns:p14="http://schemas.microsoft.com/office/powerpoint/2010/main" val="1720524664"/>
+      </p:ext>
+    </p:extLst>
+  </p:cSld>
+  <p:clrMapOvr>
+    <a:masterClrMapping/>
+  </p:clrMapOvr>
+</p:sld>
+</file>
+
+<file path=ppt/slides/slide9.xml><?xml version="1.0" encoding="utf-8"?>
+<p:sld xmlns:a="http://schemas.openxmlformats.org/drawingml/2006/main" xmlns:r="http://schemas.openxmlformats.org/officeDocument/2006/relationships" xmlns:p="http://schemas.openxmlformats.org/presentationml/2006/main">
+  <p:cSld>
+    <p:spTree>
+      <p:nvGrpSpPr>
+        <p:cNvPr id="1" name=""/>
+        <p:cNvGrpSpPr/>
+        <p:nvPr/>
+      </p:nvGrpSpPr>
+      <p:grpSpPr>
+        <a:xfrm>
+          <a:off x="0" y="0"/>
+          <a:ext cx="0" cy="0"/>
+          <a:chOff x="0" y="0"/>
+          <a:chExt cx="0" cy="0"/>
+        </a:xfrm>
+      </p:grpSpPr>
+      <p:sp>
+        <p:nvSpPr>
+          <p:cNvPr id="2" name="Title 1">
+            <a:extLst>
+              <a:ext uri="{FF2B5EF4-FFF2-40B4-BE49-F238E27FC236}">
                 <a16:creationId xmlns:a16="http://schemas.microsoft.com/office/drawing/2014/main" id="{228F138A-B317-6587-5172-0DFDDFB41F5C}"/>
               </a:ext>
             </a:extLst>
@@ -4420,6 +7402,12 @@
         <p:txBody>
           <a:bodyPr/>
           <a:lstStyle/>
+          <a:p>
+            <a:r>
+              <a:rPr lang="en-CA" dirty="0"/>
+              <a:t>First Tasks: Read research papers and learn atmospheric chemistry</a:t>
+            </a:r>
+          </a:p>
           <a:p>
             <a:endParaRPr lang="en-CA" dirty="0"/>
           </a:p>

</xml_diff>

<commit_message>
Made new images with correct titles and some pearl ftir AVK analysis, midterm presentation, etc
</commit_message>
<xml_diff>
--- a/Midterm Presentation.pptx
+++ b/Midterm Presentation.pptx
@@ -5,7 +5,7 @@
     <p:sldMasterId id="2147483696" r:id="rId1"/>
   </p:sldMasterIdLst>
   <p:notesMasterIdLst>
-    <p:notesMasterId r:id="rId17"/>
+    <p:notesMasterId r:id="rId22"/>
   </p:notesMasterIdLst>
   <p:sldIdLst>
     <p:sldId id="256" r:id="rId2"/>
@@ -17,12 +17,17 @@
     <p:sldId id="264" r:id="rId8"/>
     <p:sldId id="262" r:id="rId9"/>
     <p:sldId id="258" r:id="rId10"/>
-    <p:sldId id="265" r:id="rId11"/>
-    <p:sldId id="266" r:id="rId12"/>
-    <p:sldId id="267" r:id="rId13"/>
+    <p:sldId id="272" r:id="rId11"/>
+    <p:sldId id="265" r:id="rId12"/>
+    <p:sldId id="266" r:id="rId13"/>
     <p:sldId id="268" r:id="rId14"/>
-    <p:sldId id="269" r:id="rId15"/>
-    <p:sldId id="270" r:id="rId16"/>
+    <p:sldId id="267" r:id="rId15"/>
+    <p:sldId id="269" r:id="rId16"/>
+    <p:sldId id="274" r:id="rId17"/>
+    <p:sldId id="273" r:id="rId18"/>
+    <p:sldId id="276" r:id="rId19"/>
+    <p:sldId id="270" r:id="rId20"/>
+    <p:sldId id="277" r:id="rId21"/>
   </p:sldIdLst>
   <p:sldSz cx="12192000" cy="6858000"/>
   <p:notesSz cx="6858000" cy="9144000"/>
@@ -132,13 +137,634 @@
 <file path=ppt/revisionInfo.xml><?xml version="1.0" encoding="utf-8"?>
 <p1510:revInfo xmlns:a="http://schemas.openxmlformats.org/drawingml/2006/main" xmlns:r="http://schemas.openxmlformats.org/officeDocument/2006/relationships" xmlns:p1510="http://schemas.microsoft.com/office/powerpoint/2015/10/main">
   <p1510:revLst>
-    <p1510:client id="{2C357A54-8BD3-45C1-896A-A820E7B30042}" v="94" dt="2025-06-25T22:23:44.843"/>
+    <p1510:client id="{449313F3-D860-4324-82A4-2CDF33DE5E0B}" v="494" dt="2025-07-03T15:54:02.083"/>
   </p1510:revLst>
 </p1510:revInfo>
 </file>
 
 <file path=ppt/changesInfos/changesInfo1.xml><?xml version="1.0" encoding="utf-8"?>
 <pc:chgInfo xmlns:a="http://schemas.openxmlformats.org/drawingml/2006/main" xmlns:r="http://schemas.openxmlformats.org/officeDocument/2006/relationships" xmlns:ac="http://schemas.microsoft.com/office/drawing/2013/main/command" xmlns:pc="http://schemas.microsoft.com/office/powerpoint/2013/main/command">
+  <pc:docChgLst>
+    <pc:chgData name="Sallam Saka" userId="f204d973-d51e-47d8-884c-bdcba18d93b4" providerId="ADAL" clId="{449313F3-D860-4324-82A4-2CDF33DE5E0B}"/>
+    <pc:docChg chg="undo custSel addSld delSld modSld sldOrd">
+      <pc:chgData name="Sallam Saka" userId="f204d973-d51e-47d8-884c-bdcba18d93b4" providerId="ADAL" clId="{449313F3-D860-4324-82A4-2CDF33DE5E0B}" dt="2025-07-03T15:55:23.214" v="2699" actId="680"/>
+      <pc:docMkLst>
+        <pc:docMk/>
+      </pc:docMkLst>
+      <pc:sldChg chg="modSp mod modNotesTx">
+        <pc:chgData name="Sallam Saka" userId="f204d973-d51e-47d8-884c-bdcba18d93b4" providerId="ADAL" clId="{449313F3-D860-4324-82A4-2CDF33DE5E0B}" dt="2025-07-03T14:50:20.836" v="411" actId="20577"/>
+        <pc:sldMkLst>
+          <pc:docMk/>
+          <pc:sldMk cId="3785794011" sldId="258"/>
+        </pc:sldMkLst>
+        <pc:spChg chg="mod">
+          <ac:chgData name="Sallam Saka" userId="f204d973-d51e-47d8-884c-bdcba18d93b4" providerId="ADAL" clId="{449313F3-D860-4324-82A4-2CDF33DE5E0B}" dt="2025-07-03T14:19:50.389" v="65" actId="20577"/>
+          <ac:spMkLst>
+            <pc:docMk/>
+            <pc:sldMk cId="3785794011" sldId="258"/>
+            <ac:spMk id="3" creationId="{98C48321-60F6-D765-157A-57E04F264760}"/>
+          </ac:spMkLst>
+        </pc:spChg>
+      </pc:sldChg>
+      <pc:sldChg chg="modSp mod modNotesTx">
+        <pc:chgData name="Sallam Saka" userId="f204d973-d51e-47d8-884c-bdcba18d93b4" providerId="ADAL" clId="{449313F3-D860-4324-82A4-2CDF33DE5E0B}" dt="2025-07-03T14:49:51.229" v="409" actId="20577"/>
+        <pc:sldMkLst>
+          <pc:docMk/>
+          <pc:sldMk cId="326719808" sldId="259"/>
+        </pc:sldMkLst>
+        <pc:spChg chg="mod">
+          <ac:chgData name="Sallam Saka" userId="f204d973-d51e-47d8-884c-bdcba18d93b4" providerId="ADAL" clId="{449313F3-D860-4324-82A4-2CDF33DE5E0B}" dt="2025-07-03T14:49:07.006" v="306" actId="313"/>
+          <ac:spMkLst>
+            <pc:docMk/>
+            <pc:sldMk cId="326719808" sldId="259"/>
+            <ac:spMk id="3" creationId="{83D43D85-A5FA-277E-0DEE-2D0D16A57C8E}"/>
+          </ac:spMkLst>
+        </pc:spChg>
+      </pc:sldChg>
+      <pc:sldChg chg="modSp mod ord modNotesTx">
+        <pc:chgData name="Sallam Saka" userId="f204d973-d51e-47d8-884c-bdcba18d93b4" providerId="ADAL" clId="{449313F3-D860-4324-82A4-2CDF33DE5E0B}" dt="2025-07-03T15:39:04.709" v="2404" actId="20577"/>
+        <pc:sldMkLst>
+          <pc:docMk/>
+          <pc:sldMk cId="56333691" sldId="267"/>
+        </pc:sldMkLst>
+        <pc:spChg chg="mod">
+          <ac:chgData name="Sallam Saka" userId="f204d973-d51e-47d8-884c-bdcba18d93b4" providerId="ADAL" clId="{449313F3-D860-4324-82A4-2CDF33DE5E0B}" dt="2025-07-03T14:52:38.775" v="426" actId="20577"/>
+          <ac:spMkLst>
+            <pc:docMk/>
+            <pc:sldMk cId="56333691" sldId="267"/>
+            <ac:spMk id="2" creationId="{B1E33F58-D219-71B0-899C-AC64DA4EA566}"/>
+          </ac:spMkLst>
+        </pc:spChg>
+        <pc:spChg chg="mod">
+          <ac:chgData name="Sallam Saka" userId="f204d973-d51e-47d8-884c-bdcba18d93b4" providerId="ADAL" clId="{449313F3-D860-4324-82A4-2CDF33DE5E0B}" dt="2025-07-03T15:39:04.709" v="2404" actId="20577"/>
+          <ac:spMkLst>
+            <pc:docMk/>
+            <pc:sldMk cId="56333691" sldId="267"/>
+            <ac:spMk id="3" creationId="{02701640-DD03-C95C-2123-D0E1D90D0B9C}"/>
+          </ac:spMkLst>
+        </pc:spChg>
+      </pc:sldChg>
+      <pc:sldChg chg="addSp delSp modSp mod">
+        <pc:chgData name="Sallam Saka" userId="f204d973-d51e-47d8-884c-bdcba18d93b4" providerId="ADAL" clId="{449313F3-D860-4324-82A4-2CDF33DE5E0B}" dt="2025-07-03T14:39:21.604" v="150" actId="164"/>
+        <pc:sldMkLst>
+          <pc:docMk/>
+          <pc:sldMk cId="3182023264" sldId="268"/>
+        </pc:sldMkLst>
+        <pc:grpChg chg="del">
+          <ac:chgData name="Sallam Saka" userId="f204d973-d51e-47d8-884c-bdcba18d93b4" providerId="ADAL" clId="{449313F3-D860-4324-82A4-2CDF33DE5E0B}" dt="2025-07-03T14:26:39.414" v="86" actId="478"/>
+          <ac:grpSpMkLst>
+            <pc:docMk/>
+            <pc:sldMk cId="3182023264" sldId="268"/>
+            <ac:grpSpMk id="11" creationId="{1EC8DB55-7239-3F5D-6BDF-E53F8E8D3C8D}"/>
+          </ac:grpSpMkLst>
+        </pc:grpChg>
+        <pc:grpChg chg="add del mod">
+          <ac:chgData name="Sallam Saka" userId="f204d973-d51e-47d8-884c-bdcba18d93b4" providerId="ADAL" clId="{449313F3-D860-4324-82A4-2CDF33DE5E0B}" dt="2025-07-03T14:34:22.947" v="115" actId="165"/>
+          <ac:grpSpMkLst>
+            <pc:docMk/>
+            <pc:sldMk cId="3182023264" sldId="268"/>
+            <ac:grpSpMk id="13" creationId="{1EFB21E4-47DA-4430-5F04-083FD8982502}"/>
+          </ac:grpSpMkLst>
+        </pc:grpChg>
+        <pc:grpChg chg="add del mod">
+          <ac:chgData name="Sallam Saka" userId="f204d973-d51e-47d8-884c-bdcba18d93b4" providerId="ADAL" clId="{449313F3-D860-4324-82A4-2CDF33DE5E0B}" dt="2025-07-03T14:36:47.265" v="130" actId="165"/>
+          <ac:grpSpMkLst>
+            <pc:docMk/>
+            <pc:sldMk cId="3182023264" sldId="268"/>
+            <ac:grpSpMk id="14" creationId="{E8E2239F-5B8E-557E-9CEC-7E9EACC16458}"/>
+          </ac:grpSpMkLst>
+        </pc:grpChg>
+        <pc:grpChg chg="add mod">
+          <ac:chgData name="Sallam Saka" userId="f204d973-d51e-47d8-884c-bdcba18d93b4" providerId="ADAL" clId="{449313F3-D860-4324-82A4-2CDF33DE5E0B}" dt="2025-07-03T14:39:21.604" v="150" actId="164"/>
+          <ac:grpSpMkLst>
+            <pc:docMk/>
+            <pc:sldMk cId="3182023264" sldId="268"/>
+            <ac:grpSpMk id="17" creationId="{00187752-1694-B4FF-C3A7-D5693840E458}"/>
+          </ac:grpSpMkLst>
+        </pc:grpChg>
+        <pc:picChg chg="add mod topLvl modCrop">
+          <ac:chgData name="Sallam Saka" userId="f204d973-d51e-47d8-884c-bdcba18d93b4" providerId="ADAL" clId="{449313F3-D860-4324-82A4-2CDF33DE5E0B}" dt="2025-07-03T14:39:21.604" v="150" actId="164"/>
+          <ac:picMkLst>
+            <pc:docMk/>
+            <pc:sldMk cId="3182023264" sldId="268"/>
+            <ac:picMk id="3" creationId="{AAC26FC4-6B54-E547-8ADB-6F910639DE07}"/>
+          </ac:picMkLst>
+        </pc:picChg>
+        <pc:picChg chg="add del">
+          <ac:chgData name="Sallam Saka" userId="f204d973-d51e-47d8-884c-bdcba18d93b4" providerId="ADAL" clId="{449313F3-D860-4324-82A4-2CDF33DE5E0B}" dt="2025-07-03T14:27:18.214" v="95" actId="22"/>
+          <ac:picMkLst>
+            <pc:docMk/>
+            <pc:sldMk cId="3182023264" sldId="268"/>
+            <ac:picMk id="5" creationId="{F0791B03-C864-1707-3E0A-7896458FFD00}"/>
+          </ac:picMkLst>
+        </pc:picChg>
+        <pc:picChg chg="add del mod modCrop">
+          <ac:chgData name="Sallam Saka" userId="f204d973-d51e-47d8-884c-bdcba18d93b4" providerId="ADAL" clId="{449313F3-D860-4324-82A4-2CDF33DE5E0B}" dt="2025-07-03T14:29:03.335" v="112" actId="478"/>
+          <ac:picMkLst>
+            <pc:docMk/>
+            <pc:sldMk cId="3182023264" sldId="268"/>
+            <ac:picMk id="7" creationId="{586D2486-3D9B-B484-1826-8BC96F0A8793}"/>
+          </ac:picMkLst>
+        </pc:picChg>
+        <pc:picChg chg="del topLvl">
+          <ac:chgData name="Sallam Saka" userId="f204d973-d51e-47d8-884c-bdcba18d93b4" providerId="ADAL" clId="{449313F3-D860-4324-82A4-2CDF33DE5E0B}" dt="2025-07-03T14:26:39.414" v="86" actId="478"/>
+          <ac:picMkLst>
+            <pc:docMk/>
+            <pc:sldMk cId="3182023264" sldId="268"/>
+            <ac:picMk id="8" creationId="{30D8A99A-11CC-EABE-2789-BBC207CCB786}"/>
+          </ac:picMkLst>
+        </pc:picChg>
+        <pc:picChg chg="del topLvl">
+          <ac:chgData name="Sallam Saka" userId="f204d973-d51e-47d8-884c-bdcba18d93b4" providerId="ADAL" clId="{449313F3-D860-4324-82A4-2CDF33DE5E0B}" dt="2025-07-03T14:26:41.374" v="87" actId="478"/>
+          <ac:picMkLst>
+            <pc:docMk/>
+            <pc:sldMk cId="3182023264" sldId="268"/>
+            <ac:picMk id="9" creationId="{C622486C-FC38-B043-7F3A-F7C1573C4415}"/>
+          </ac:picMkLst>
+        </pc:picChg>
+        <pc:picChg chg="add mod topLvl modCrop">
+          <ac:chgData name="Sallam Saka" userId="f204d973-d51e-47d8-884c-bdcba18d93b4" providerId="ADAL" clId="{449313F3-D860-4324-82A4-2CDF33DE5E0B}" dt="2025-07-03T14:39:21.604" v="150" actId="164"/>
+          <ac:picMkLst>
+            <pc:docMk/>
+            <pc:sldMk cId="3182023264" sldId="268"/>
+            <ac:picMk id="10" creationId="{9C27173B-FD9E-8CB7-8DEA-3C5EC4D86E94}"/>
+          </ac:picMkLst>
+        </pc:picChg>
+      </pc:sldChg>
+      <pc:sldChg chg="addSp delSp modSp mod setBg">
+        <pc:chgData name="Sallam Saka" userId="f204d973-d51e-47d8-884c-bdcba18d93b4" providerId="ADAL" clId="{449313F3-D860-4324-82A4-2CDF33DE5E0B}" dt="2025-07-03T15:21:56.243" v="2042" actId="732"/>
+        <pc:sldMkLst>
+          <pc:docMk/>
+          <pc:sldMk cId="3966488039" sldId="269"/>
+        </pc:sldMkLst>
+        <pc:spChg chg="mod">
+          <ac:chgData name="Sallam Saka" userId="f204d973-d51e-47d8-884c-bdcba18d93b4" providerId="ADAL" clId="{449313F3-D860-4324-82A4-2CDF33DE5E0B}" dt="2025-07-03T15:21:01.685" v="2034" actId="26606"/>
+          <ac:spMkLst>
+            <pc:docMk/>
+            <pc:sldMk cId="3966488039" sldId="269"/>
+            <ac:spMk id="2" creationId="{91BEE49F-B0E2-B8A9-1C93-012209314FE7}"/>
+          </ac:spMkLst>
+        </pc:spChg>
+        <pc:spChg chg="del">
+          <ac:chgData name="Sallam Saka" userId="f204d973-d51e-47d8-884c-bdcba18d93b4" providerId="ADAL" clId="{449313F3-D860-4324-82A4-2CDF33DE5E0B}" dt="2025-07-03T15:19:26.042" v="2021"/>
+          <ac:spMkLst>
+            <pc:docMk/>
+            <pc:sldMk cId="3966488039" sldId="269"/>
+            <ac:spMk id="3" creationId="{A4DD6506-298B-36E0-956E-6628B5F58F7B}"/>
+          </ac:spMkLst>
+        </pc:spChg>
+        <pc:spChg chg="del">
+          <ac:chgData name="Sallam Saka" userId="f204d973-d51e-47d8-884c-bdcba18d93b4" providerId="ADAL" clId="{449313F3-D860-4324-82A4-2CDF33DE5E0B}" dt="2025-07-03T15:19:43.396" v="2022"/>
+          <ac:spMkLst>
+            <pc:docMk/>
+            <pc:sldMk cId="3966488039" sldId="269"/>
+            <ac:spMk id="4" creationId="{F5F495C1-001D-B12A-D9FA-A7C8D9D70E16}"/>
+          </ac:spMkLst>
+        </pc:spChg>
+        <pc:spChg chg="add">
+          <ac:chgData name="Sallam Saka" userId="f204d973-d51e-47d8-884c-bdcba18d93b4" providerId="ADAL" clId="{449313F3-D860-4324-82A4-2CDF33DE5E0B}" dt="2025-07-03T15:21:01.685" v="2034" actId="26606"/>
+          <ac:spMkLst>
+            <pc:docMk/>
+            <pc:sldMk cId="3966488039" sldId="269"/>
+            <ac:spMk id="1032" creationId="{BD9C19B9-2958-1A07-1976-51E8A59D83EE}"/>
+          </ac:spMkLst>
+        </pc:spChg>
+        <pc:spChg chg="add del">
+          <ac:chgData name="Sallam Saka" userId="f204d973-d51e-47d8-884c-bdcba18d93b4" providerId="ADAL" clId="{449313F3-D860-4324-82A4-2CDF33DE5E0B}" dt="2025-07-03T15:20:52.488" v="2031" actId="26606"/>
+          <ac:spMkLst>
+            <pc:docMk/>
+            <pc:sldMk cId="3966488039" sldId="269"/>
+            <ac:spMk id="1033" creationId="{E9F26AF7-9AC1-49A4-8F89-2C63E1C0A0BB}"/>
+          </ac:spMkLst>
+        </pc:spChg>
+        <pc:spChg chg="add del">
+          <ac:chgData name="Sallam Saka" userId="f204d973-d51e-47d8-884c-bdcba18d93b4" providerId="ADAL" clId="{449313F3-D860-4324-82A4-2CDF33DE5E0B}" dt="2025-07-03T15:21:01.685" v="2033" actId="26606"/>
+          <ac:spMkLst>
+            <pc:docMk/>
+            <pc:sldMk cId="3966488039" sldId="269"/>
+            <ac:spMk id="1035" creationId="{2F0F143B-3981-4FC2-BB15-0C5867633489}"/>
+          </ac:spMkLst>
+        </pc:spChg>
+        <pc:picChg chg="add mod ord">
+          <ac:chgData name="Sallam Saka" userId="f204d973-d51e-47d8-884c-bdcba18d93b4" providerId="ADAL" clId="{449313F3-D860-4324-82A4-2CDF33DE5E0B}" dt="2025-07-03T15:21:56.243" v="2042" actId="732"/>
+          <ac:picMkLst>
+            <pc:docMk/>
+            <pc:sldMk cId="3966488039" sldId="269"/>
+            <ac:picMk id="1026" creationId="{B501266F-A2D1-2F1F-B58F-BCCE1FE8A18C}"/>
+          </ac:picMkLst>
+        </pc:picChg>
+        <pc:picChg chg="add mod">
+          <ac:chgData name="Sallam Saka" userId="f204d973-d51e-47d8-884c-bdcba18d93b4" providerId="ADAL" clId="{449313F3-D860-4324-82A4-2CDF33DE5E0B}" dt="2025-07-03T15:21:01.685" v="2034" actId="26606"/>
+          <ac:picMkLst>
+            <pc:docMk/>
+            <pc:sldMk cId="3966488039" sldId="269"/>
+            <ac:picMk id="1028" creationId="{46B3632F-8089-5EA5-33C9-EA5EBFDC79E7}"/>
+          </ac:picMkLst>
+        </pc:picChg>
+        <pc:cxnChg chg="add mod">
+          <ac:chgData name="Sallam Saka" userId="f204d973-d51e-47d8-884c-bdcba18d93b4" providerId="ADAL" clId="{449313F3-D860-4324-82A4-2CDF33DE5E0B}" dt="2025-07-03T15:21:23.392" v="2038" actId="14100"/>
+          <ac:cxnSpMkLst>
+            <pc:docMk/>
+            <pc:sldMk cId="3966488039" sldId="269"/>
+            <ac:cxnSpMk id="5" creationId="{DE1713F3-A061-02C9-BA8F-ABA4E84356C4}"/>
+          </ac:cxnSpMkLst>
+        </pc:cxnChg>
+        <pc:cxnChg chg="add mod">
+          <ac:chgData name="Sallam Saka" userId="f204d973-d51e-47d8-884c-bdcba18d93b4" providerId="ADAL" clId="{449313F3-D860-4324-82A4-2CDF33DE5E0B}" dt="2025-07-03T15:21:39.244" v="2041" actId="14100"/>
+          <ac:cxnSpMkLst>
+            <pc:docMk/>
+            <pc:sldMk cId="3966488039" sldId="269"/>
+            <ac:cxnSpMk id="8" creationId="{E2668E73-A410-0AC3-C4A7-CBE128CAAAEC}"/>
+          </ac:cxnSpMkLst>
+        </pc:cxnChg>
+      </pc:sldChg>
+      <pc:sldChg chg="new del">
+        <pc:chgData name="Sallam Saka" userId="f204d973-d51e-47d8-884c-bdcba18d93b4" providerId="ADAL" clId="{449313F3-D860-4324-82A4-2CDF33DE5E0B}" dt="2025-07-03T14:20:16.975" v="85" actId="47"/>
+        <pc:sldMkLst>
+          <pc:docMk/>
+          <pc:sldMk cId="4167955269" sldId="271"/>
+        </pc:sldMkLst>
+      </pc:sldChg>
+      <pc:sldChg chg="delSp modSp new mod">
+        <pc:chgData name="Sallam Saka" userId="f204d973-d51e-47d8-884c-bdcba18d93b4" providerId="ADAL" clId="{449313F3-D860-4324-82A4-2CDF33DE5E0B}" dt="2025-07-03T14:20:14.767" v="84" actId="20577"/>
+        <pc:sldMkLst>
+          <pc:docMk/>
+          <pc:sldMk cId="4023663782" sldId="272"/>
+        </pc:sldMkLst>
+        <pc:spChg chg="mod">
+          <ac:chgData name="Sallam Saka" userId="f204d973-d51e-47d8-884c-bdcba18d93b4" providerId="ADAL" clId="{449313F3-D860-4324-82A4-2CDF33DE5E0B}" dt="2025-07-03T14:20:14.767" v="84" actId="20577"/>
+          <ac:spMkLst>
+            <pc:docMk/>
+            <pc:sldMk cId="4023663782" sldId="272"/>
+            <ac:spMk id="2" creationId="{62AA0C32-1D6E-6D9B-AA97-2BE9542C392E}"/>
+          </ac:spMkLst>
+        </pc:spChg>
+        <pc:spChg chg="del">
+          <ac:chgData name="Sallam Saka" userId="f204d973-d51e-47d8-884c-bdcba18d93b4" providerId="ADAL" clId="{449313F3-D860-4324-82A4-2CDF33DE5E0B}" dt="2025-07-03T14:20:11.065" v="68" actId="478"/>
+          <ac:spMkLst>
+            <pc:docMk/>
+            <pc:sldMk cId="4023663782" sldId="272"/>
+            <ac:spMk id="3" creationId="{82EFB2D2-9AB5-06CD-45D9-9A787F7D6D57}"/>
+          </ac:spMkLst>
+        </pc:spChg>
+      </pc:sldChg>
+      <pc:sldChg chg="addSp delSp modSp new mod setBg">
+        <pc:chgData name="Sallam Saka" userId="f204d973-d51e-47d8-884c-bdcba18d93b4" providerId="ADAL" clId="{449313F3-D860-4324-82A4-2CDF33DE5E0B}" dt="2025-07-03T15:43:38.883" v="2426" actId="14100"/>
+        <pc:sldMkLst>
+          <pc:docMk/>
+          <pc:sldMk cId="451837092" sldId="273"/>
+        </pc:sldMkLst>
+        <pc:spChg chg="mod">
+          <ac:chgData name="Sallam Saka" userId="f204d973-d51e-47d8-884c-bdcba18d93b4" providerId="ADAL" clId="{449313F3-D860-4324-82A4-2CDF33DE5E0B}" dt="2025-07-03T15:42:41.181" v="2417" actId="26606"/>
+          <ac:spMkLst>
+            <pc:docMk/>
+            <pc:sldMk cId="451837092" sldId="273"/>
+            <ac:spMk id="2" creationId="{AA77E46A-7627-AC51-2442-61975470BFBA}"/>
+          </ac:spMkLst>
+        </pc:spChg>
+        <pc:spChg chg="del">
+          <ac:chgData name="Sallam Saka" userId="f204d973-d51e-47d8-884c-bdcba18d93b4" providerId="ADAL" clId="{449313F3-D860-4324-82A4-2CDF33DE5E0B}" dt="2025-07-03T15:40:36.559" v="2407"/>
+          <ac:spMkLst>
+            <pc:docMk/>
+            <pc:sldMk cId="451837092" sldId="273"/>
+            <ac:spMk id="3" creationId="{9D355623-B7D5-9C42-26E2-698DF758B5AD}"/>
+          </ac:spMkLst>
+        </pc:spChg>
+        <pc:spChg chg="add del">
+          <ac:chgData name="Sallam Saka" userId="f204d973-d51e-47d8-884c-bdcba18d93b4" providerId="ADAL" clId="{449313F3-D860-4324-82A4-2CDF33DE5E0B}" dt="2025-07-03T15:42:05.438" v="2414"/>
+          <ac:spMkLst>
+            <pc:docMk/>
+            <pc:sldMk cId="451837092" sldId="273"/>
+            <ac:spMk id="4" creationId="{B90530F0-5646-B470-6C7A-24E40C5D3D0E}"/>
+          </ac:spMkLst>
+        </pc:spChg>
+        <pc:spChg chg="add mod">
+          <ac:chgData name="Sallam Saka" userId="f204d973-d51e-47d8-884c-bdcba18d93b4" providerId="ADAL" clId="{449313F3-D860-4324-82A4-2CDF33DE5E0B}" dt="2025-07-03T15:42:41.181" v="2417" actId="26606"/>
+          <ac:spMkLst>
+            <pc:docMk/>
+            <pc:sldMk cId="451837092" sldId="273"/>
+            <ac:spMk id="3078" creationId="{1EFC4ECF-2189-7A89-36D7-A5BDA975F03C}"/>
+          </ac:spMkLst>
+        </pc:spChg>
+        <pc:spChg chg="add del">
+          <ac:chgData name="Sallam Saka" userId="f204d973-d51e-47d8-884c-bdcba18d93b4" providerId="ADAL" clId="{449313F3-D860-4324-82A4-2CDF33DE5E0B}" dt="2025-07-03T15:42:03.655" v="2412" actId="26606"/>
+          <ac:spMkLst>
+            <pc:docMk/>
+            <pc:sldMk cId="451837092" sldId="273"/>
+            <ac:spMk id="3080" creationId="{0729A432-5BFD-BEE8-C6A0-A0C98E1E909F}"/>
+          </ac:spMkLst>
+        </pc:spChg>
+        <pc:spChg chg="add del">
+          <ac:chgData name="Sallam Saka" userId="f204d973-d51e-47d8-884c-bdcba18d93b4" providerId="ADAL" clId="{449313F3-D860-4324-82A4-2CDF33DE5E0B}" dt="2025-07-03T15:42:41.181" v="2417" actId="26606"/>
+          <ac:spMkLst>
+            <pc:docMk/>
+            <pc:sldMk cId="451837092" sldId="273"/>
+            <ac:spMk id="3083" creationId="{DCD3F51F-E0F2-41F0-9EAD-111C87DFF5F6}"/>
+          </ac:spMkLst>
+        </pc:spChg>
+        <pc:picChg chg="add mod ord">
+          <ac:chgData name="Sallam Saka" userId="f204d973-d51e-47d8-884c-bdcba18d93b4" providerId="ADAL" clId="{449313F3-D860-4324-82A4-2CDF33DE5E0B}" dt="2025-07-03T15:43:15.601" v="2421" actId="732"/>
+          <ac:picMkLst>
+            <pc:docMk/>
+            <pc:sldMk cId="451837092" sldId="273"/>
+            <ac:picMk id="3074" creationId="{D5E964E1-9D47-A7F4-AF5B-1ED44B821D55}"/>
+          </ac:picMkLst>
+        </pc:picChg>
+        <pc:picChg chg="add mod ord">
+          <ac:chgData name="Sallam Saka" userId="f204d973-d51e-47d8-884c-bdcba18d93b4" providerId="ADAL" clId="{449313F3-D860-4324-82A4-2CDF33DE5E0B}" dt="2025-07-03T15:43:19.448" v="2422" actId="1076"/>
+          <ac:picMkLst>
+            <pc:docMk/>
+            <pc:sldMk cId="451837092" sldId="273"/>
+            <ac:picMk id="3076" creationId="{A048A079-B0DF-B89B-E3E1-B06B643425DD}"/>
+          </ac:picMkLst>
+        </pc:picChg>
+        <pc:cxnChg chg="add mod">
+          <ac:chgData name="Sallam Saka" userId="f204d973-d51e-47d8-884c-bdcba18d93b4" providerId="ADAL" clId="{449313F3-D860-4324-82A4-2CDF33DE5E0B}" dt="2025-07-03T15:40:50.301" v="2410"/>
+          <ac:cxnSpMkLst>
+            <pc:docMk/>
+            <pc:sldMk cId="451837092" sldId="273"/>
+            <ac:cxnSpMk id="5" creationId="{A9FD1876-437D-127A-B272-9ACDF7C469A7}"/>
+          </ac:cxnSpMkLst>
+        </pc:cxnChg>
+        <pc:cxnChg chg="add mod">
+          <ac:chgData name="Sallam Saka" userId="f204d973-d51e-47d8-884c-bdcba18d93b4" providerId="ADAL" clId="{449313F3-D860-4324-82A4-2CDF33DE5E0B}" dt="2025-07-03T15:40:54.958" v="2411"/>
+          <ac:cxnSpMkLst>
+            <pc:docMk/>
+            <pc:sldMk cId="451837092" sldId="273"/>
+            <ac:cxnSpMk id="6" creationId="{99B0F5DD-0296-6C89-5323-277EBDA7A5ED}"/>
+          </ac:cxnSpMkLst>
+        </pc:cxnChg>
+        <pc:cxnChg chg="add mod">
+          <ac:chgData name="Sallam Saka" userId="f204d973-d51e-47d8-884c-bdcba18d93b4" providerId="ADAL" clId="{449313F3-D860-4324-82A4-2CDF33DE5E0B}" dt="2025-07-03T15:43:30.928" v="2424" actId="1076"/>
+          <ac:cxnSpMkLst>
+            <pc:docMk/>
+            <pc:sldMk cId="451837092" sldId="273"/>
+            <ac:cxnSpMk id="7" creationId="{7C27443F-3897-7370-0306-8B7CB6289FF8}"/>
+          </ac:cxnSpMkLst>
+        </pc:cxnChg>
+        <pc:cxnChg chg="add mod">
+          <ac:chgData name="Sallam Saka" userId="f204d973-d51e-47d8-884c-bdcba18d93b4" providerId="ADAL" clId="{449313F3-D860-4324-82A4-2CDF33DE5E0B}" dt="2025-07-03T15:43:38.883" v="2426" actId="14100"/>
+          <ac:cxnSpMkLst>
+            <pc:docMk/>
+            <pc:sldMk cId="451837092" sldId="273"/>
+            <ac:cxnSpMk id="8" creationId="{9714A9EE-ECB4-954C-1103-DF4E46669A82}"/>
+          </ac:cxnSpMkLst>
+        </pc:cxnChg>
+      </pc:sldChg>
+      <pc:sldChg chg="addSp delSp modSp new mod ord setBg modNotesTx">
+        <pc:chgData name="Sallam Saka" userId="f204d973-d51e-47d8-884c-bdcba18d93b4" providerId="ADAL" clId="{449313F3-D860-4324-82A4-2CDF33DE5E0B}" dt="2025-07-03T15:40:12.555" v="2406"/>
+        <pc:sldMkLst>
+          <pc:docMk/>
+          <pc:sldMk cId="1457128146" sldId="274"/>
+        </pc:sldMkLst>
+        <pc:spChg chg="del">
+          <ac:chgData name="Sallam Saka" userId="f204d973-d51e-47d8-884c-bdcba18d93b4" providerId="ADAL" clId="{449313F3-D860-4324-82A4-2CDF33DE5E0B}" dt="2025-07-03T15:24:54.311" v="2046" actId="26606"/>
+          <ac:spMkLst>
+            <pc:docMk/>
+            <pc:sldMk cId="1457128146" sldId="274"/>
+            <ac:spMk id="2" creationId="{87FE06B3-D4E9-BF82-E8D9-4AA91140AA92}"/>
+          </ac:spMkLst>
+        </pc:spChg>
+        <pc:spChg chg="del">
+          <ac:chgData name="Sallam Saka" userId="f204d973-d51e-47d8-884c-bdcba18d93b4" providerId="ADAL" clId="{449313F3-D860-4324-82A4-2CDF33DE5E0B}" dt="2025-07-03T15:24:47.603" v="2045"/>
+          <ac:spMkLst>
+            <pc:docMk/>
+            <pc:sldMk cId="1457128146" sldId="274"/>
+            <ac:spMk id="3" creationId="{BB3AE6EB-0E11-24BD-C8DD-512E6FC545D4}"/>
+          </ac:spMkLst>
+        </pc:spChg>
+        <pc:spChg chg="add">
+          <ac:chgData name="Sallam Saka" userId="f204d973-d51e-47d8-884c-bdcba18d93b4" providerId="ADAL" clId="{449313F3-D860-4324-82A4-2CDF33DE5E0B}" dt="2025-07-03T15:24:54.311" v="2046" actId="26606"/>
+          <ac:spMkLst>
+            <pc:docMk/>
+            <pc:sldMk cId="1457128146" sldId="274"/>
+            <ac:spMk id="2055" creationId="{65041AB2-A9B4-4D3F-B120-38E7860A8F1A}"/>
+          </ac:spMkLst>
+        </pc:spChg>
+        <pc:picChg chg="add mod">
+          <ac:chgData name="Sallam Saka" userId="f204d973-d51e-47d8-884c-bdcba18d93b4" providerId="ADAL" clId="{449313F3-D860-4324-82A4-2CDF33DE5E0B}" dt="2025-07-03T15:24:54.311" v="2046" actId="26606"/>
+          <ac:picMkLst>
+            <pc:docMk/>
+            <pc:sldMk cId="1457128146" sldId="274"/>
+            <ac:picMk id="2050" creationId="{6280D42E-0E3C-8328-A882-D458CF8BA8D6}"/>
+          </ac:picMkLst>
+        </pc:picChg>
+      </pc:sldChg>
+      <pc:sldChg chg="new del modNotesTx">
+        <pc:chgData name="Sallam Saka" userId="f204d973-d51e-47d8-884c-bdcba18d93b4" providerId="ADAL" clId="{449313F3-D860-4324-82A4-2CDF33DE5E0B}" dt="2025-07-03T15:55:17.267" v="2698" actId="2696"/>
+        <pc:sldMkLst>
+          <pc:docMk/>
+          <pc:sldMk cId="4259553058" sldId="275"/>
+        </pc:sldMkLst>
+      </pc:sldChg>
+      <pc:sldChg chg="addSp delSp modSp new mod setBg">
+        <pc:chgData name="Sallam Saka" userId="f204d973-d51e-47d8-884c-bdcba18d93b4" providerId="ADAL" clId="{449313F3-D860-4324-82A4-2CDF33DE5E0B}" dt="2025-07-03T15:54:38.303" v="2697" actId="1076"/>
+        <pc:sldMkLst>
+          <pc:docMk/>
+          <pc:sldMk cId="722023237" sldId="276"/>
+        </pc:sldMkLst>
+        <pc:spChg chg="add del mod">
+          <ac:chgData name="Sallam Saka" userId="f204d973-d51e-47d8-884c-bdcba18d93b4" providerId="ADAL" clId="{449313F3-D860-4324-82A4-2CDF33DE5E0B}" dt="2025-07-03T15:54:09.851" v="2695" actId="1076"/>
+          <ac:spMkLst>
+            <pc:docMk/>
+            <pc:sldMk cId="722023237" sldId="276"/>
+            <ac:spMk id="2" creationId="{9CADE910-19F9-B467-1F97-530862803826}"/>
+          </ac:spMkLst>
+        </pc:spChg>
+        <pc:spChg chg="del">
+          <ac:chgData name="Sallam Saka" userId="f204d973-d51e-47d8-884c-bdcba18d93b4" providerId="ADAL" clId="{449313F3-D860-4324-82A4-2CDF33DE5E0B}" dt="2025-07-03T15:44:55.934" v="2509"/>
+          <ac:spMkLst>
+            <pc:docMk/>
+            <pc:sldMk cId="722023237" sldId="276"/>
+            <ac:spMk id="3" creationId="{C0C0EC8B-9A10-E25B-FDC1-26732AE1FC66}"/>
+          </ac:spMkLst>
+        </pc:spChg>
+        <pc:spChg chg="add mod">
+          <ac:chgData name="Sallam Saka" userId="f204d973-d51e-47d8-884c-bdcba18d93b4" providerId="ADAL" clId="{449313F3-D860-4324-82A4-2CDF33DE5E0B}" dt="2025-07-03T15:54:38.303" v="2697" actId="1076"/>
+          <ac:spMkLst>
+            <pc:docMk/>
+            <pc:sldMk cId="722023237" sldId="276"/>
+            <ac:spMk id="4" creationId="{5B84E5B5-75C3-2E5B-9ED3-8566607119D6}"/>
+          </ac:spMkLst>
+        </pc:spChg>
+        <pc:spChg chg="add del">
+          <ac:chgData name="Sallam Saka" userId="f204d973-d51e-47d8-884c-bdcba18d93b4" providerId="ADAL" clId="{449313F3-D860-4324-82A4-2CDF33DE5E0B}" dt="2025-07-03T15:45:31.382" v="2511" actId="26606"/>
+          <ac:spMkLst>
+            <pc:docMk/>
+            <pc:sldMk cId="722023237" sldId="276"/>
+            <ac:spMk id="4102" creationId="{15624B0B-EFBC-19D1-2756-CCA634FD11E9}"/>
+          </ac:spMkLst>
+        </pc:spChg>
+        <pc:spChg chg="add del">
+          <ac:chgData name="Sallam Saka" userId="f204d973-d51e-47d8-884c-bdcba18d93b4" providerId="ADAL" clId="{449313F3-D860-4324-82A4-2CDF33DE5E0B}" dt="2025-07-03T15:47:42.602" v="2531" actId="26606"/>
+          <ac:spMkLst>
+            <pc:docMk/>
+            <pc:sldMk cId="722023237" sldId="276"/>
+            <ac:spMk id="4103" creationId="{B8AFBB67-2575-4F5A-96CF-CD2EB02A1EF0}"/>
+          </ac:spMkLst>
+        </pc:spChg>
+        <pc:spChg chg="add del">
+          <ac:chgData name="Sallam Saka" userId="f204d973-d51e-47d8-884c-bdcba18d93b4" providerId="ADAL" clId="{449313F3-D860-4324-82A4-2CDF33DE5E0B}" dt="2025-07-03T15:45:31.382" v="2511" actId="26606"/>
+          <ac:spMkLst>
+            <pc:docMk/>
+            <pc:sldMk cId="722023237" sldId="276"/>
+            <ac:spMk id="4105" creationId="{6515FC82-3453-4CBE-8895-4CCFF339529E}"/>
+          </ac:spMkLst>
+        </pc:spChg>
+        <pc:spChg chg="add del">
+          <ac:chgData name="Sallam Saka" userId="f204d973-d51e-47d8-884c-bdcba18d93b4" providerId="ADAL" clId="{449313F3-D860-4324-82A4-2CDF33DE5E0B}" dt="2025-07-03T15:47:00.681" v="2519" actId="26606"/>
+          <ac:spMkLst>
+            <pc:docMk/>
+            <pc:sldMk cId="722023237" sldId="276"/>
+            <ac:spMk id="4106" creationId="{FC92D127-C926-C0BD-30E9-FC09A08565CA}"/>
+          </ac:spMkLst>
+        </pc:spChg>
+        <pc:spChg chg="add del">
+          <ac:chgData name="Sallam Saka" userId="f204d973-d51e-47d8-884c-bdcba18d93b4" providerId="ADAL" clId="{449313F3-D860-4324-82A4-2CDF33DE5E0B}" dt="2025-07-03T15:45:31.382" v="2511" actId="26606"/>
+          <ac:spMkLst>
+            <pc:docMk/>
+            <pc:sldMk cId="722023237" sldId="276"/>
+            <ac:spMk id="4107" creationId="{C5FD847B-65C0-4027-8DFC-70CB424514F8}"/>
+          </ac:spMkLst>
+        </pc:spChg>
+        <pc:spChg chg="add del">
+          <ac:chgData name="Sallam Saka" userId="f204d973-d51e-47d8-884c-bdcba18d93b4" providerId="ADAL" clId="{449313F3-D860-4324-82A4-2CDF33DE5E0B}" dt="2025-07-03T15:47:05.660" v="2521" actId="26606"/>
+          <ac:spMkLst>
+            <pc:docMk/>
+            <pc:sldMk cId="722023237" sldId="276"/>
+            <ac:spMk id="4108" creationId="{B8AFBB67-2575-4F5A-96CF-CD2EB02A1EF0}"/>
+          </ac:spMkLst>
+        </pc:spChg>
+        <pc:spChg chg="add del">
+          <ac:chgData name="Sallam Saka" userId="f204d973-d51e-47d8-884c-bdcba18d93b4" providerId="ADAL" clId="{449313F3-D860-4324-82A4-2CDF33DE5E0B}" dt="2025-07-03T15:45:43.270" v="2513" actId="26606"/>
+          <ac:spMkLst>
+            <pc:docMk/>
+            <pc:sldMk cId="722023237" sldId="276"/>
+            <ac:spMk id="4109" creationId="{55A27B95-7EBA-9775-C083-D92265C3C26E}"/>
+          </ac:spMkLst>
+        </pc:spChg>
+        <pc:spChg chg="add del">
+          <ac:chgData name="Sallam Saka" userId="f204d973-d51e-47d8-884c-bdcba18d93b4" providerId="ADAL" clId="{449313F3-D860-4324-82A4-2CDF33DE5E0B}" dt="2025-07-03T15:47:00.681" v="2519" actId="26606"/>
+          <ac:spMkLst>
+            <pc:docMk/>
+            <pc:sldMk cId="722023237" sldId="276"/>
+            <ac:spMk id="4110" creationId="{6515FC82-3453-4CBE-8895-4CCFF339529E}"/>
+          </ac:spMkLst>
+        </pc:spChg>
+        <pc:spChg chg="add del">
+          <ac:chgData name="Sallam Saka" userId="f204d973-d51e-47d8-884c-bdcba18d93b4" providerId="ADAL" clId="{449313F3-D860-4324-82A4-2CDF33DE5E0B}" dt="2025-07-03T15:47:08.627" v="2523" actId="26606"/>
+          <ac:spMkLst>
+            <pc:docMk/>
+            <pc:sldMk cId="722023237" sldId="276"/>
+            <ac:spMk id="4111" creationId="{65041AB2-A9B4-4D3F-B120-38E7860A8F1A}"/>
+          </ac:spMkLst>
+        </pc:spChg>
+        <pc:spChg chg="add del">
+          <ac:chgData name="Sallam Saka" userId="f204d973-d51e-47d8-884c-bdcba18d93b4" providerId="ADAL" clId="{449313F3-D860-4324-82A4-2CDF33DE5E0B}" dt="2025-07-03T15:47:00.681" v="2519" actId="26606"/>
+          <ac:spMkLst>
+            <pc:docMk/>
+            <pc:sldMk cId="722023237" sldId="276"/>
+            <ac:spMk id="4112" creationId="{C5FD847B-65C0-4027-8DFC-70CB424514F8}"/>
+          </ac:spMkLst>
+        </pc:spChg>
+        <pc:spChg chg="add del">
+          <ac:chgData name="Sallam Saka" userId="f204d973-d51e-47d8-884c-bdcba18d93b4" providerId="ADAL" clId="{449313F3-D860-4324-82A4-2CDF33DE5E0B}" dt="2025-07-03T15:47:10.163" v="2525" actId="26606"/>
+          <ac:spMkLst>
+            <pc:docMk/>
+            <pc:sldMk cId="722023237" sldId="276"/>
+            <ac:spMk id="4113" creationId="{9CADE910-19F9-B467-1F97-530862803826}"/>
+          </ac:spMkLst>
+        </pc:spChg>
+        <pc:spChg chg="add del">
+          <ac:chgData name="Sallam Saka" userId="f204d973-d51e-47d8-884c-bdcba18d93b4" providerId="ADAL" clId="{449313F3-D860-4324-82A4-2CDF33DE5E0B}" dt="2025-07-03T15:47:10.163" v="2525" actId="26606"/>
+          <ac:spMkLst>
+            <pc:docMk/>
+            <pc:sldMk cId="722023237" sldId="276"/>
+            <ac:spMk id="4114" creationId="{FC92D127-C926-C0BD-30E9-FC09A08565CA}"/>
+          </ac:spMkLst>
+        </pc:spChg>
+        <pc:spChg chg="add del">
+          <ac:chgData name="Sallam Saka" userId="f204d973-d51e-47d8-884c-bdcba18d93b4" providerId="ADAL" clId="{449313F3-D860-4324-82A4-2CDF33DE5E0B}" dt="2025-07-03T15:47:10.163" v="2525" actId="26606"/>
+          <ac:spMkLst>
+            <pc:docMk/>
+            <pc:sldMk cId="722023237" sldId="276"/>
+            <ac:spMk id="4115" creationId="{6515FC82-3453-4CBE-8895-4CCFF339529E}"/>
+          </ac:spMkLst>
+        </pc:spChg>
+        <pc:spChg chg="add del">
+          <ac:chgData name="Sallam Saka" userId="f204d973-d51e-47d8-884c-bdcba18d93b4" providerId="ADAL" clId="{449313F3-D860-4324-82A4-2CDF33DE5E0B}" dt="2025-07-03T15:47:10.163" v="2525" actId="26606"/>
+          <ac:spMkLst>
+            <pc:docMk/>
+            <pc:sldMk cId="722023237" sldId="276"/>
+            <ac:spMk id="4116" creationId="{C5FD847B-65C0-4027-8DFC-70CB424514F8}"/>
+          </ac:spMkLst>
+        </pc:spChg>
+        <pc:spChg chg="add del">
+          <ac:chgData name="Sallam Saka" userId="f204d973-d51e-47d8-884c-bdcba18d93b4" providerId="ADAL" clId="{449313F3-D860-4324-82A4-2CDF33DE5E0B}" dt="2025-07-03T15:47:30.570" v="2527" actId="26606"/>
+          <ac:spMkLst>
+            <pc:docMk/>
+            <pc:sldMk cId="722023237" sldId="276"/>
+            <ac:spMk id="4118" creationId="{1660E788-AFA9-4A1B-9991-6AA74632A15B}"/>
+          </ac:spMkLst>
+        </pc:spChg>
+        <pc:spChg chg="add del">
+          <ac:chgData name="Sallam Saka" userId="f204d973-d51e-47d8-884c-bdcba18d93b4" providerId="ADAL" clId="{449313F3-D860-4324-82A4-2CDF33DE5E0B}" dt="2025-07-03T15:47:30.570" v="2527" actId="26606"/>
+          <ac:spMkLst>
+            <pc:docMk/>
+            <pc:sldMk cId="722023237" sldId="276"/>
+            <ac:spMk id="4119" creationId="{867D4867-5BA7-4462-B2F6-A23F4A622AA7}"/>
+          </ac:spMkLst>
+        </pc:spChg>
+        <pc:spChg chg="add del">
+          <ac:chgData name="Sallam Saka" userId="f204d973-d51e-47d8-884c-bdcba18d93b4" providerId="ADAL" clId="{449313F3-D860-4324-82A4-2CDF33DE5E0B}" dt="2025-07-03T15:47:30.570" v="2527" actId="26606"/>
+          <ac:spMkLst>
+            <pc:docMk/>
+            <pc:sldMk cId="722023237" sldId="276"/>
+            <ac:spMk id="4120" creationId="{9CADE910-19F9-B467-1F97-530862803826}"/>
+          </ac:spMkLst>
+        </pc:spChg>
+        <pc:spChg chg="add del">
+          <ac:chgData name="Sallam Saka" userId="f204d973-d51e-47d8-884c-bdcba18d93b4" providerId="ADAL" clId="{449313F3-D860-4324-82A4-2CDF33DE5E0B}" dt="2025-07-03T15:47:30.570" v="2527" actId="26606"/>
+          <ac:spMkLst>
+            <pc:docMk/>
+            <pc:sldMk cId="722023237" sldId="276"/>
+            <ac:spMk id="4121" creationId="{03058EE0-E16A-5645-3E0D-F0C3EC13994A}"/>
+          </ac:spMkLst>
+        </pc:spChg>
+        <pc:spChg chg="add del">
+          <ac:chgData name="Sallam Saka" userId="f204d973-d51e-47d8-884c-bdcba18d93b4" providerId="ADAL" clId="{449313F3-D860-4324-82A4-2CDF33DE5E0B}" dt="2025-07-03T15:47:42.602" v="2531" actId="26606"/>
+          <ac:spMkLst>
+            <pc:docMk/>
+            <pc:sldMk cId="722023237" sldId="276"/>
+            <ac:spMk id="4123" creationId="{9CADE910-19F9-B467-1F97-530862803826}"/>
+          </ac:spMkLst>
+        </pc:spChg>
+        <pc:spChg chg="add del">
+          <ac:chgData name="Sallam Saka" userId="f204d973-d51e-47d8-884c-bdcba18d93b4" providerId="ADAL" clId="{449313F3-D860-4324-82A4-2CDF33DE5E0B}" dt="2025-07-03T15:47:42.602" v="2531" actId="26606"/>
+          <ac:spMkLst>
+            <pc:docMk/>
+            <pc:sldMk cId="722023237" sldId="276"/>
+            <ac:spMk id="4124" creationId="{56D57D5E-5175-72A5-F6BF-3B404000716D}"/>
+          </ac:spMkLst>
+        </pc:spChg>
+        <pc:picChg chg="add mod">
+          <ac:chgData name="Sallam Saka" userId="f204d973-d51e-47d8-884c-bdcba18d93b4" providerId="ADAL" clId="{449313F3-D860-4324-82A4-2CDF33DE5E0B}" dt="2025-07-03T15:54:02.083" v="2694" actId="1076"/>
+          <ac:picMkLst>
+            <pc:docMk/>
+            <pc:sldMk cId="722023237" sldId="276"/>
+            <ac:picMk id="4098" creationId="{3899A185-F3AB-88F3-44C9-8102094587D0}"/>
+          </ac:picMkLst>
+        </pc:picChg>
+      </pc:sldChg>
+      <pc:sldChg chg="new">
+        <pc:chgData name="Sallam Saka" userId="f204d973-d51e-47d8-884c-bdcba18d93b4" providerId="ADAL" clId="{449313F3-D860-4324-82A4-2CDF33DE5E0B}" dt="2025-07-03T15:55:23.214" v="2699" actId="680"/>
+        <pc:sldMkLst>
+          <pc:docMk/>
+          <pc:sldMk cId="1515333574" sldId="277"/>
+        </pc:sldMkLst>
+      </pc:sldChg>
+    </pc:docChg>
+  </pc:docChgLst>
   <pc:docChgLst>
     <pc:chgData name="Sallam Saka" userId="f204d973-d51e-47d8-884c-bdcba18d93b4" providerId="ADAL" clId="{2C357A54-8BD3-45C1-896A-A820E7B30042}"/>
     <pc:docChg chg="undo redo custSel addSld delSld modSld">
@@ -166,14 +792,6 @@
             <pc:docMk/>
             <pc:sldMk cId="1819153595" sldId="256"/>
             <ac:spMk id="3" creationId="{8CF238E7-8927-F72F-56BF-CED351C48FB3}"/>
-          </ac:spMkLst>
-        </pc:spChg>
-        <pc:spChg chg="add del">
-          <ac:chgData name="Sallam Saka" userId="f204d973-d51e-47d8-884c-bdcba18d93b4" providerId="ADAL" clId="{2C357A54-8BD3-45C1-896A-A820E7B30042}" dt="2025-06-24T23:21:58.156" v="113" actId="22"/>
-          <ac:spMkLst>
-            <pc:docMk/>
-            <pc:sldMk cId="1819153595" sldId="256"/>
-            <ac:spMk id="5" creationId="{AAFBD659-EF79-0ADB-8B19-16290ABDF213}"/>
           </ac:spMkLst>
         </pc:spChg>
       </pc:sldChg>
@@ -276,14 +894,6 @@
           </ac:spMkLst>
         </pc:spChg>
         <pc:spChg chg="add mod">
-          <ac:chgData name="Sallam Saka" userId="f204d973-d51e-47d8-884c-bdcba18d93b4" providerId="ADAL" clId="{2C357A54-8BD3-45C1-896A-A820E7B30042}" dt="2025-06-25T15:34:47.628" v="3811"/>
-          <ac:spMkLst>
-            <pc:docMk/>
-            <pc:sldMk cId="3115839712" sldId="260"/>
-            <ac:spMk id="4" creationId="{9CBAC6E6-01D0-E740-EF33-C6CDF4EFD614}"/>
-          </ac:spMkLst>
-        </pc:spChg>
-        <pc:spChg chg="add mod">
           <ac:chgData name="Sallam Saka" userId="f204d973-d51e-47d8-884c-bdcba18d93b4" providerId="ADAL" clId="{2C357A54-8BD3-45C1-896A-A820E7B30042}" dt="2025-06-25T16:40:02.675" v="4892" actId="6549"/>
           <ac:spMkLst>
             <pc:docMk/>
@@ -291,30 +901,6 @@
             <ac:spMk id="5" creationId="{DFDD764A-EDD7-ACBB-21CA-873C557B1452}"/>
           </ac:spMkLst>
         </pc:spChg>
-        <pc:picChg chg="add del">
-          <ac:chgData name="Sallam Saka" userId="f204d973-d51e-47d8-884c-bdcba18d93b4" providerId="ADAL" clId="{2C357A54-8BD3-45C1-896A-A820E7B30042}" dt="2025-06-25T16:00:23.473" v="3922" actId="22"/>
-          <ac:picMkLst>
-            <pc:docMk/>
-            <pc:sldMk cId="3115839712" sldId="260"/>
-            <ac:picMk id="7" creationId="{273D485A-77A1-8ED9-D55F-39597244BAFD}"/>
-          </ac:picMkLst>
-        </pc:picChg>
-        <pc:picChg chg="add del">
-          <ac:chgData name="Sallam Saka" userId="f204d973-d51e-47d8-884c-bdcba18d93b4" providerId="ADAL" clId="{2C357A54-8BD3-45C1-896A-A820E7B30042}" dt="2025-06-25T16:00:26.498" v="3924" actId="22"/>
-          <ac:picMkLst>
-            <pc:docMk/>
-            <pc:sldMk cId="3115839712" sldId="260"/>
-            <ac:picMk id="9" creationId="{0A4BFFF6-33A2-AF20-74DD-1A01D6E135E8}"/>
-          </ac:picMkLst>
-        </pc:picChg>
-        <pc:picChg chg="add del mod">
-          <ac:chgData name="Sallam Saka" userId="f204d973-d51e-47d8-884c-bdcba18d93b4" providerId="ADAL" clId="{2C357A54-8BD3-45C1-896A-A820E7B30042}" dt="2025-06-25T15:49:38.184" v="3920" actId="21"/>
-          <ac:picMkLst>
-            <pc:docMk/>
-            <pc:sldMk cId="3115839712" sldId="260"/>
-            <ac:picMk id="1026" creationId="{FEE58B97-2451-D6CD-4C0D-94AF709C9BA3}"/>
-          </ac:picMkLst>
-        </pc:picChg>
       </pc:sldChg>
       <pc:sldChg chg="addSp delSp modSp new mod modNotesTx">
         <pc:chgData name="Sallam Saka" userId="f204d973-d51e-47d8-884c-bdcba18d93b4" providerId="ADAL" clId="{2C357A54-8BD3-45C1-896A-A820E7B30042}" dt="2025-06-25T18:21:17.691" v="5331" actId="20577"/>
@@ -336,30 +922,6 @@
             <pc:docMk/>
             <pc:sldMk cId="1698663498" sldId="261"/>
             <ac:spMk id="3" creationId="{127DF538-3A2C-6D79-A95B-94A8B89BF874}"/>
-          </ac:spMkLst>
-        </pc:spChg>
-        <pc:spChg chg="add mod">
-          <ac:chgData name="Sallam Saka" userId="f204d973-d51e-47d8-884c-bdcba18d93b4" providerId="ADAL" clId="{2C357A54-8BD3-45C1-896A-A820E7B30042}" dt="2025-06-25T16:34:48.042" v="4877"/>
-          <ac:spMkLst>
-            <pc:docMk/>
-            <pc:sldMk cId="1698663498" sldId="261"/>
-            <ac:spMk id="4" creationId="{6F358CD9-055D-C8EE-C816-91D4BEDB5D3B}"/>
-          </ac:spMkLst>
-        </pc:spChg>
-        <pc:spChg chg="add mod">
-          <ac:chgData name="Sallam Saka" userId="f204d973-d51e-47d8-884c-bdcba18d93b4" providerId="ADAL" clId="{2C357A54-8BD3-45C1-896A-A820E7B30042}" dt="2025-06-25T16:34:52.703" v="4880"/>
-          <ac:spMkLst>
-            <pc:docMk/>
-            <pc:sldMk cId="1698663498" sldId="261"/>
-            <ac:spMk id="5" creationId="{8545D35E-D8BD-FE00-69A3-50E3EFCDBBD8}"/>
-          </ac:spMkLst>
-        </pc:spChg>
-        <pc:spChg chg="add del">
-          <ac:chgData name="Sallam Saka" userId="f204d973-d51e-47d8-884c-bdcba18d93b4" providerId="ADAL" clId="{2C357A54-8BD3-45C1-896A-A820E7B30042}" dt="2025-06-25T16:39:06.162" v="4884" actId="22"/>
-          <ac:spMkLst>
-            <pc:docMk/>
-            <pc:sldMk cId="1698663498" sldId="261"/>
-            <ac:spMk id="7" creationId="{7AD9EDC9-A9E2-E95F-9850-2D436EA3540A}"/>
           </ac:spMkLst>
         </pc:spChg>
         <pc:spChg chg="add mod">
@@ -416,14 +978,6 @@
             <ac:spMk id="2" creationId="{0AB5D44B-E76F-8C50-8F71-67FA4C8EC1FD}"/>
           </ac:spMkLst>
         </pc:spChg>
-        <pc:spChg chg="del">
-          <ac:chgData name="Sallam Saka" userId="f204d973-d51e-47d8-884c-bdcba18d93b4" providerId="ADAL" clId="{2C357A54-8BD3-45C1-896A-A820E7B30042}" dt="2025-06-25T16:00:29.898" v="3926" actId="22"/>
-          <ac:spMkLst>
-            <pc:docMk/>
-            <pc:sldMk cId="1802762808" sldId="263"/>
-            <ac:spMk id="3" creationId="{C2305095-3023-06C2-1800-82A37DB46FB8}"/>
-          </ac:spMkLst>
-        </pc:spChg>
         <pc:picChg chg="add mod ord">
           <ac:chgData name="Sallam Saka" userId="f204d973-d51e-47d8-884c-bdcba18d93b4" providerId="ADAL" clId="{2C357A54-8BD3-45C1-896A-A820E7B30042}" dt="2025-06-25T16:00:29.898" v="3926" actId="22"/>
           <ac:picMkLst>
@@ -447,30 +1001,6 @@
             <ac:spMk id="2" creationId="{7FF0FC23-4914-3EA5-8765-713C6EE3180A}"/>
           </ac:spMkLst>
         </pc:spChg>
-        <pc:spChg chg="add del">
-          <ac:chgData name="Sallam Saka" userId="f204d973-d51e-47d8-884c-bdcba18d93b4" providerId="ADAL" clId="{2C357A54-8BD3-45C1-896A-A820E7B30042}" dt="2025-06-25T16:49:27.653" v="4912" actId="22"/>
-          <ac:spMkLst>
-            <pc:docMk/>
-            <pc:sldMk cId="3022207675" sldId="264"/>
-            <ac:spMk id="3" creationId="{A5B01D6A-BEDA-0AE7-F0CB-0A94451621DC}"/>
-          </ac:spMkLst>
-        </pc:spChg>
-        <pc:picChg chg="add del mod ord">
-          <ac:chgData name="Sallam Saka" userId="f204d973-d51e-47d8-884c-bdcba18d93b4" providerId="ADAL" clId="{2C357A54-8BD3-45C1-896A-A820E7B30042}" dt="2025-06-25T16:48:32.043" v="4899" actId="22"/>
-          <ac:picMkLst>
-            <pc:docMk/>
-            <pc:sldMk cId="3022207675" sldId="264"/>
-            <ac:picMk id="5" creationId="{1EB882AE-7698-C5D6-4618-790BC01E3DC9}"/>
-          </ac:picMkLst>
-        </pc:picChg>
-        <pc:picChg chg="add del mod ord">
-          <ac:chgData name="Sallam Saka" userId="f204d973-d51e-47d8-884c-bdcba18d93b4" providerId="ADAL" clId="{2C357A54-8BD3-45C1-896A-A820E7B30042}" dt="2025-06-25T16:49:06.399" v="4911" actId="22"/>
-          <ac:picMkLst>
-            <pc:docMk/>
-            <pc:sldMk cId="3022207675" sldId="264"/>
-            <ac:picMk id="7" creationId="{4CFA1426-CBD5-C6B6-281D-F32F48CEAD4B}"/>
-          </ac:picMkLst>
-        </pc:picChg>
         <pc:picChg chg="add mod ord">
           <ac:chgData name="Sallam Saka" userId="f204d973-d51e-47d8-884c-bdcba18d93b4" providerId="ADAL" clId="{2C357A54-8BD3-45C1-896A-A820E7B30042}" dt="2025-06-25T16:49:27.653" v="4912" actId="22"/>
           <ac:picMkLst>
@@ -486,60 +1016,12 @@
           <pc:docMk/>
           <pc:sldMk cId="787353098" sldId="265"/>
         </pc:sldMkLst>
-        <pc:spChg chg="del mod ord">
-          <ac:chgData name="Sallam Saka" userId="f204d973-d51e-47d8-884c-bdcba18d93b4" providerId="ADAL" clId="{2C357A54-8BD3-45C1-896A-A820E7B30042}" dt="2025-06-25T18:49:11.725" v="5653" actId="478"/>
-          <ac:spMkLst>
-            <pc:docMk/>
-            <pc:sldMk cId="787353098" sldId="265"/>
-            <ac:spMk id="2" creationId="{B482808D-EF07-96BF-B35D-07304F648A52}"/>
-          </ac:spMkLst>
-        </pc:spChg>
-        <pc:spChg chg="del">
-          <ac:chgData name="Sallam Saka" userId="f204d973-d51e-47d8-884c-bdcba18d93b4" providerId="ADAL" clId="{2C357A54-8BD3-45C1-896A-A820E7B30042}" dt="2025-06-25T18:48:41.843" v="5648" actId="22"/>
-          <ac:spMkLst>
-            <pc:docMk/>
-            <pc:sldMk cId="787353098" sldId="265"/>
-            <ac:spMk id="3" creationId="{33973D1F-4445-9163-B92D-5F0A1CCABB83}"/>
-          </ac:spMkLst>
-        </pc:spChg>
-        <pc:spChg chg="add del">
-          <ac:chgData name="Sallam Saka" userId="f204d973-d51e-47d8-884c-bdcba18d93b4" providerId="ADAL" clId="{2C357A54-8BD3-45C1-896A-A820E7B30042}" dt="2025-06-25T18:53:16.486" v="5657" actId="931"/>
-          <ac:spMkLst>
-            <pc:docMk/>
-            <pc:sldMk cId="787353098" sldId="265"/>
-            <ac:spMk id="9" creationId="{A2A07205-0626-578A-953B-72A7859B3A04}"/>
-          </ac:spMkLst>
-        </pc:spChg>
-        <pc:spChg chg="add del mod">
-          <ac:chgData name="Sallam Saka" userId="f204d973-d51e-47d8-884c-bdcba18d93b4" providerId="ADAL" clId="{2C357A54-8BD3-45C1-896A-A820E7B30042}" dt="2025-06-25T19:02:33.323" v="5668" actId="478"/>
-          <ac:spMkLst>
-            <pc:docMk/>
-            <pc:sldMk cId="787353098" sldId="265"/>
-            <ac:spMk id="12" creationId="{4A5C94A2-65DD-27B0-2BC6-9F10A6663C56}"/>
-          </ac:spMkLst>
-        </pc:spChg>
         <pc:spChg chg="add mod">
           <ac:chgData name="Sallam Saka" userId="f204d973-d51e-47d8-884c-bdcba18d93b4" providerId="ADAL" clId="{2C357A54-8BD3-45C1-896A-A820E7B30042}" dt="2025-06-25T19:07:19.073" v="5851" actId="1076"/>
           <ac:spMkLst>
             <pc:docMk/>
             <pc:sldMk cId="787353098" sldId="265"/>
             <ac:spMk id="17" creationId="{BCEDE207-2D29-3BA0-8137-E728DEB0B53F}"/>
-          </ac:spMkLst>
-        </pc:spChg>
-        <pc:spChg chg="add mod">
-          <ac:chgData name="Sallam Saka" userId="f204d973-d51e-47d8-884c-bdcba18d93b4" providerId="ADAL" clId="{2C357A54-8BD3-45C1-896A-A820E7B30042}" dt="2025-06-25T19:04:24.374" v="5746"/>
-          <ac:spMkLst>
-            <pc:docMk/>
-            <pc:sldMk cId="787353098" sldId="265"/>
-            <ac:spMk id="18" creationId="{9B35AA09-F6BE-E195-C359-5AD11520CFB8}"/>
-          </ac:spMkLst>
-        </pc:spChg>
-        <pc:spChg chg="add mod">
-          <ac:chgData name="Sallam Saka" userId="f204d973-d51e-47d8-884c-bdcba18d93b4" providerId="ADAL" clId="{2C357A54-8BD3-45C1-896A-A820E7B30042}" dt="2025-06-25T19:04:27.370" v="5751"/>
-          <ac:spMkLst>
-            <pc:docMk/>
-            <pc:sldMk cId="787353098" sldId="265"/>
-            <ac:spMk id="19" creationId="{735C3FCD-CA8C-F630-4934-32FC01976C8C}"/>
           </ac:spMkLst>
         </pc:spChg>
         <pc:spChg chg="add mod">
@@ -550,36 +1032,12 @@
             <ac:spMk id="20" creationId="{ADA9F779-9C45-C0C7-3740-B7ADB7A824FF}"/>
           </ac:spMkLst>
         </pc:spChg>
-        <pc:picChg chg="add del mod ord modCrop">
-          <ac:chgData name="Sallam Saka" userId="f204d973-d51e-47d8-884c-bdcba18d93b4" providerId="ADAL" clId="{2C357A54-8BD3-45C1-896A-A820E7B30042}" dt="2025-06-25T18:57:18.967" v="5661" actId="478"/>
-          <ac:picMkLst>
-            <pc:docMk/>
-            <pc:sldMk cId="787353098" sldId="265"/>
-            <ac:picMk id="5" creationId="{25BD9269-144C-6F5E-6F4A-15940ACFC49C}"/>
-          </ac:picMkLst>
-        </pc:picChg>
-        <pc:picChg chg="add del mod">
-          <ac:chgData name="Sallam Saka" userId="f204d973-d51e-47d8-884c-bdcba18d93b4" providerId="ADAL" clId="{2C357A54-8BD3-45C1-896A-A820E7B30042}" dt="2025-06-25T19:02:30.188" v="5667" actId="478"/>
-          <ac:picMkLst>
-            <pc:docMk/>
-            <pc:sldMk cId="787353098" sldId="265"/>
-            <ac:picMk id="7" creationId="{7744A196-0EA5-DFBE-A92F-D52835E2D468}"/>
-          </ac:picMkLst>
-        </pc:picChg>
         <pc:picChg chg="add mod">
           <ac:chgData name="Sallam Saka" userId="f204d973-d51e-47d8-884c-bdcba18d93b4" providerId="ADAL" clId="{2C357A54-8BD3-45C1-896A-A820E7B30042}" dt="2025-06-25T19:03:28.780" v="5680" actId="14100"/>
           <ac:picMkLst>
             <pc:docMk/>
             <pc:sldMk cId="787353098" sldId="265"/>
             <ac:picMk id="10" creationId="{AE605676-4273-BBEE-A5F9-B82B5EF126E7}"/>
-          </ac:picMkLst>
-        </pc:picChg>
-        <pc:picChg chg="add del mod">
-          <ac:chgData name="Sallam Saka" userId="f204d973-d51e-47d8-884c-bdcba18d93b4" providerId="ADAL" clId="{2C357A54-8BD3-45C1-896A-A820E7B30042}" dt="2025-06-25T19:02:41.879" v="5671" actId="478"/>
-          <ac:picMkLst>
-            <pc:docMk/>
-            <pc:sldMk cId="787353098" sldId="265"/>
-            <ac:picMk id="14" creationId="{9B64F075-149D-735E-E465-DA6ED1D1CE31}"/>
           </ac:picMkLst>
         </pc:picChg>
         <pc:picChg chg="add mod">
@@ -590,22 +1048,6 @@
             <ac:picMk id="16" creationId="{A71DB449-03FF-37B3-5371-ADC848A92267}"/>
           </ac:picMkLst>
         </pc:picChg>
-        <pc:inkChg chg="add del">
-          <ac:chgData name="Sallam Saka" userId="f204d973-d51e-47d8-884c-bdcba18d93b4" providerId="ADAL" clId="{2C357A54-8BD3-45C1-896A-A820E7B30042}" dt="2025-06-25T19:07:37.485" v="5855" actId="9405"/>
-          <ac:inkMkLst>
-            <pc:docMk/>
-            <pc:sldMk cId="787353098" sldId="265"/>
-            <ac:inkMk id="21" creationId="{42B1DDD8-0C54-0383-5B57-711B063611C1}"/>
-          </ac:inkMkLst>
-        </pc:inkChg>
-        <pc:inkChg chg="add">
-          <ac:chgData name="Sallam Saka" userId="f204d973-d51e-47d8-884c-bdcba18d93b4" providerId="ADAL" clId="{2C357A54-8BD3-45C1-896A-A820E7B30042}" dt="2025-06-25T19:07:34.362" v="5853"/>
-          <ac:inkMkLst>
-            <pc:docMk/>
-            <pc:sldMk cId="787353098" sldId="265"/>
-            <ac:inkMk id="22" creationId="{28ED67E4-3300-7E41-C769-4339EAE94D9F}"/>
-          </ac:inkMkLst>
-        </pc:inkChg>
         <pc:cxnChg chg="add mod">
           <ac:chgData name="Sallam Saka" userId="f204d973-d51e-47d8-884c-bdcba18d93b4" providerId="ADAL" clId="{2C357A54-8BD3-45C1-896A-A820E7B30042}" dt="2025-06-25T19:09:07.112" v="5864" actId="1038"/>
           <ac:cxnSpMkLst>
@@ -621,22 +1063,6 @@
           <pc:docMk/>
           <pc:sldMk cId="2635246491" sldId="266"/>
         </pc:sldMkLst>
-        <pc:spChg chg="del">
-          <ac:chgData name="Sallam Saka" userId="f204d973-d51e-47d8-884c-bdcba18d93b4" providerId="ADAL" clId="{2C357A54-8BD3-45C1-896A-A820E7B30042}" dt="2025-06-25T20:08:13.624" v="6533" actId="478"/>
-          <ac:spMkLst>
-            <pc:docMk/>
-            <pc:sldMk cId="2635246491" sldId="266"/>
-            <ac:spMk id="2" creationId="{F461ECDF-194F-0963-0946-85ADCF1C76A1}"/>
-          </ac:spMkLst>
-        </pc:spChg>
-        <pc:spChg chg="del">
-          <ac:chgData name="Sallam Saka" userId="f204d973-d51e-47d8-884c-bdcba18d93b4" providerId="ADAL" clId="{2C357A54-8BD3-45C1-896A-A820E7B30042}" dt="2025-06-25T20:08:11.624" v="6532" actId="478"/>
-          <ac:spMkLst>
-            <pc:docMk/>
-            <pc:sldMk cId="2635246491" sldId="266"/>
-            <ac:spMk id="3" creationId="{822CDA63-87CD-7E97-6EEB-609778187B02}"/>
-          </ac:spMkLst>
-        </pc:spChg>
         <pc:spChg chg="add mod">
           <ac:chgData name="Sallam Saka" userId="f204d973-d51e-47d8-884c-bdcba18d93b4" providerId="ADAL" clId="{2C357A54-8BD3-45C1-896A-A820E7B30042}" dt="2025-06-25T22:25:50.723" v="6780" actId="20577"/>
           <ac:spMkLst>
@@ -653,28 +1079,12 @@
             <ac:grpSpMk id="11" creationId="{FBBFF5EB-21CA-2963-A5C5-D876AD4464FA}"/>
           </ac:grpSpMkLst>
         </pc:grpChg>
-        <pc:picChg chg="add del">
-          <ac:chgData name="Sallam Saka" userId="f204d973-d51e-47d8-884c-bdcba18d93b4" providerId="ADAL" clId="{2C357A54-8BD3-45C1-896A-A820E7B30042}" dt="2025-06-25T19:28:42.283" v="6526" actId="22"/>
-          <ac:picMkLst>
-            <pc:docMk/>
-            <pc:sldMk cId="2635246491" sldId="266"/>
-            <ac:picMk id="5" creationId="{F9043ED7-2C7E-6135-6F5C-452599598E88}"/>
-          </ac:picMkLst>
-        </pc:picChg>
         <pc:picChg chg="add mod ord modCrop">
           <ac:chgData name="Sallam Saka" userId="f204d973-d51e-47d8-884c-bdcba18d93b4" providerId="ADAL" clId="{2C357A54-8BD3-45C1-896A-A820E7B30042}" dt="2025-06-25T20:14:10.022" v="6601" actId="164"/>
           <ac:picMkLst>
             <pc:docMk/>
             <pc:sldMk cId="2635246491" sldId="266"/>
             <ac:picMk id="7" creationId="{C027E1F7-9BE4-85B2-66CB-63B1C9A72DF9}"/>
-          </ac:picMkLst>
-        </pc:picChg>
-        <pc:picChg chg="add del mod modCrop">
-          <ac:chgData name="Sallam Saka" userId="f204d973-d51e-47d8-884c-bdcba18d93b4" providerId="ADAL" clId="{2C357A54-8BD3-45C1-896A-A820E7B30042}" dt="2025-06-25T20:13:24.460" v="6591" actId="478"/>
-          <ac:picMkLst>
-            <pc:docMk/>
-            <pc:sldMk cId="2635246491" sldId="266"/>
-            <ac:picMk id="9" creationId="{F3EFEA7D-315F-CB24-66C1-EB2ED860B7CC}"/>
           </ac:picMkLst>
         </pc:picChg>
         <pc:picChg chg="add mod modCrop">
@@ -699,46 +1109,6 @@
           <pc:docMk/>
           <pc:sldMk cId="3182023264" sldId="268"/>
         </pc:sldMkLst>
-        <pc:spChg chg="del mod">
-          <ac:chgData name="Sallam Saka" userId="f204d973-d51e-47d8-884c-bdcba18d93b4" providerId="ADAL" clId="{2C357A54-8BD3-45C1-896A-A820E7B30042}" dt="2025-06-25T22:20:00.452" v="6715" actId="478"/>
-          <ac:spMkLst>
-            <pc:docMk/>
-            <pc:sldMk cId="3182023264" sldId="268"/>
-            <ac:spMk id="2" creationId="{09BFAC75-54B1-7D01-E1C9-769EBB05C3D8}"/>
-          </ac:spMkLst>
-        </pc:spChg>
-        <pc:spChg chg="del">
-          <ac:chgData name="Sallam Saka" userId="f204d973-d51e-47d8-884c-bdcba18d93b4" providerId="ADAL" clId="{2C357A54-8BD3-45C1-896A-A820E7B30042}" dt="2025-06-25T22:10:15.696" v="6634" actId="478"/>
-          <ac:spMkLst>
-            <pc:docMk/>
-            <pc:sldMk cId="3182023264" sldId="268"/>
-            <ac:spMk id="3" creationId="{A4F26033-E61A-1039-D1A8-006912079406}"/>
-          </ac:spMkLst>
-        </pc:spChg>
-        <pc:spChg chg="del">
-          <ac:chgData name="Sallam Saka" userId="f204d973-d51e-47d8-884c-bdcba18d93b4" providerId="ADAL" clId="{2C357A54-8BD3-45C1-896A-A820E7B30042}" dt="2025-06-25T22:09:59.650" v="6631" actId="22"/>
-          <ac:spMkLst>
-            <pc:docMk/>
-            <pc:sldMk cId="3182023264" sldId="268"/>
-            <ac:spMk id="4" creationId="{055535BD-3BE8-3068-8818-46A5CC69B55C}"/>
-          </ac:spMkLst>
-        </pc:spChg>
-        <pc:spChg chg="add del mod">
-          <ac:chgData name="Sallam Saka" userId="f204d973-d51e-47d8-884c-bdcba18d93b4" providerId="ADAL" clId="{2C357A54-8BD3-45C1-896A-A820E7B30042}" dt="2025-06-25T22:18:22.008" v="6700" actId="478"/>
-          <ac:spMkLst>
-            <pc:docMk/>
-            <pc:sldMk cId="3182023264" sldId="268"/>
-            <ac:spMk id="14" creationId="{F19E28ED-12EF-3EB6-0B20-B38BF1E9964E}"/>
-          </ac:spMkLst>
-        </pc:spChg>
-        <pc:spChg chg="add del mod">
-          <ac:chgData name="Sallam Saka" userId="f204d973-d51e-47d8-884c-bdcba18d93b4" providerId="ADAL" clId="{2C357A54-8BD3-45C1-896A-A820E7B30042}" dt="2025-06-25T22:20:02.627" v="6716" actId="478"/>
-          <ac:spMkLst>
-            <pc:docMk/>
-            <pc:sldMk cId="3182023264" sldId="268"/>
-            <ac:spMk id="18" creationId="{9DF6CF75-FFF3-2355-9D4C-79ADD047FBC2}"/>
-          </ac:spMkLst>
-        </pc:spChg>
         <pc:spChg chg="add mod">
           <ac:chgData name="Sallam Saka" userId="f204d973-d51e-47d8-884c-bdcba18d93b4" providerId="ADAL" clId="{2C357A54-8BD3-45C1-896A-A820E7B30042}" dt="2025-06-25T22:23:09.938" v="6758" actId="1076"/>
           <ac:spMkLst>
@@ -764,14 +1134,6 @@
           </ac:spMkLst>
         </pc:spChg>
         <pc:grpChg chg="add mod">
-          <ac:chgData name="Sallam Saka" userId="f204d973-d51e-47d8-884c-bdcba18d93b4" providerId="ADAL" clId="{2C357A54-8BD3-45C1-896A-A820E7B30042}" dt="2025-06-25T22:22:57.444" v="6756" actId="14100"/>
-          <ac:grpSpMkLst>
-            <pc:docMk/>
-            <pc:sldMk cId="3182023264" sldId="268"/>
-            <ac:grpSpMk id="11" creationId="{1EC8DB55-7239-3F5D-6BDF-E53F8E8D3C8D}"/>
-          </ac:grpSpMkLst>
-        </pc:grpChg>
-        <pc:grpChg chg="add mod">
           <ac:chgData name="Sallam Saka" userId="f204d973-d51e-47d8-884c-bdcba18d93b4" providerId="ADAL" clId="{2C357A54-8BD3-45C1-896A-A820E7B30042}" dt="2025-06-25T22:23:22.881" v="6760" actId="14100"/>
           <ac:grpSpMkLst>
             <pc:docMk/>
@@ -779,38 +1141,6 @@
             <ac:grpSpMk id="16" creationId="{ABA456BA-8571-EC80-46D3-B3B41652B64E}"/>
           </ac:grpSpMkLst>
         </pc:grpChg>
-        <pc:picChg chg="add del mod ord modCrop">
-          <ac:chgData name="Sallam Saka" userId="f204d973-d51e-47d8-884c-bdcba18d93b4" providerId="ADAL" clId="{2C357A54-8BD3-45C1-896A-A820E7B30042}" dt="2025-06-25T22:18:12.489" v="6697" actId="21"/>
-          <ac:picMkLst>
-            <pc:docMk/>
-            <pc:sldMk cId="3182023264" sldId="268"/>
-            <ac:picMk id="6" creationId="{E59250D2-47E6-4188-F8EF-9ACA62700943}"/>
-          </ac:picMkLst>
-        </pc:picChg>
-        <pc:picChg chg="add mod modCrop">
-          <ac:chgData name="Sallam Saka" userId="f204d973-d51e-47d8-884c-bdcba18d93b4" providerId="ADAL" clId="{2C357A54-8BD3-45C1-896A-A820E7B30042}" dt="2025-06-25T22:15:54.360" v="6688" actId="164"/>
-          <ac:picMkLst>
-            <pc:docMk/>
-            <pc:sldMk cId="3182023264" sldId="268"/>
-            <ac:picMk id="8" creationId="{30D8A99A-11CC-EABE-2789-BBC207CCB786}"/>
-          </ac:picMkLst>
-        </pc:picChg>
-        <pc:picChg chg="add mod modCrop">
-          <ac:chgData name="Sallam Saka" userId="f204d973-d51e-47d8-884c-bdcba18d93b4" providerId="ADAL" clId="{2C357A54-8BD3-45C1-896A-A820E7B30042}" dt="2025-06-25T22:15:54.360" v="6688" actId="164"/>
-          <ac:picMkLst>
-            <pc:docMk/>
-            <pc:sldMk cId="3182023264" sldId="268"/>
-            <ac:picMk id="9" creationId="{C622486C-FC38-B043-7F3A-F7C1573C4415}"/>
-          </ac:picMkLst>
-        </pc:picChg>
-        <pc:picChg chg="add del mod">
-          <ac:chgData name="Sallam Saka" userId="f204d973-d51e-47d8-884c-bdcba18d93b4" providerId="ADAL" clId="{2C357A54-8BD3-45C1-896A-A820E7B30042}" dt="2025-06-25T22:16:41.233" v="6694" actId="478"/>
-          <ac:picMkLst>
-            <pc:docMk/>
-            <pc:sldMk cId="3182023264" sldId="268"/>
-            <ac:picMk id="10" creationId="{86E208AC-5197-541F-76D4-EA090EE5FA92}"/>
-          </ac:picMkLst>
-        </pc:picChg>
         <pc:picChg chg="add mod">
           <ac:chgData name="Sallam Saka" userId="f204d973-d51e-47d8-884c-bdcba18d93b4" providerId="ADAL" clId="{2C357A54-8BD3-45C1-896A-A820E7B30042}" dt="2025-06-25T22:18:19.993" v="6699" actId="164"/>
           <ac:picMkLst>
@@ -825,14 +1155,6 @@
             <pc:docMk/>
             <pc:sldMk cId="3182023264" sldId="268"/>
             <ac:picMk id="15" creationId="{E59250D2-47E6-4188-F8EF-9ACA62700943}"/>
-          </ac:picMkLst>
-        </pc:picChg>
-        <pc:picChg chg="add del">
-          <ac:chgData name="Sallam Saka" userId="f204d973-d51e-47d8-884c-bdcba18d93b4" providerId="ADAL" clId="{2C357A54-8BD3-45C1-896A-A820E7B30042}" dt="2025-06-25T22:21:01.589" v="6728" actId="478"/>
-          <ac:picMkLst>
-            <pc:docMk/>
-            <pc:sldMk cId="3182023264" sldId="268"/>
-            <ac:picMk id="21" creationId="{D28E26F1-665A-50F3-BD4A-C529EC9C5ACE}"/>
           </ac:picMkLst>
         </pc:picChg>
         <pc:cxnChg chg="add mod">
@@ -953,7 +1275,7 @@
           <a:p>
             <a:fld id="{9EC6EA57-E00F-4EA4-8324-57F699D5F3BD}" type="datetimeFigureOut">
               <a:rPr lang="en-CA" smtClean="0"/>
-              <a:t>2025-06-25</a:t>
+              <a:t>2025-07-03</a:t>
             </a:fld>
             <a:endParaRPr lang="en-CA"/>
           </a:p>
@@ -1329,6 +1651,93 @@
 </p:notes>
 </file>
 
+<file path=ppt/notesSlides/notesSlide10.xml><?xml version="1.0" encoding="utf-8"?>
+<p:notes xmlns:a="http://schemas.openxmlformats.org/drawingml/2006/main" xmlns:r="http://schemas.openxmlformats.org/officeDocument/2006/relationships" xmlns:p="http://schemas.openxmlformats.org/presentationml/2006/main">
+  <p:cSld>
+    <p:spTree>
+      <p:nvGrpSpPr>
+        <p:cNvPr id="1" name=""/>
+        <p:cNvGrpSpPr/>
+        <p:nvPr/>
+      </p:nvGrpSpPr>
+      <p:grpSpPr>
+        <a:xfrm>
+          <a:off x="0" y="0"/>
+          <a:ext cx="0" cy="0"/>
+          <a:chOff x="0" y="0"/>
+          <a:chExt cx="0" cy="0"/>
+        </a:xfrm>
+      </p:grpSpPr>
+      <p:sp>
+        <p:nvSpPr>
+          <p:cNvPr id="2" name="Slide Image Placeholder 1"/>
+          <p:cNvSpPr>
+            <a:spLocks noGrp="1" noRot="1" noChangeAspect="1"/>
+          </p:cNvSpPr>
+          <p:nvPr>
+            <p:ph type="sldImg"/>
+          </p:nvPr>
+        </p:nvSpPr>
+        <p:spPr/>
+      </p:sp>
+      <p:sp>
+        <p:nvSpPr>
+          <p:cNvPr id="3" name="Notes Placeholder 2"/>
+          <p:cNvSpPr>
+            <a:spLocks noGrp="1"/>
+          </p:cNvSpPr>
+          <p:nvPr>
+            <p:ph type="body" idx="1"/>
+          </p:nvPr>
+        </p:nvSpPr>
+        <p:spPr/>
+        <p:txBody>
+          <a:bodyPr/>
+          <a:lstStyle/>
+          <a:p>
+            <a:r>
+              <a:rPr lang="en-CA" dirty="0"/>
+              <a:t>I also </a:t>
+            </a:r>
+          </a:p>
+        </p:txBody>
+      </p:sp>
+      <p:sp>
+        <p:nvSpPr>
+          <p:cNvPr id="4" name="Slide Number Placeholder 3"/>
+          <p:cNvSpPr>
+            <a:spLocks noGrp="1"/>
+          </p:cNvSpPr>
+          <p:nvPr>
+            <p:ph type="sldNum" sz="quarter" idx="5"/>
+          </p:nvPr>
+        </p:nvSpPr>
+        <p:spPr/>
+        <p:txBody>
+          <a:bodyPr/>
+          <a:lstStyle/>
+          <a:p>
+            <a:fld id="{8B41CBF8-1438-49AC-8524-04FF51CA9B3F}" type="slidenum">
+              <a:rPr lang="en-CA" smtClean="0"/>
+              <a:t>16</a:t>
+            </a:fld>
+            <a:endParaRPr lang="en-CA"/>
+          </a:p>
+        </p:txBody>
+      </p:sp>
+    </p:spTree>
+    <p:extLst>
+      <p:ext uri="{BB962C8B-B14F-4D97-AF65-F5344CB8AC3E}">
+        <p14:creationId xmlns:p14="http://schemas.microsoft.com/office/powerpoint/2010/main" val="2865896089"/>
+      </p:ext>
+    </p:extLst>
+  </p:cSld>
+  <p:clrMapOvr>
+    <a:masterClrMapping/>
+  </p:clrMapOvr>
+</p:notes>
+</file>
+
 <file path=ppt/notesSlides/notesSlide2.xml><?xml version="1.0" encoding="utf-8"?>
 <p:notes xmlns:a="http://schemas.openxmlformats.org/drawingml/2006/main" xmlns:r="http://schemas.openxmlformats.org/officeDocument/2006/relationships" xmlns:p="http://schemas.openxmlformats.org/presentationml/2006/main">
   <p:cSld>
@@ -1391,15 +1800,7 @@
             </a:r>
             <a:r>
               <a:rPr lang="en-CA" dirty="0"/>
-              <a:t> and Infrared Imaging System and other instruments like PEARL FTIR, also known as Bruker FTIR, at PEARL, the Polar Environment Atmospheric Research Laboratory located in Eureka Nunavut. So far, the data I have been working with are Ozone profiles and partial and/or total column data. The objective/end goal of my research is to </a:t>
-            </a:r>
-            <a:r>
-              <a:rPr lang="en-CA" dirty="0" err="1"/>
-              <a:t>examing</a:t>
-            </a:r>
-            <a:r>
-              <a:rPr lang="en-CA" dirty="0"/>
-              <a:t> the data quality of the various instruments which is done by analyzing and validating the measurements from the instruments against </a:t>
+              <a:t> and Infrared Imaging System and other instruments like PEARL FTIR, also known as Bruker FTIR, at PEARL, the Polar Environment Atmospheric Research Laboratory located in Eureka Nunavut. So far, the data I have been working with are Ozone profiles and partial and/or total column data. The end goal of my research is to examine the data quality of the various instruments which is done by analyzing and validating the measurements from the instruments against </a:t>
             </a:r>
             <a:r>
               <a:rPr lang="en-CA" dirty="0" err="1"/>
@@ -1407,7 +1808,7 @@
             </a:r>
             <a:r>
               <a:rPr lang="en-CA" dirty="0"/>
-              <a:t>. This types of research matter for various reasons. Firstly, comparing the data from these instruments allows us to know if any instrument has measurements that are very different from the others, which may tell us that the instrument has issues. If the instruments all agree, this also assures us that the data is highly representative of the actual atmospheric composition. Lastly, reliable data allows society to push for changes that benefit society.</a:t>
+              <a:t>. There has already been a lot of similar research done in the past. This types of research matter for various reasons. Firstly, comparing the data from these instruments allows us to know if any instrument has measurements that are very different from the others, which may tell us that the instrument has issues. If the instruments all agree, this also assures us that the data is highly representative of the actual atmospheric composition. Lastly, reliable data allows society to push for changes that benefit society.</a:t>
             </a:r>
           </a:p>
         </p:txBody>
@@ -1893,7 +2294,7 @@
           <a:p>
             <a:r>
               <a:rPr lang="en-CA" dirty="0"/>
-              <a:t>Began by reading research papers to get a feel of what I would be doing and to understand atmospheric physics, I simultaneously began creating basic plots to showcase the measurements made by the ACE-FTS instrument.</a:t>
+              <a:t>Began by reading research papers to get a feel of what I would be doing and to understand atmospheric physics, I simultaneously began creating basic plots to showcase the measurements made by the ACE-FTS instrument, then I moved unto the OSIRIS instrument and compared their plots. I found that they mostly agreed but there were some discrepancies.</a:t>
             </a:r>
           </a:p>
         </p:txBody>
@@ -2010,7 +2411,7 @@
           <a:p>
             <a:fld id="{8B41CBF8-1438-49AC-8524-04FF51CA9B3F}" type="slidenum">
               <a:rPr lang="en-CA" smtClean="0"/>
-              <a:t>10</a:t>
+              <a:t>11</a:t>
             </a:fld>
             <a:endParaRPr lang="en-CA"/>
           </a:p>
@@ -2097,7 +2498,7 @@
           <a:p>
             <a:fld id="{8B41CBF8-1438-49AC-8524-04FF51CA9B3F}" type="slidenum">
               <a:rPr lang="en-CA" smtClean="0"/>
-              <a:t>11</a:t>
+              <a:t>12</a:t>
             </a:fld>
             <a:endParaRPr lang="en-CA"/>
           </a:p>
@@ -2107,6 +2508,101 @@
     <p:extLst>
       <p:ext uri="{BB962C8B-B14F-4D97-AF65-F5344CB8AC3E}">
         <p14:creationId xmlns:p14="http://schemas.microsoft.com/office/powerpoint/2010/main" val="903031912"/>
+      </p:ext>
+    </p:extLst>
+  </p:cSld>
+  <p:clrMapOvr>
+    <a:masterClrMapping/>
+  </p:clrMapOvr>
+</p:notes>
+</file>
+
+<file path=ppt/notesSlides/notesSlide9.xml><?xml version="1.0" encoding="utf-8"?>
+<p:notes xmlns:a="http://schemas.openxmlformats.org/drawingml/2006/main" xmlns:r="http://schemas.openxmlformats.org/officeDocument/2006/relationships" xmlns:p="http://schemas.openxmlformats.org/presentationml/2006/main">
+  <p:cSld>
+    <p:spTree>
+      <p:nvGrpSpPr>
+        <p:cNvPr id="1" name=""/>
+        <p:cNvGrpSpPr/>
+        <p:nvPr/>
+      </p:nvGrpSpPr>
+      <p:grpSpPr>
+        <a:xfrm>
+          <a:off x="0" y="0"/>
+          <a:ext cx="0" cy="0"/>
+          <a:chOff x="0" y="0"/>
+          <a:chExt cx="0" cy="0"/>
+        </a:xfrm>
+      </p:grpSpPr>
+      <p:sp>
+        <p:nvSpPr>
+          <p:cNvPr id="2" name="Slide Image Placeholder 1"/>
+          <p:cNvSpPr>
+            <a:spLocks noGrp="1" noRot="1" noChangeAspect="1"/>
+          </p:cNvSpPr>
+          <p:nvPr>
+            <p:ph type="sldImg"/>
+          </p:nvPr>
+        </p:nvSpPr>
+        <p:spPr/>
+      </p:sp>
+      <p:sp>
+        <p:nvSpPr>
+          <p:cNvPr id="3" name="Notes Placeholder 2"/>
+          <p:cNvSpPr>
+            <a:spLocks noGrp="1"/>
+          </p:cNvSpPr>
+          <p:nvPr>
+            <p:ph type="body" idx="1"/>
+          </p:nvPr>
+        </p:nvSpPr>
+        <p:spPr/>
+        <p:txBody>
+          <a:bodyPr/>
+          <a:lstStyle/>
+          <a:p>
+            <a:r>
+              <a:rPr lang="en-CA" dirty="0"/>
+              <a:t>More recently, I began comparing the instruments not just by comparing their plots, but by finding individual pairs of measurements from the instruments that were within a spatial range of 500km and temporal range of 8 hours. I computed various statistics such as absolute differences which is a difference between individual pairs of measurements, relative differences which tell you how different the measurements are relative to the magnitude of the individual measurements and </a:t>
+            </a:r>
+            <a:r>
+              <a:rPr lang="en-CA" dirty="0" err="1"/>
+              <a:t>pearson</a:t>
+            </a:r>
+            <a:r>
+              <a:rPr lang="en-CA" dirty="0"/>
+              <a:t> correlation coefficients. I also computed the mean of these statistics and represented them in plots which I will show on subsequent slides.</a:t>
+            </a:r>
+          </a:p>
+        </p:txBody>
+      </p:sp>
+      <p:sp>
+        <p:nvSpPr>
+          <p:cNvPr id="4" name="Slide Number Placeholder 3"/>
+          <p:cNvSpPr>
+            <a:spLocks noGrp="1"/>
+          </p:cNvSpPr>
+          <p:nvPr>
+            <p:ph type="sldNum" sz="quarter" idx="5"/>
+          </p:nvPr>
+        </p:nvSpPr>
+        <p:spPr/>
+        <p:txBody>
+          <a:bodyPr/>
+          <a:lstStyle/>
+          <a:p>
+            <a:fld id="{8B41CBF8-1438-49AC-8524-04FF51CA9B3F}" type="slidenum">
+              <a:rPr lang="en-CA" smtClean="0"/>
+              <a:t>14</a:t>
+            </a:fld>
+            <a:endParaRPr lang="en-CA"/>
+          </a:p>
+        </p:txBody>
+      </p:sp>
+    </p:spTree>
+    <p:extLst>
+      <p:ext uri="{BB962C8B-B14F-4D97-AF65-F5344CB8AC3E}">
+        <p14:creationId xmlns:p14="http://schemas.microsoft.com/office/powerpoint/2010/main" val="2757898928"/>
       </p:ext>
     </p:extLst>
   </p:cSld>
@@ -2279,7 +2775,7 @@
           <a:p>
             <a:fld id="{1160EA64-D806-43AC-9DF2-F8C432F32B4C}" type="datetimeFigureOut">
               <a:rPr lang="en-US" dirty="0"/>
-              <a:t>6/25/2025</a:t>
+              <a:t>7/3/2025</a:t>
             </a:fld>
             <a:endParaRPr lang="en-US" dirty="0"/>
           </a:p>
@@ -2445,7 +2941,7 @@
           <a:p>
             <a:fld id="{E9F9C37B-1D36-470B-8223-D6C91242EC14}" type="datetimeFigureOut">
               <a:rPr lang="en-US" dirty="0"/>
-              <a:t>6/25/2025</a:t>
+              <a:t>7/3/2025</a:t>
             </a:fld>
             <a:endParaRPr lang="en-US" dirty="0"/>
           </a:p>
@@ -2620,7 +3116,7 @@
           <a:p>
             <a:fld id="{67C6F52A-A82B-47A2-A83A-8C4C91F2D59F}" type="datetimeFigureOut">
               <a:rPr lang="en-US" dirty="0"/>
-              <a:t>6/25/2025</a:t>
+              <a:t>7/3/2025</a:t>
             </a:fld>
             <a:endParaRPr lang="en-US" dirty="0"/>
           </a:p>
@@ -2785,7 +3281,7 @@
           <a:p>
             <a:fld id="{F070A7B3-6521-4DCA-87E5-044747A908C1}" type="datetimeFigureOut">
               <a:rPr lang="en-US" dirty="0"/>
-              <a:t>6/25/2025</a:t>
+              <a:t>7/3/2025</a:t>
             </a:fld>
             <a:endParaRPr lang="en-US" dirty="0"/>
           </a:p>
@@ -3049,7 +3545,7 @@
           <a:p>
             <a:fld id="{1160EA64-D806-43AC-9DF2-F8C432F32B4C}" type="datetimeFigureOut">
               <a:rPr lang="en-US" dirty="0"/>
-              <a:t>6/25/2025</a:t>
+              <a:t>7/3/2025</a:t>
             </a:fld>
             <a:endParaRPr lang="en-US" dirty="0"/>
           </a:p>
@@ -3277,7 +3773,7 @@
           <a:p>
             <a:fld id="{AB134690-1557-4C89-A502-4959FE7FAD70}" type="datetimeFigureOut">
               <a:rPr lang="en-US" dirty="0"/>
-              <a:t>6/25/2025</a:t>
+              <a:t>7/3/2025</a:t>
             </a:fld>
             <a:endParaRPr lang="en-US" dirty="0"/>
           </a:p>
@@ -3631,7 +4127,7 @@
           <a:p>
             <a:fld id="{4F7D4976-E339-4826-83B7-FBD03F55ECF8}" type="datetimeFigureOut">
               <a:rPr lang="en-US" dirty="0"/>
-              <a:t>6/25/2025</a:t>
+              <a:t>7/3/2025</a:t>
             </a:fld>
             <a:endParaRPr lang="en-US" dirty="0"/>
           </a:p>
@@ -3767,7 +4263,7 @@
           <a:p>
             <a:fld id="{E1037C31-9E7A-4F99-8774-A0E530DE1A42}" type="datetimeFigureOut">
               <a:rPr lang="en-US" dirty="0"/>
-              <a:t>6/25/2025</a:t>
+              <a:t>7/3/2025</a:t>
             </a:fld>
             <a:endParaRPr lang="en-US" dirty="0"/>
           </a:p>
@@ -3857,7 +4353,7 @@
           <a:p>
             <a:fld id="{C278504F-A551-4DE0-9316-4DCD1D8CC752}" type="datetimeFigureOut">
               <a:rPr lang="en-US" dirty="0"/>
-              <a:t>6/25/2025</a:t>
+              <a:t>7/3/2025</a:t>
             </a:fld>
             <a:endParaRPr lang="en-US" dirty="0"/>
           </a:p>
@@ -4209,7 +4705,7 @@
           <a:p>
             <a:fld id="{D1BE4249-C0D0-4B06-8692-E8BB871AF643}" type="datetimeFigureOut">
               <a:rPr lang="en-US" dirty="0"/>
-              <a:t>6/25/2025</a:t>
+              <a:t>7/3/2025</a:t>
             </a:fld>
             <a:endParaRPr lang="en-US" dirty="0"/>
           </a:p>
@@ -4561,7 +5057,7 @@
           <a:p>
             <a:fld id="{042B0DB6-F5C7-45FB-8CF3-31B45F9C2DAC}" type="datetimeFigureOut">
               <a:rPr lang="en-US" dirty="0"/>
-              <a:t>6/25/2025</a:t>
+              <a:t>7/3/2025</a:t>
             </a:fld>
             <a:endParaRPr lang="en-US" dirty="0"/>
           </a:p>
@@ -4798,7 +5294,7 @@
           <a:p>
             <a:fld id="{1160EA64-D806-43AC-9DF2-F8C432F32B4C}" type="datetimeFigureOut">
               <a:rPr lang="en-US" dirty="0"/>
-              <a:t>6/25/2025</a:t>
+              <a:t>7/3/2025</a:t>
             </a:fld>
             <a:endParaRPr lang="en-US" dirty="0"/>
           </a:p>
@@ -5325,6 +5821,64 @@
 <file path=ppt/slides/slide10.xml><?xml version="1.0" encoding="utf-8"?>
 <p:sld xmlns:a="http://schemas.openxmlformats.org/drawingml/2006/main" xmlns:r="http://schemas.openxmlformats.org/officeDocument/2006/relationships" xmlns:p="http://schemas.openxmlformats.org/presentationml/2006/main">
   <p:cSld>
+    <p:spTree>
+      <p:nvGrpSpPr>
+        <p:cNvPr id="1" name=""/>
+        <p:cNvGrpSpPr/>
+        <p:nvPr/>
+      </p:nvGrpSpPr>
+      <p:grpSpPr>
+        <a:xfrm>
+          <a:off x="0" y="0"/>
+          <a:ext cx="0" cy="0"/>
+          <a:chOff x="0" y="0"/>
+          <a:chExt cx="0" cy="0"/>
+        </a:xfrm>
+      </p:grpSpPr>
+      <p:sp>
+        <p:nvSpPr>
+          <p:cNvPr id="2" name="Title 1">
+            <a:extLst>
+              <a:ext uri="{FF2B5EF4-FFF2-40B4-BE49-F238E27FC236}">
+                <a16:creationId xmlns:a16="http://schemas.microsoft.com/office/drawing/2014/main" id="{62AA0C32-1D6E-6D9B-AA97-2BE9542C392E}"/>
+              </a:ext>
+            </a:extLst>
+          </p:cNvPr>
+          <p:cNvSpPr>
+            <a:spLocks noGrp="1"/>
+          </p:cNvSpPr>
+          <p:nvPr>
+            <p:ph type="ctrTitle"/>
+          </p:nvPr>
+        </p:nvSpPr>
+        <p:spPr/>
+        <p:txBody>
+          <a:bodyPr/>
+          <a:lstStyle/>
+          <a:p>
+            <a:r>
+              <a:rPr lang="en-CA" dirty="0"/>
+              <a:t>Getting started</a:t>
+            </a:r>
+          </a:p>
+        </p:txBody>
+      </p:sp>
+    </p:spTree>
+    <p:extLst>
+      <p:ext uri="{BB962C8B-B14F-4D97-AF65-F5344CB8AC3E}">
+        <p14:creationId xmlns:p14="http://schemas.microsoft.com/office/powerpoint/2010/main" val="4023663782"/>
+      </p:ext>
+    </p:extLst>
+  </p:cSld>
+  <p:clrMapOvr>
+    <a:masterClrMapping/>
+  </p:clrMapOvr>
+</p:sld>
+</file>
+
+<file path=ppt/slides/slide11.xml><?xml version="1.0" encoding="utf-8"?>
+<p:sld xmlns:a="http://schemas.openxmlformats.org/drawingml/2006/main" xmlns:r="http://schemas.openxmlformats.org/officeDocument/2006/relationships" xmlns:p="http://schemas.openxmlformats.org/presentationml/2006/main">
+  <p:cSld>
     <p:bg>
       <p:bgPr>
         <a:solidFill>
@@ -5563,7 +6117,7 @@
 </p:sld>
 </file>
 
-<file path=ppt/slides/slide11.xml><?xml version="1.0" encoding="utf-8"?>
+<file path=ppt/slides/slide12.xml><?xml version="1.0" encoding="utf-8"?>
 <p:sld xmlns:a="http://schemas.openxmlformats.org/drawingml/2006/main" xmlns:r="http://schemas.openxmlformats.org/officeDocument/2006/relationships" xmlns:p="http://schemas.openxmlformats.org/presentationml/2006/main">
   <p:cSld>
     <p:spTree>
@@ -5709,86 +6263,6 @@
 </p:sld>
 </file>
 
-<file path=ppt/slides/slide12.xml><?xml version="1.0" encoding="utf-8"?>
-<p:sld xmlns:a="http://schemas.openxmlformats.org/drawingml/2006/main" xmlns:r="http://schemas.openxmlformats.org/officeDocument/2006/relationships" xmlns:p="http://schemas.openxmlformats.org/presentationml/2006/main">
-  <p:cSld>
-    <p:spTree>
-      <p:nvGrpSpPr>
-        <p:cNvPr id="1" name=""/>
-        <p:cNvGrpSpPr/>
-        <p:nvPr/>
-      </p:nvGrpSpPr>
-      <p:grpSpPr>
-        <a:xfrm>
-          <a:off x="0" y="0"/>
-          <a:ext cx="0" cy="0"/>
-          <a:chOff x="0" y="0"/>
-          <a:chExt cx="0" cy="0"/>
-        </a:xfrm>
-      </p:grpSpPr>
-      <p:sp>
-        <p:nvSpPr>
-          <p:cNvPr id="2" name="Title 1">
-            <a:extLst>
-              <a:ext uri="{FF2B5EF4-FFF2-40B4-BE49-F238E27FC236}">
-                <a16:creationId xmlns:a16="http://schemas.microsoft.com/office/drawing/2014/main" id="{B1E33F58-D219-71B0-899C-AC64DA4EA566}"/>
-              </a:ext>
-            </a:extLst>
-          </p:cNvPr>
-          <p:cNvSpPr>
-            <a:spLocks noGrp="1"/>
-          </p:cNvSpPr>
-          <p:nvPr>
-            <p:ph type="title"/>
-          </p:nvPr>
-        </p:nvSpPr>
-        <p:spPr/>
-        <p:txBody>
-          <a:bodyPr/>
-          <a:lstStyle/>
-          <a:p>
-            <a:endParaRPr lang="en-CA" dirty="0"/>
-          </a:p>
-        </p:txBody>
-      </p:sp>
-      <p:sp>
-        <p:nvSpPr>
-          <p:cNvPr id="3" name="Content Placeholder 2">
-            <a:extLst>
-              <a:ext uri="{FF2B5EF4-FFF2-40B4-BE49-F238E27FC236}">
-                <a16:creationId xmlns:a16="http://schemas.microsoft.com/office/drawing/2014/main" id="{02701640-DD03-C95C-2123-D0E1D90D0B9C}"/>
-              </a:ext>
-            </a:extLst>
-          </p:cNvPr>
-          <p:cNvSpPr>
-            <a:spLocks noGrp="1"/>
-          </p:cNvSpPr>
-          <p:nvPr>
-            <p:ph idx="1"/>
-          </p:nvPr>
-        </p:nvSpPr>
-        <p:spPr/>
-        <p:txBody>
-          <a:bodyPr/>
-          <a:lstStyle/>
-          <a:p>
-            <a:endParaRPr lang="en-CA"/>
-          </a:p>
-        </p:txBody>
-      </p:sp>
-    </p:spTree>
-    <p:extLst>
-      <p:ext uri="{BB962C8B-B14F-4D97-AF65-F5344CB8AC3E}">
-        <p14:creationId xmlns:p14="http://schemas.microsoft.com/office/powerpoint/2010/main" val="56333691"/>
-      </p:ext>
-    </p:extLst>
-  </p:cSld>
-  <p:clrMapOvr>
-    <a:masterClrMapping/>
-  </p:clrMapOvr>
-</p:sld>
-</file>
-
 <file path=ppt/slides/slide13.xml><?xml version="1.0" encoding="utf-8"?>
 <p:sld xmlns:a="http://schemas.openxmlformats.org/drawingml/2006/main" xmlns:r="http://schemas.openxmlformats.org/officeDocument/2006/relationships" xmlns:p="http://schemas.openxmlformats.org/presentationml/2006/main">
   <p:cSld>
@@ -5806,89 +6280,6 @@
           <a:chExt cx="0" cy="0"/>
         </a:xfrm>
       </p:grpSpPr>
-      <p:grpSp>
-        <p:nvGrpSpPr>
-          <p:cNvPr id="11" name="Group 10">
-            <a:extLst>
-              <a:ext uri="{FF2B5EF4-FFF2-40B4-BE49-F238E27FC236}">
-                <a16:creationId xmlns:a16="http://schemas.microsoft.com/office/drawing/2014/main" id="{1EC8DB55-7239-3F5D-6BDF-E53F8E8D3C8D}"/>
-              </a:ext>
-            </a:extLst>
-          </p:cNvPr>
-          <p:cNvGrpSpPr/>
-          <p:nvPr/>
-        </p:nvGrpSpPr>
-        <p:grpSpPr>
-          <a:xfrm>
-            <a:off x="-2" y="1483822"/>
-            <a:ext cx="6096002" cy="5374178"/>
-            <a:chOff x="294289" y="2099135"/>
-            <a:chExt cx="5412828" cy="4825776"/>
-          </a:xfrm>
-        </p:grpSpPr>
-        <p:pic>
-          <p:nvPicPr>
-            <p:cNvPr id="8" name="Picture 7">
-              <a:extLst>
-                <a:ext uri="{FF2B5EF4-FFF2-40B4-BE49-F238E27FC236}">
-                  <a16:creationId xmlns:a16="http://schemas.microsoft.com/office/drawing/2014/main" id="{30D8A99A-11CC-EABE-2789-BBC207CCB786}"/>
-                </a:ext>
-              </a:extLst>
-            </p:cNvPr>
-            <p:cNvPicPr>
-              <a:picLocks noChangeAspect="1"/>
-            </p:cNvPicPr>
-            <p:nvPr/>
-          </p:nvPicPr>
-          <p:blipFill>
-            <a:blip r:embed="rId2"/>
-            <a:srcRect l="53420" t="5917" r="-211" b="48851"/>
-            <a:stretch>
-              <a:fillRect/>
-            </a:stretch>
-          </p:blipFill>
-          <p:spPr>
-            <a:xfrm>
-              <a:off x="294289" y="2359768"/>
-              <a:ext cx="5412828" cy="4565143"/>
-            </a:xfrm>
-            <a:prstGeom prst="rect">
-              <a:avLst/>
-            </a:prstGeom>
-          </p:spPr>
-        </p:pic>
-        <p:pic>
-          <p:nvPicPr>
-            <p:cNvPr id="9" name="Picture 8">
-              <a:extLst>
-                <a:ext uri="{FF2B5EF4-FFF2-40B4-BE49-F238E27FC236}">
-                  <a16:creationId xmlns:a16="http://schemas.microsoft.com/office/drawing/2014/main" id="{C622486C-FC38-B043-7F3A-F7C1573C4415}"/>
-                </a:ext>
-              </a:extLst>
-            </p:cNvPr>
-            <p:cNvPicPr>
-              <a:picLocks noChangeAspect="1"/>
-            </p:cNvPicPr>
-            <p:nvPr/>
-          </p:nvPicPr>
-          <p:blipFill>
-            <a:blip r:embed="rId2"/>
-            <a:srcRect l="16840" t="-463" r="17851" b="96859"/>
-            <a:stretch>
-              <a:fillRect/>
-            </a:stretch>
-          </p:blipFill>
-          <p:spPr>
-            <a:xfrm>
-              <a:off x="294289" y="2099135"/>
-              <a:ext cx="5412828" cy="260633"/>
-            </a:xfrm>
-            <a:prstGeom prst="rect">
-              <a:avLst/>
-            </a:prstGeom>
-          </p:spPr>
-        </p:pic>
-      </p:grpSp>
       <p:grpSp>
         <p:nvGrpSpPr>
           <p:cNvPr id="16" name="Group 15">
@@ -6177,6 +6568,89 @@
           </a:fontRef>
         </p:style>
       </p:cxnSp>
+      <p:grpSp>
+        <p:nvGrpSpPr>
+          <p:cNvPr id="17" name="Group 16">
+            <a:extLst>
+              <a:ext uri="{FF2B5EF4-FFF2-40B4-BE49-F238E27FC236}">
+                <a16:creationId xmlns:a16="http://schemas.microsoft.com/office/drawing/2014/main" id="{00187752-1694-B4FF-C3A7-D5693840E458}"/>
+              </a:ext>
+            </a:extLst>
+          </p:cNvPr>
+          <p:cNvGrpSpPr/>
+          <p:nvPr/>
+        </p:nvGrpSpPr>
+        <p:grpSpPr>
+          <a:xfrm>
+            <a:off x="-1" y="1520169"/>
+            <a:ext cx="6060790" cy="5337832"/>
+            <a:chOff x="-1" y="1520169"/>
+            <a:chExt cx="6060790" cy="5337832"/>
+          </a:xfrm>
+        </p:grpSpPr>
+        <p:pic>
+          <p:nvPicPr>
+            <p:cNvPr id="3" name="Picture 2">
+              <a:extLst>
+                <a:ext uri="{FF2B5EF4-FFF2-40B4-BE49-F238E27FC236}">
+                  <a16:creationId xmlns:a16="http://schemas.microsoft.com/office/drawing/2014/main" id="{AAC26FC4-6B54-E547-8ADB-6F910639DE07}"/>
+                </a:ext>
+              </a:extLst>
+            </p:cNvPr>
+            <p:cNvPicPr>
+              <a:picLocks noChangeAspect="1"/>
+            </p:cNvPicPr>
+            <p:nvPr/>
+          </p:nvPicPr>
+          <p:blipFill>
+            <a:blip r:embed="rId4"/>
+            <a:srcRect l="53396" t="6193" r="46" b="49592"/>
+            <a:stretch>
+              <a:fillRect/>
+            </a:stretch>
+          </p:blipFill>
+          <p:spPr>
+            <a:xfrm>
+              <a:off x="-1" y="1790711"/>
+              <a:ext cx="6060790" cy="5067290"/>
+            </a:xfrm>
+            <a:prstGeom prst="rect">
+              <a:avLst/>
+            </a:prstGeom>
+          </p:spPr>
+        </p:pic>
+        <p:pic>
+          <p:nvPicPr>
+            <p:cNvPr id="10" name="Picture 9">
+              <a:extLst>
+                <a:ext uri="{FF2B5EF4-FFF2-40B4-BE49-F238E27FC236}">
+                  <a16:creationId xmlns:a16="http://schemas.microsoft.com/office/drawing/2014/main" id="{9C27173B-FD9E-8CB7-8DEA-3C5EC4D86E94}"/>
+                </a:ext>
+              </a:extLst>
+            </p:cNvPr>
+            <p:cNvPicPr>
+              <a:picLocks noChangeAspect="1"/>
+            </p:cNvPicPr>
+            <p:nvPr/>
+          </p:nvPicPr>
+          <p:blipFill>
+            <a:blip r:embed="rId2"/>
+            <a:srcRect l="17101" t="97" r="18486" b="96603"/>
+            <a:stretch>
+              <a:fillRect/>
+            </a:stretch>
+          </p:blipFill>
+          <p:spPr>
+            <a:xfrm>
+              <a:off x="-1" y="1520169"/>
+              <a:ext cx="6047300" cy="270542"/>
+            </a:xfrm>
+            <a:prstGeom prst="rect">
+              <a:avLst/>
+            </a:prstGeom>
+          </p:spPr>
+        </p:pic>
+      </p:grpSp>
     </p:spTree>
     <p:extLst>
       <p:ext uri="{BB962C8B-B14F-4D97-AF65-F5344CB8AC3E}">
@@ -6212,6 +6686,905 @@
           <p:cNvPr id="2" name="Title 1">
             <a:extLst>
               <a:ext uri="{FF2B5EF4-FFF2-40B4-BE49-F238E27FC236}">
+                <a16:creationId xmlns:a16="http://schemas.microsoft.com/office/drawing/2014/main" id="{B1E33F58-D219-71B0-899C-AC64DA4EA566}"/>
+              </a:ext>
+            </a:extLst>
+          </p:cNvPr>
+          <p:cNvSpPr>
+            <a:spLocks noGrp="1"/>
+          </p:cNvSpPr>
+          <p:nvPr>
+            <p:ph type="title"/>
+          </p:nvPr>
+        </p:nvSpPr>
+        <p:spPr/>
+        <p:txBody>
+          <a:bodyPr/>
+          <a:lstStyle/>
+          <a:p>
+            <a:r>
+              <a:rPr lang="en-CA" dirty="0"/>
+              <a:t>RECENT FINDINGS</a:t>
+            </a:r>
+          </a:p>
+        </p:txBody>
+      </p:sp>
+      <mc:AlternateContent xmlns:mc="http://schemas.openxmlformats.org/markup-compatibility/2006" xmlns:a14="http://schemas.microsoft.com/office/drawing/2010/main">
+        <mc:Choice Requires="a14">
+          <p:sp>
+            <p:nvSpPr>
+              <p:cNvPr id="3" name="Content Placeholder 2">
+                <a:extLst>
+                  <a:ext uri="{FF2B5EF4-FFF2-40B4-BE49-F238E27FC236}">
+                    <a16:creationId xmlns:a16="http://schemas.microsoft.com/office/drawing/2014/main" id="{02701640-DD03-C95C-2123-D0E1D90D0B9C}"/>
+                  </a:ext>
+                </a:extLst>
+              </p:cNvPr>
+              <p:cNvSpPr>
+                <a:spLocks noGrp="1"/>
+              </p:cNvSpPr>
+              <p:nvPr>
+                <p:ph idx="1"/>
+              </p:nvPr>
+            </p:nvSpPr>
+            <p:spPr/>
+            <p:txBody>
+              <a:bodyPr/>
+              <a:lstStyle/>
+              <a:p>
+                <a:r>
+                  <a:rPr lang="en-CA" dirty="0"/>
+                  <a:t>Different Perspective: Finding coincident pairs of measurements</a:t>
+                </a:r>
+              </a:p>
+              <a:p>
+                <a:r>
+                  <a:rPr lang="en-CA" dirty="0"/>
+                  <a:t>Coincidence criteria: 500km and 8 hours</a:t>
+                </a:r>
+              </a:p>
+              <a:p>
+                <a:r>
+                  <a:rPr lang="en-CA" dirty="0"/>
+                  <a:t>Statistics computed: </a:t>
+                </a:r>
+              </a:p>
+              <a:p>
+                <a:pPr lvl="1"/>
+                <a14:m>
+                  <m:oMath xmlns:m="http://schemas.openxmlformats.org/officeDocument/2006/math">
+                    <m:r>
+                      <a:rPr lang="en-CA" b="0" i="1" smtClean="0">
+                        <a:latin typeface="Cambria Math" panose="02040503050406030204" pitchFamily="18" charset="0"/>
+                      </a:rPr>
+                      <m:t>𝑅𝑒𝑙𝑎𝑡𝑖𝑣𝑒</m:t>
+                    </m:r>
+                    <m:r>
+                      <a:rPr lang="en-CA" b="0" i="1" smtClean="0">
+                        <a:latin typeface="Cambria Math" panose="02040503050406030204" pitchFamily="18" charset="0"/>
+                      </a:rPr>
+                      <m:t> </m:t>
+                    </m:r>
+                    <m:r>
+                      <a:rPr lang="en-CA" b="0" i="1" smtClean="0">
+                        <a:latin typeface="Cambria Math" panose="02040503050406030204" pitchFamily="18" charset="0"/>
+                      </a:rPr>
+                      <m:t>𝑑𝑖𝑓𝑓𝑒𝑟𝑒𝑛𝑐𝑒</m:t>
+                    </m:r>
+                    <m:r>
+                      <a:rPr lang="en-CA" b="0" i="1" smtClean="0">
+                        <a:latin typeface="Cambria Math" panose="02040503050406030204" pitchFamily="18" charset="0"/>
+                      </a:rPr>
+                      <m:t> </m:t>
+                    </m:r>
+                    <m:d>
+                      <m:dPr>
+                        <m:ctrlPr>
+                          <a:rPr lang="en-CA" b="0" i="1" smtClean="0">
+                            <a:latin typeface="Cambria Math" panose="02040503050406030204" pitchFamily="18" charset="0"/>
+                          </a:rPr>
+                        </m:ctrlPr>
+                      </m:dPr>
+                      <m:e>
+                        <m:r>
+                          <a:rPr lang="en-CA" b="0" i="1" smtClean="0">
+                            <a:latin typeface="Cambria Math" panose="02040503050406030204" pitchFamily="18" charset="0"/>
+                          </a:rPr>
+                          <m:t>%</m:t>
+                        </m:r>
+                      </m:e>
+                    </m:d>
+                    <m:r>
+                      <a:rPr lang="en-CA" b="0" i="1" smtClean="0">
+                        <a:latin typeface="Cambria Math" panose="02040503050406030204" pitchFamily="18" charset="0"/>
+                      </a:rPr>
+                      <m:t>=100 </m:t>
+                    </m:r>
+                    <m:r>
+                      <a:rPr lang="en-CA" b="0" i="1" smtClean="0">
+                        <a:latin typeface="Cambria Math" panose="02040503050406030204" pitchFamily="18" charset="0"/>
+                        <a:ea typeface="Cambria Math" panose="02040503050406030204" pitchFamily="18" charset="0"/>
+                      </a:rPr>
+                      <m:t>× </m:t>
+                    </m:r>
+                    <m:f>
+                      <m:fPr>
+                        <m:ctrlPr>
+                          <a:rPr lang="en-CA" b="0" i="1" smtClean="0">
+                            <a:latin typeface="Cambria Math" panose="02040503050406030204" pitchFamily="18" charset="0"/>
+                            <a:ea typeface="Cambria Math" panose="02040503050406030204" pitchFamily="18" charset="0"/>
+                          </a:rPr>
+                        </m:ctrlPr>
+                      </m:fPr>
+                      <m:num>
+                        <m:sSub>
+                          <m:sSubPr>
+                            <m:ctrlPr>
+                              <a:rPr lang="en-CA" b="0" i="1" smtClean="0">
+                                <a:latin typeface="Cambria Math" panose="02040503050406030204" pitchFamily="18" charset="0"/>
+                                <a:ea typeface="Cambria Math" panose="02040503050406030204" pitchFamily="18" charset="0"/>
+                              </a:rPr>
+                            </m:ctrlPr>
+                          </m:sSubPr>
+                          <m:e>
+                            <m:r>
+                              <a:rPr lang="en-CA" b="0" i="1" smtClean="0">
+                                <a:latin typeface="Cambria Math" panose="02040503050406030204" pitchFamily="18" charset="0"/>
+                                <a:ea typeface="Cambria Math" panose="02040503050406030204" pitchFamily="18" charset="0"/>
+                              </a:rPr>
+                              <m:t>𝑀</m:t>
+                            </m:r>
+                          </m:e>
+                          <m:sub>
+                            <m:r>
+                              <a:rPr lang="en-CA" b="0" i="1" smtClean="0">
+                                <a:latin typeface="Cambria Math" panose="02040503050406030204" pitchFamily="18" charset="0"/>
+                                <a:ea typeface="Cambria Math" panose="02040503050406030204" pitchFamily="18" charset="0"/>
+                              </a:rPr>
+                              <m:t>1</m:t>
+                            </m:r>
+                          </m:sub>
+                        </m:sSub>
+                        <m:r>
+                          <a:rPr lang="en-CA" b="0" i="1" smtClean="0">
+                            <a:latin typeface="Cambria Math" panose="02040503050406030204" pitchFamily="18" charset="0"/>
+                            <a:ea typeface="Cambria Math" panose="02040503050406030204" pitchFamily="18" charset="0"/>
+                          </a:rPr>
+                          <m:t>−</m:t>
+                        </m:r>
+                        <m:sSub>
+                          <m:sSubPr>
+                            <m:ctrlPr>
+                              <a:rPr lang="en-CA" b="0" i="1" smtClean="0">
+                                <a:latin typeface="Cambria Math" panose="02040503050406030204" pitchFamily="18" charset="0"/>
+                                <a:ea typeface="Cambria Math" panose="02040503050406030204" pitchFamily="18" charset="0"/>
+                              </a:rPr>
+                            </m:ctrlPr>
+                          </m:sSubPr>
+                          <m:e>
+                            <m:r>
+                              <a:rPr lang="en-CA" b="0" i="1" smtClean="0">
+                                <a:latin typeface="Cambria Math" panose="02040503050406030204" pitchFamily="18" charset="0"/>
+                                <a:ea typeface="Cambria Math" panose="02040503050406030204" pitchFamily="18" charset="0"/>
+                              </a:rPr>
+                              <m:t>𝑀</m:t>
+                            </m:r>
+                          </m:e>
+                          <m:sub>
+                            <m:r>
+                              <a:rPr lang="en-CA" b="0" i="1" smtClean="0">
+                                <a:latin typeface="Cambria Math" panose="02040503050406030204" pitchFamily="18" charset="0"/>
+                                <a:ea typeface="Cambria Math" panose="02040503050406030204" pitchFamily="18" charset="0"/>
+                              </a:rPr>
+                              <m:t>2</m:t>
+                            </m:r>
+                          </m:sub>
+                        </m:sSub>
+                      </m:num>
+                      <m:den>
+                        <m:r>
+                          <a:rPr lang="en-CA" b="0" i="1" smtClean="0">
+                            <a:latin typeface="Cambria Math" panose="02040503050406030204" pitchFamily="18" charset="0"/>
+                            <a:ea typeface="Cambria Math" panose="02040503050406030204" pitchFamily="18" charset="0"/>
+                          </a:rPr>
+                          <m:t>(</m:t>
+                        </m:r>
+                        <m:f>
+                          <m:fPr>
+                            <m:ctrlPr>
+                              <a:rPr lang="en-CA" b="0" i="1" smtClean="0">
+                                <a:latin typeface="Cambria Math" panose="02040503050406030204" pitchFamily="18" charset="0"/>
+                                <a:ea typeface="Cambria Math" panose="02040503050406030204" pitchFamily="18" charset="0"/>
+                              </a:rPr>
+                            </m:ctrlPr>
+                          </m:fPr>
+                          <m:num>
+                            <m:sSub>
+                              <m:sSubPr>
+                                <m:ctrlPr>
+                                  <a:rPr lang="en-CA" b="0" i="1" smtClean="0">
+                                    <a:latin typeface="Cambria Math" panose="02040503050406030204" pitchFamily="18" charset="0"/>
+                                    <a:ea typeface="Cambria Math" panose="02040503050406030204" pitchFamily="18" charset="0"/>
+                                  </a:rPr>
+                                </m:ctrlPr>
+                              </m:sSubPr>
+                              <m:e>
+                                <m:r>
+                                  <a:rPr lang="en-CA" b="0" i="1" smtClean="0">
+                                    <a:latin typeface="Cambria Math" panose="02040503050406030204" pitchFamily="18" charset="0"/>
+                                    <a:ea typeface="Cambria Math" panose="02040503050406030204" pitchFamily="18" charset="0"/>
+                                  </a:rPr>
+                                  <m:t>𝑀</m:t>
+                                </m:r>
+                              </m:e>
+                              <m:sub>
+                                <m:r>
+                                  <a:rPr lang="en-CA" b="0" i="1" smtClean="0">
+                                    <a:latin typeface="Cambria Math" panose="02040503050406030204" pitchFamily="18" charset="0"/>
+                                    <a:ea typeface="Cambria Math" panose="02040503050406030204" pitchFamily="18" charset="0"/>
+                                  </a:rPr>
+                                  <m:t>1</m:t>
+                                </m:r>
+                              </m:sub>
+                            </m:sSub>
+                            <m:r>
+                              <a:rPr lang="en-CA" b="0" i="1" smtClean="0">
+                                <a:latin typeface="Cambria Math" panose="02040503050406030204" pitchFamily="18" charset="0"/>
+                                <a:ea typeface="Cambria Math" panose="02040503050406030204" pitchFamily="18" charset="0"/>
+                              </a:rPr>
+                              <m:t>+</m:t>
+                            </m:r>
+                            <m:sSub>
+                              <m:sSubPr>
+                                <m:ctrlPr>
+                                  <a:rPr lang="en-CA" b="0" i="1" smtClean="0">
+                                    <a:latin typeface="Cambria Math" panose="02040503050406030204" pitchFamily="18" charset="0"/>
+                                    <a:ea typeface="Cambria Math" panose="02040503050406030204" pitchFamily="18" charset="0"/>
+                                  </a:rPr>
+                                </m:ctrlPr>
+                              </m:sSubPr>
+                              <m:e>
+                                <m:r>
+                                  <a:rPr lang="en-CA" b="0" i="1" smtClean="0">
+                                    <a:latin typeface="Cambria Math" panose="02040503050406030204" pitchFamily="18" charset="0"/>
+                                    <a:ea typeface="Cambria Math" panose="02040503050406030204" pitchFamily="18" charset="0"/>
+                                  </a:rPr>
+                                  <m:t>𝑀</m:t>
+                                </m:r>
+                              </m:e>
+                              <m:sub>
+                                <m:r>
+                                  <a:rPr lang="en-CA" b="0" i="1" smtClean="0">
+                                    <a:latin typeface="Cambria Math" panose="02040503050406030204" pitchFamily="18" charset="0"/>
+                                    <a:ea typeface="Cambria Math" panose="02040503050406030204" pitchFamily="18" charset="0"/>
+                                  </a:rPr>
+                                  <m:t>2</m:t>
+                                </m:r>
+                              </m:sub>
+                            </m:sSub>
+                          </m:num>
+                          <m:den>
+                            <m:r>
+                              <a:rPr lang="en-CA" b="0" i="1" smtClean="0">
+                                <a:latin typeface="Cambria Math" panose="02040503050406030204" pitchFamily="18" charset="0"/>
+                                <a:ea typeface="Cambria Math" panose="02040503050406030204" pitchFamily="18" charset="0"/>
+                              </a:rPr>
+                              <m:t>2</m:t>
+                            </m:r>
+                          </m:den>
+                        </m:f>
+                        <m:r>
+                          <a:rPr lang="en-CA" b="0" i="1" smtClean="0">
+                            <a:latin typeface="Cambria Math" panose="02040503050406030204" pitchFamily="18" charset="0"/>
+                            <a:ea typeface="Cambria Math" panose="02040503050406030204" pitchFamily="18" charset="0"/>
+                          </a:rPr>
+                          <m:t>)</m:t>
+                        </m:r>
+                      </m:den>
+                    </m:f>
+                  </m:oMath>
+                </a14:m>
+                <a:endParaRPr lang="en-CA" dirty="0"/>
+              </a:p>
+              <a:p>
+                <a:pPr lvl="1"/>
+                <a14:m>
+                  <m:oMath xmlns:m="http://schemas.openxmlformats.org/officeDocument/2006/math">
+                    <m:r>
+                      <a:rPr lang="en-CA" b="0" i="1" smtClean="0">
+                        <a:latin typeface="Cambria Math" panose="02040503050406030204" pitchFamily="18" charset="0"/>
+                      </a:rPr>
+                      <m:t>𝐴𝑏𝑠𝑜𝑙𝑢𝑡𝑒</m:t>
+                    </m:r>
+                    <m:r>
+                      <a:rPr lang="en-CA" i="1">
+                        <a:latin typeface="Cambria Math" panose="02040503050406030204" pitchFamily="18" charset="0"/>
+                      </a:rPr>
+                      <m:t> </m:t>
+                    </m:r>
+                    <m:r>
+                      <a:rPr lang="en-CA" i="1">
+                        <a:latin typeface="Cambria Math" panose="02040503050406030204" pitchFamily="18" charset="0"/>
+                      </a:rPr>
+                      <m:t>𝑑𝑖𝑓𝑓𝑒𝑟𝑒𝑛𝑐𝑒</m:t>
+                    </m:r>
+                    <m:r>
+                      <a:rPr lang="en-CA" i="1">
+                        <a:latin typeface="Cambria Math" panose="02040503050406030204" pitchFamily="18" charset="0"/>
+                      </a:rPr>
+                      <m:t>=</m:t>
+                    </m:r>
+                    <m:sSub>
+                      <m:sSubPr>
+                        <m:ctrlPr>
+                          <a:rPr lang="en-CA" i="1" smtClean="0">
+                            <a:latin typeface="Cambria Math" panose="02040503050406030204" pitchFamily="18" charset="0"/>
+                          </a:rPr>
+                        </m:ctrlPr>
+                      </m:sSubPr>
+                      <m:e>
+                        <m:r>
+                          <a:rPr lang="en-CA" b="0" i="1" smtClean="0">
+                            <a:latin typeface="Cambria Math" panose="02040503050406030204" pitchFamily="18" charset="0"/>
+                          </a:rPr>
+                          <m:t>𝑀</m:t>
+                        </m:r>
+                      </m:e>
+                      <m:sub>
+                        <m:r>
+                          <a:rPr lang="en-CA" b="0" i="1" smtClean="0">
+                            <a:latin typeface="Cambria Math" panose="02040503050406030204" pitchFamily="18" charset="0"/>
+                          </a:rPr>
+                          <m:t>1</m:t>
+                        </m:r>
+                      </m:sub>
+                    </m:sSub>
+                    <m:r>
+                      <a:rPr lang="en-CA" b="0" i="1" smtClean="0">
+                        <a:latin typeface="Cambria Math" panose="02040503050406030204" pitchFamily="18" charset="0"/>
+                      </a:rPr>
+                      <m:t>−</m:t>
+                    </m:r>
+                    <m:sSub>
+                      <m:sSubPr>
+                        <m:ctrlPr>
+                          <a:rPr lang="en-CA" b="0" i="1" smtClean="0">
+                            <a:latin typeface="Cambria Math" panose="02040503050406030204" pitchFamily="18" charset="0"/>
+                          </a:rPr>
+                        </m:ctrlPr>
+                      </m:sSubPr>
+                      <m:e>
+                        <m:r>
+                          <a:rPr lang="en-CA" b="0" i="1" smtClean="0">
+                            <a:latin typeface="Cambria Math" panose="02040503050406030204" pitchFamily="18" charset="0"/>
+                          </a:rPr>
+                          <m:t>𝑀</m:t>
+                        </m:r>
+                      </m:e>
+                      <m:sub>
+                        <m:r>
+                          <a:rPr lang="en-CA" b="0" i="1" smtClean="0">
+                            <a:latin typeface="Cambria Math" panose="02040503050406030204" pitchFamily="18" charset="0"/>
+                          </a:rPr>
+                          <m:t>2</m:t>
+                        </m:r>
+                      </m:sub>
+                    </m:sSub>
+                  </m:oMath>
+                </a14:m>
+                <a:endParaRPr lang="en-CA" b="0" dirty="0"/>
+              </a:p>
+              <a:p>
+                <a:pPr lvl="1"/>
+                <a14:m>
+                  <m:oMath xmlns:m="http://schemas.openxmlformats.org/officeDocument/2006/math">
+                    <m:r>
+                      <a:rPr lang="en-CA" b="0" i="1" smtClean="0">
+                        <a:latin typeface="Cambria Math" panose="02040503050406030204" pitchFamily="18" charset="0"/>
+                      </a:rPr>
+                      <m:t>𝑃𝑒𝑎𝑟𝑠𝑜𝑛</m:t>
+                    </m:r>
+                    <m:r>
+                      <a:rPr lang="en-CA" b="0" i="1" smtClean="0">
+                        <a:latin typeface="Cambria Math" panose="02040503050406030204" pitchFamily="18" charset="0"/>
+                      </a:rPr>
+                      <m:t> </m:t>
+                    </m:r>
+                    <m:r>
+                      <a:rPr lang="en-CA" b="0" i="1" smtClean="0">
+                        <a:latin typeface="Cambria Math" panose="02040503050406030204" pitchFamily="18" charset="0"/>
+                      </a:rPr>
+                      <m:t>𝑐𝑜𝑟𝑟𝑒𝑙𝑎𝑡𝑖𝑜𝑛</m:t>
+                    </m:r>
+                    <m:r>
+                      <a:rPr lang="en-CA" b="0" i="1" smtClean="0">
+                        <a:latin typeface="Cambria Math" panose="02040503050406030204" pitchFamily="18" charset="0"/>
+                      </a:rPr>
+                      <m:t> </m:t>
+                    </m:r>
+                    <m:r>
+                      <a:rPr lang="en-CA" b="0" i="1" smtClean="0">
+                        <a:latin typeface="Cambria Math" panose="02040503050406030204" pitchFamily="18" charset="0"/>
+                      </a:rPr>
+                      <m:t>𝑐𝑜𝑒𝑓𝑓𝑖𝑐𝑖𝑒𝑛𝑡</m:t>
+                    </m:r>
+                    <m:r>
+                      <a:rPr lang="en-CA" i="1">
+                        <a:latin typeface="Cambria Math" panose="02040503050406030204" pitchFamily="18" charset="0"/>
+                      </a:rPr>
+                      <m:t>=</m:t>
+                    </m:r>
+                    <m:f>
+                      <m:fPr>
+                        <m:ctrlPr>
+                          <a:rPr lang="en-CA" i="1" smtClean="0">
+                            <a:latin typeface="Cambria Math" panose="02040503050406030204" pitchFamily="18" charset="0"/>
+                          </a:rPr>
+                        </m:ctrlPr>
+                      </m:fPr>
+                      <m:num>
+                        <m:r>
+                          <a:rPr lang="en-CA" b="0" i="1" smtClean="0">
+                            <a:latin typeface="Cambria Math" panose="02040503050406030204" pitchFamily="18" charset="0"/>
+                          </a:rPr>
+                          <m:t>1</m:t>
+                        </m:r>
+                      </m:num>
+                      <m:den>
+                        <m:r>
+                          <a:rPr lang="en-CA" b="0" i="1" smtClean="0">
+                            <a:latin typeface="Cambria Math" panose="02040503050406030204" pitchFamily="18" charset="0"/>
+                          </a:rPr>
+                          <m:t>𝑁</m:t>
+                        </m:r>
+                        <m:r>
+                          <a:rPr lang="en-CA" b="0" i="1" smtClean="0">
+                            <a:latin typeface="Cambria Math" panose="02040503050406030204" pitchFamily="18" charset="0"/>
+                          </a:rPr>
+                          <m:t>−1</m:t>
+                        </m:r>
+                      </m:den>
+                    </m:f>
+                    <m:nary>
+                      <m:naryPr>
+                        <m:chr m:val="∑"/>
+                        <m:ctrlPr>
+                          <a:rPr lang="en-CA" i="1" smtClean="0">
+                            <a:latin typeface="Cambria Math" panose="02040503050406030204" pitchFamily="18" charset="0"/>
+                          </a:rPr>
+                        </m:ctrlPr>
+                      </m:naryPr>
+                      <m:sub>
+                        <m:r>
+                          <m:rPr>
+                            <m:brk m:alnAt="23"/>
+                          </m:rPr>
+                          <a:rPr lang="en-CA" b="0" i="1" smtClean="0">
+                            <a:latin typeface="Cambria Math" panose="02040503050406030204" pitchFamily="18" charset="0"/>
+                          </a:rPr>
+                          <m:t>𝑖</m:t>
+                        </m:r>
+                        <m:r>
+                          <a:rPr lang="en-CA" b="0" i="1" smtClean="0">
+                            <a:latin typeface="Cambria Math" panose="02040503050406030204" pitchFamily="18" charset="0"/>
+                          </a:rPr>
+                          <m:t>=1</m:t>
+                        </m:r>
+                      </m:sub>
+                      <m:sup>
+                        <m:r>
+                          <a:rPr lang="en-CA" b="0" i="1" smtClean="0">
+                            <a:latin typeface="Cambria Math" panose="02040503050406030204" pitchFamily="18" charset="0"/>
+                          </a:rPr>
+                          <m:t>𝑁</m:t>
+                        </m:r>
+                      </m:sup>
+                      <m:e>
+                        <m:r>
+                          <a:rPr lang="en-CA" i="1">
+                            <a:latin typeface="Cambria Math" panose="02040503050406030204" pitchFamily="18" charset="0"/>
+                          </a:rPr>
+                          <m:t>(</m:t>
+                        </m:r>
+                        <m:f>
+                          <m:fPr>
+                            <m:ctrlPr>
+                              <a:rPr lang="en-CA" i="1">
+                                <a:latin typeface="Cambria Math" panose="02040503050406030204" pitchFamily="18" charset="0"/>
+                              </a:rPr>
+                            </m:ctrlPr>
+                          </m:fPr>
+                          <m:num>
+                            <m:sSub>
+                              <m:sSubPr>
+                                <m:ctrlPr>
+                                  <a:rPr lang="en-CA" i="1" smtClean="0">
+                                    <a:latin typeface="Cambria Math" panose="02040503050406030204" pitchFamily="18" charset="0"/>
+                                  </a:rPr>
+                                </m:ctrlPr>
+                              </m:sSubPr>
+                              <m:e>
+                                <m:r>
+                                  <a:rPr lang="en-US" b="0" i="1" smtClean="0">
+                                    <a:latin typeface="Cambria Math" panose="02040503050406030204" pitchFamily="18" charset="0"/>
+                                  </a:rPr>
+                                  <m:t>𝑀</m:t>
+                                </m:r>
+                              </m:e>
+                              <m:sub>
+                                <m:sSub>
+                                  <m:sSubPr>
+                                    <m:ctrlPr>
+                                      <a:rPr lang="en-CA" i="1" smtClean="0">
+                                        <a:latin typeface="Cambria Math" panose="02040503050406030204" pitchFamily="18" charset="0"/>
+                                      </a:rPr>
+                                    </m:ctrlPr>
+                                  </m:sSubPr>
+                                  <m:e>
+                                    <m:r>
+                                      <a:rPr lang="en-US" b="0" i="1" smtClean="0">
+                                        <a:latin typeface="Cambria Math" panose="02040503050406030204" pitchFamily="18" charset="0"/>
+                                      </a:rPr>
+                                      <m:t>1</m:t>
+                                    </m:r>
+                                  </m:e>
+                                  <m:sub>
+                                    <m:r>
+                                      <a:rPr lang="en-US" b="0" i="1" smtClean="0">
+                                        <a:latin typeface="Cambria Math" panose="02040503050406030204" pitchFamily="18" charset="0"/>
+                                      </a:rPr>
+                                      <m:t>𝑖</m:t>
+                                    </m:r>
+                                  </m:sub>
+                                </m:sSub>
+                              </m:sub>
+                            </m:sSub>
+                            <m:r>
+                              <a:rPr lang="en-US" b="0" i="1" smtClean="0">
+                                <a:latin typeface="Cambria Math" panose="02040503050406030204" pitchFamily="18" charset="0"/>
+                              </a:rPr>
+                              <m:t>−</m:t>
+                            </m:r>
+                            <m:acc>
+                              <m:accPr>
+                                <m:chr m:val="̅"/>
+                                <m:ctrlPr>
+                                  <a:rPr lang="en-US" b="0" i="1" smtClean="0">
+                                    <a:latin typeface="Cambria Math" panose="02040503050406030204" pitchFamily="18" charset="0"/>
+                                  </a:rPr>
+                                </m:ctrlPr>
+                              </m:accPr>
+                              <m:e>
+                                <m:sSub>
+                                  <m:sSubPr>
+                                    <m:ctrlPr>
+                                      <a:rPr lang="en-US" b="0" i="1" smtClean="0">
+                                        <a:latin typeface="Cambria Math" panose="02040503050406030204" pitchFamily="18" charset="0"/>
+                                      </a:rPr>
+                                    </m:ctrlPr>
+                                  </m:sSubPr>
+                                  <m:e>
+                                    <m:r>
+                                      <a:rPr lang="en-US" b="0" i="1" smtClean="0">
+                                        <a:latin typeface="Cambria Math" panose="02040503050406030204" pitchFamily="18" charset="0"/>
+                                      </a:rPr>
+                                      <m:t>𝑀</m:t>
+                                    </m:r>
+                                  </m:e>
+                                  <m:sub>
+                                    <m:r>
+                                      <a:rPr lang="en-US" b="0" i="1" smtClean="0">
+                                        <a:latin typeface="Cambria Math" panose="02040503050406030204" pitchFamily="18" charset="0"/>
+                                      </a:rPr>
+                                      <m:t>1</m:t>
+                                    </m:r>
+                                  </m:sub>
+                                </m:sSub>
+                              </m:e>
+                            </m:acc>
+                          </m:num>
+                          <m:den>
+                            <m:sSub>
+                              <m:sSubPr>
+                                <m:ctrlPr>
+                                  <a:rPr lang="en-CA" i="1">
+                                    <a:latin typeface="Cambria Math" panose="02040503050406030204" pitchFamily="18" charset="0"/>
+                                  </a:rPr>
+                                </m:ctrlPr>
+                              </m:sSubPr>
+                              <m:e>
+                                <m:r>
+                                  <a:rPr lang="en-CA" i="1" smtClean="0">
+                                    <a:latin typeface="Cambria Math" panose="02040503050406030204" pitchFamily="18" charset="0"/>
+                                    <a:ea typeface="Cambria Math" panose="02040503050406030204" pitchFamily="18" charset="0"/>
+                                  </a:rPr>
+                                  <m:t>𝜎</m:t>
+                                </m:r>
+                              </m:e>
+                              <m:sub>
+                                <m:sSub>
+                                  <m:sSubPr>
+                                    <m:ctrlPr>
+                                      <a:rPr lang="en-CA" i="1">
+                                        <a:latin typeface="Cambria Math" panose="02040503050406030204" pitchFamily="18" charset="0"/>
+                                      </a:rPr>
+                                    </m:ctrlPr>
+                                  </m:sSubPr>
+                                  <m:e>
+                                    <m:r>
+                                      <a:rPr lang="en-US" b="0" i="1" smtClean="0">
+                                        <a:latin typeface="Cambria Math" panose="02040503050406030204" pitchFamily="18" charset="0"/>
+                                      </a:rPr>
+                                      <m:t>𝑀</m:t>
+                                    </m:r>
+                                  </m:e>
+                                  <m:sub>
+                                    <m:r>
+                                      <a:rPr lang="en-US" b="0" i="1" smtClean="0">
+                                        <a:latin typeface="Cambria Math" panose="02040503050406030204" pitchFamily="18" charset="0"/>
+                                      </a:rPr>
+                                      <m:t>1</m:t>
+                                    </m:r>
+                                  </m:sub>
+                                </m:sSub>
+                              </m:sub>
+                            </m:sSub>
+                          </m:den>
+                        </m:f>
+                        <m:r>
+                          <a:rPr lang="en-CA" i="1">
+                            <a:latin typeface="Cambria Math" panose="02040503050406030204" pitchFamily="18" charset="0"/>
+                          </a:rPr>
+                          <m:t>)(</m:t>
+                        </m:r>
+                        <m:f>
+                          <m:fPr>
+                            <m:ctrlPr>
+                              <a:rPr lang="en-CA" i="1">
+                                <a:latin typeface="Cambria Math" panose="02040503050406030204" pitchFamily="18" charset="0"/>
+                              </a:rPr>
+                            </m:ctrlPr>
+                          </m:fPr>
+                          <m:num>
+                            <m:sSub>
+                              <m:sSubPr>
+                                <m:ctrlPr>
+                                  <a:rPr lang="en-CA" i="1" smtClean="0">
+                                    <a:latin typeface="Cambria Math" panose="02040503050406030204" pitchFamily="18" charset="0"/>
+                                  </a:rPr>
+                                </m:ctrlPr>
+                              </m:sSubPr>
+                              <m:e>
+                                <m:r>
+                                  <a:rPr lang="en-US" b="0" i="1" smtClean="0">
+                                    <a:latin typeface="Cambria Math" panose="02040503050406030204" pitchFamily="18" charset="0"/>
+                                  </a:rPr>
+                                  <m:t>𝑀</m:t>
+                                </m:r>
+                              </m:e>
+                              <m:sub>
+                                <m:sSub>
+                                  <m:sSubPr>
+                                    <m:ctrlPr>
+                                      <a:rPr lang="en-CA" i="1" smtClean="0">
+                                        <a:latin typeface="Cambria Math" panose="02040503050406030204" pitchFamily="18" charset="0"/>
+                                      </a:rPr>
+                                    </m:ctrlPr>
+                                  </m:sSubPr>
+                                  <m:e>
+                                    <m:r>
+                                      <a:rPr lang="en-US" b="0" i="1" smtClean="0">
+                                        <a:latin typeface="Cambria Math" panose="02040503050406030204" pitchFamily="18" charset="0"/>
+                                      </a:rPr>
+                                      <m:t>2</m:t>
+                                    </m:r>
+                                  </m:e>
+                                  <m:sub>
+                                    <m:r>
+                                      <a:rPr lang="en-US" b="0" i="1" smtClean="0">
+                                        <a:latin typeface="Cambria Math" panose="02040503050406030204" pitchFamily="18" charset="0"/>
+                                      </a:rPr>
+                                      <m:t>𝑖</m:t>
+                                    </m:r>
+                                  </m:sub>
+                                </m:sSub>
+                              </m:sub>
+                            </m:sSub>
+                            <m:r>
+                              <a:rPr lang="en-US" i="1">
+                                <a:latin typeface="Cambria Math" panose="02040503050406030204" pitchFamily="18" charset="0"/>
+                              </a:rPr>
+                              <m:t>−</m:t>
+                            </m:r>
+                            <m:acc>
+                              <m:accPr>
+                                <m:chr m:val="̅"/>
+                                <m:ctrlPr>
+                                  <a:rPr lang="en-US" i="1">
+                                    <a:latin typeface="Cambria Math" panose="02040503050406030204" pitchFamily="18" charset="0"/>
+                                  </a:rPr>
+                                </m:ctrlPr>
+                              </m:accPr>
+                              <m:e>
+                                <m:sSub>
+                                  <m:sSubPr>
+                                    <m:ctrlPr>
+                                      <a:rPr lang="en-US" i="1">
+                                        <a:latin typeface="Cambria Math" panose="02040503050406030204" pitchFamily="18" charset="0"/>
+                                      </a:rPr>
+                                    </m:ctrlPr>
+                                  </m:sSubPr>
+                                  <m:e>
+                                    <m:r>
+                                      <a:rPr lang="en-US" b="0" i="1" smtClean="0">
+                                        <a:latin typeface="Cambria Math" panose="02040503050406030204" pitchFamily="18" charset="0"/>
+                                      </a:rPr>
+                                      <m:t>𝑀</m:t>
+                                    </m:r>
+                                  </m:e>
+                                  <m:sub>
+                                    <m:r>
+                                      <a:rPr lang="en-US" b="0" i="1" smtClean="0">
+                                        <a:latin typeface="Cambria Math" panose="02040503050406030204" pitchFamily="18" charset="0"/>
+                                      </a:rPr>
+                                      <m:t>2</m:t>
+                                    </m:r>
+                                  </m:sub>
+                                </m:sSub>
+                              </m:e>
+                            </m:acc>
+                          </m:num>
+                          <m:den>
+                            <m:sSub>
+                              <m:sSubPr>
+                                <m:ctrlPr>
+                                  <a:rPr lang="en-CA" i="1">
+                                    <a:latin typeface="Cambria Math" panose="02040503050406030204" pitchFamily="18" charset="0"/>
+                                  </a:rPr>
+                                </m:ctrlPr>
+                              </m:sSubPr>
+                              <m:e>
+                                <m:r>
+                                  <a:rPr lang="en-CA" i="1" smtClean="0">
+                                    <a:latin typeface="Cambria Math" panose="02040503050406030204" pitchFamily="18" charset="0"/>
+                                    <a:ea typeface="Cambria Math" panose="02040503050406030204" pitchFamily="18" charset="0"/>
+                                  </a:rPr>
+                                  <m:t>𝜎</m:t>
+                                </m:r>
+                              </m:e>
+                              <m:sub>
+                                <m:sSub>
+                                  <m:sSubPr>
+                                    <m:ctrlPr>
+                                      <a:rPr lang="en-CA" i="1">
+                                        <a:latin typeface="Cambria Math" panose="02040503050406030204" pitchFamily="18" charset="0"/>
+                                      </a:rPr>
+                                    </m:ctrlPr>
+                                  </m:sSubPr>
+                                  <m:e>
+                                    <m:r>
+                                      <a:rPr lang="en-US" b="0" i="1" smtClean="0">
+                                        <a:latin typeface="Cambria Math" panose="02040503050406030204" pitchFamily="18" charset="0"/>
+                                      </a:rPr>
+                                      <m:t>𝑀</m:t>
+                                    </m:r>
+                                  </m:e>
+                                  <m:sub>
+                                    <m:r>
+                                      <a:rPr lang="en-US" b="0" i="1" smtClean="0">
+                                        <a:latin typeface="Cambria Math" panose="02040503050406030204" pitchFamily="18" charset="0"/>
+                                      </a:rPr>
+                                      <m:t>2</m:t>
+                                    </m:r>
+                                  </m:sub>
+                                </m:sSub>
+                              </m:sub>
+                            </m:sSub>
+                          </m:den>
+                        </m:f>
+                        <m:r>
+                          <a:rPr lang="en-CA" i="1">
+                            <a:latin typeface="Cambria Math" panose="02040503050406030204" pitchFamily="18" charset="0"/>
+                          </a:rPr>
+                          <m:t>)</m:t>
+                        </m:r>
+                      </m:e>
+                    </m:nary>
+                  </m:oMath>
+                </a14:m>
+                <a:r>
+                  <a:rPr lang="en-CA" dirty="0"/>
+                  <a:t> </a:t>
+                </a:r>
+              </a:p>
+            </p:txBody>
+          </p:sp>
+        </mc:Choice>
+        <mc:Fallback xmlns="">
+          <p:sp>
+            <p:nvSpPr>
+              <p:cNvPr id="3" name="Content Placeholder 2">
+                <a:extLst>
+                  <a:ext uri="{FF2B5EF4-FFF2-40B4-BE49-F238E27FC236}">
+                    <a16:creationId xmlns:a16="http://schemas.microsoft.com/office/drawing/2014/main" id="{02701640-DD03-C95C-2123-D0E1D90D0B9C}"/>
+                  </a:ext>
+                </a:extLst>
+              </p:cNvPr>
+              <p:cNvSpPr>
+                <a:spLocks noGrp="1" noRot="1" noChangeAspect="1" noMove="1" noResize="1" noEditPoints="1" noAdjustHandles="1" noChangeArrowheads="1" noChangeShapeType="1" noTextEdit="1"/>
+              </p:cNvSpPr>
+              <p:nvPr>
+                <p:ph idx="1"/>
+              </p:nvPr>
+            </p:nvSpPr>
+            <p:spPr>
+              <a:blipFill>
+                <a:blip r:embed="rId3"/>
+                <a:stretch>
+                  <a:fillRect l="-473" t="-1179" b="-2161"/>
+                </a:stretch>
+              </a:blipFill>
+            </p:spPr>
+            <p:txBody>
+              <a:bodyPr/>
+              <a:lstStyle/>
+              <a:p>
+                <a:r>
+                  <a:rPr lang="en-CA">
+                    <a:noFill/>
+                  </a:rPr>
+                  <a:t> </a:t>
+                </a:r>
+              </a:p>
+            </p:txBody>
+          </p:sp>
+        </mc:Fallback>
+      </mc:AlternateContent>
+    </p:spTree>
+    <p:extLst>
+      <p:ext uri="{BB962C8B-B14F-4D97-AF65-F5344CB8AC3E}">
+        <p14:creationId xmlns:p14="http://schemas.microsoft.com/office/powerpoint/2010/main" val="56333691"/>
+      </p:ext>
+    </p:extLst>
+  </p:cSld>
+  <p:clrMapOvr>
+    <a:masterClrMapping/>
+  </p:clrMapOvr>
+</p:sld>
+</file>
+
+<file path=ppt/slides/slide15.xml><?xml version="1.0" encoding="utf-8"?>
+<p:sld xmlns:a="http://schemas.openxmlformats.org/drawingml/2006/main" xmlns:r="http://schemas.openxmlformats.org/officeDocument/2006/relationships" xmlns:p="http://schemas.openxmlformats.org/presentationml/2006/main">
+  <p:cSld>
+    <p:bg>
+      <p:bgPr>
+        <a:solidFill>
+          <a:schemeClr val="bg1">
+            <a:lumMod val="95000"/>
+          </a:schemeClr>
+        </a:solidFill>
+        <a:effectLst/>
+      </p:bgPr>
+    </p:bg>
+    <p:spTree>
+      <p:nvGrpSpPr>
+        <p:cNvPr id="1" name=""/>
+        <p:cNvGrpSpPr/>
+        <p:nvPr/>
+      </p:nvGrpSpPr>
+      <p:grpSpPr>
+        <a:xfrm>
+          <a:off x="0" y="0"/>
+          <a:ext cx="0" cy="0"/>
+          <a:chOff x="0" y="0"/>
+          <a:chExt cx="0" cy="0"/>
+        </a:xfrm>
+      </p:grpSpPr>
+      <p:sp>
+        <p:nvSpPr>
+          <p:cNvPr id="2" name="Title 1">
+            <a:extLst>
+              <a:ext uri="{FF2B5EF4-FFF2-40B4-BE49-F238E27FC236}">
                 <a16:creationId xmlns:a16="http://schemas.microsoft.com/office/drawing/2014/main" id="{91BEE49F-B0E2-B8A9-1C93-012209314FE7}"/>
               </a:ext>
             </a:extLst>
@@ -6223,21 +7596,28 @@
             <p:ph type="title"/>
           </p:nvPr>
         </p:nvSpPr>
-        <p:spPr/>
-        <p:txBody>
-          <a:bodyPr/>
+        <p:spPr>
+          <a:xfrm>
+            <a:off x="804672" y="964692"/>
+            <a:ext cx="3849624" cy="1188720"/>
+          </a:xfrm>
+        </p:spPr>
+        <p:txBody>
+          <a:bodyPr vert="horz" lIns="182880" tIns="182880" rIns="182880" bIns="182880" rtlCol="0" anchor="ctr">
+            <a:normAutofit/>
+          </a:bodyPr>
           <a:lstStyle/>
           <a:p>
-            <a:endParaRPr lang="en-CA" dirty="0"/>
-          </a:p>
-        </p:txBody>
-      </p:sp>
-      <p:sp>
-        <p:nvSpPr>
-          <p:cNvPr id="3" name="Content Placeholder 2">
+            <a:endParaRPr lang="en-US" dirty="0"/>
+          </a:p>
+        </p:txBody>
+      </p:sp>
+      <p:sp>
+        <p:nvSpPr>
+          <p:cNvPr id="1032" name="Content Placeholder 1031">
             <a:extLst>
               <a:ext uri="{FF2B5EF4-FFF2-40B4-BE49-F238E27FC236}">
-                <a16:creationId xmlns:a16="http://schemas.microsoft.com/office/drawing/2014/main" id="{A4DD6506-298B-36E0-956E-6628B5F58F7B}"/>
+                <a16:creationId xmlns:a16="http://schemas.microsoft.com/office/drawing/2014/main" id="{BD9C19B9-2958-1A07-1976-51E8A59D83EE}"/>
               </a:ext>
             </a:extLst>
           </p:cNvPr>
@@ -6248,40 +7628,204 @@
             <p:ph sz="half" idx="1"/>
           </p:nvPr>
         </p:nvSpPr>
-        <p:spPr/>
-        <p:txBody>
-          <a:bodyPr/>
+        <p:spPr>
+          <a:xfrm>
+            <a:off x="804672" y="2638044"/>
+            <a:ext cx="3849624" cy="3101983"/>
+          </a:xfrm>
+        </p:spPr>
+        <p:txBody>
+          <a:bodyPr vert="horz" lIns="91440" tIns="45720" rIns="91440" bIns="45720" rtlCol="0">
+            <a:normAutofit/>
+          </a:bodyPr>
           <a:lstStyle/>
           <a:p>
-            <a:endParaRPr lang="en-CA"/>
-          </a:p>
-        </p:txBody>
-      </p:sp>
-      <p:sp>
-        <p:nvSpPr>
-          <p:cNvPr id="4" name="Content Placeholder 3">
+            <a:endParaRPr lang="en-US"/>
+          </a:p>
+        </p:txBody>
+      </p:sp>
+      <p:pic>
+        <p:nvPicPr>
+          <p:cNvPr id="1026" name="Picture 2">
             <a:extLst>
               <a:ext uri="{FF2B5EF4-FFF2-40B4-BE49-F238E27FC236}">
-                <a16:creationId xmlns:a16="http://schemas.microsoft.com/office/drawing/2014/main" id="{F5F495C1-001D-B12A-D9FA-A7C8D9D70E16}"/>
+                <a16:creationId xmlns:a16="http://schemas.microsoft.com/office/drawing/2014/main" id="{B501266F-A2D1-2F1F-B58F-BCCE1FE8A18C}"/>
               </a:ext>
             </a:extLst>
           </p:cNvPr>
-          <p:cNvSpPr>
-            <a:spLocks noGrp="1"/>
-          </p:cNvSpPr>
+          <p:cNvPicPr>
+            <a:picLocks noChangeAspect="1" noChangeArrowheads="1"/>
+          </p:cNvPicPr>
+          <p:nvPr/>
+        </p:nvPicPr>
+        <p:blipFill rotWithShape="1">
+          <a:blip r:embed="rId2">
+            <a:extLst>
+              <a:ext uri="{28A0092B-C50C-407E-A947-70E740481C1C}">
+                <a14:useLocalDpi xmlns:a14="http://schemas.microsoft.com/office/drawing/2010/main" val="0"/>
+              </a:ext>
+            </a:extLst>
+          </a:blip>
+          <a:srcRect r="1213" b="2"/>
+          <a:stretch>
+            <a:fillRect/>
+          </a:stretch>
+        </p:blipFill>
+        <p:spPr bwMode="auto">
+          <a:xfrm>
+            <a:off x="5453179" y="-2"/>
+            <a:ext cx="6738822" cy="3410712"/>
+          </a:xfrm>
+          <a:prstGeom prst="rect">
+            <a:avLst/>
+          </a:prstGeom>
+          <a:noFill/>
+          <a:extLst>
+            <a:ext uri="{909E8E84-426E-40DD-AFC4-6F175D3DCCD1}">
+              <a14:hiddenFill xmlns:a14="http://schemas.microsoft.com/office/drawing/2010/main">
+                <a:solidFill>
+                  <a:srgbClr val="FFFFFF"/>
+                </a:solidFill>
+              </a14:hiddenFill>
+            </a:ext>
+          </a:extLst>
+        </p:spPr>
+      </p:pic>
+      <p:pic>
+        <p:nvPicPr>
+          <p:cNvPr id="1028" name="Picture 4">
+            <a:extLst>
+              <a:ext uri="{FF2B5EF4-FFF2-40B4-BE49-F238E27FC236}">
+                <a16:creationId xmlns:a16="http://schemas.microsoft.com/office/drawing/2014/main" id="{46B3632F-8089-5EA5-33C9-EA5EBFDC79E7}"/>
+              </a:ext>
+            </a:extLst>
+          </p:cNvPr>
+          <p:cNvPicPr>
+            <a:picLocks noGrp="1" noChangeAspect="1" noChangeArrowheads="1"/>
+          </p:cNvPicPr>
           <p:nvPr>
             <p:ph sz="half" idx="2"/>
           </p:nvPr>
-        </p:nvSpPr>
-        <p:spPr/>
-        <p:txBody>
-          <a:bodyPr/>
-          <a:lstStyle/>
-          <a:p>
-            <a:endParaRPr lang="en-CA"/>
-          </a:p>
-        </p:txBody>
-      </p:sp>
+        </p:nvPicPr>
+        <p:blipFill>
+          <a:blip r:embed="rId3">
+            <a:extLst>
+              <a:ext uri="{28A0092B-C50C-407E-A947-70E740481C1C}">
+                <a14:useLocalDpi xmlns:a14="http://schemas.microsoft.com/office/drawing/2010/main" val="0"/>
+              </a:ext>
+            </a:extLst>
+          </a:blip>
+          <a:srcRect r="715" b="2"/>
+          <a:stretch>
+            <a:fillRect/>
+          </a:stretch>
+        </p:blipFill>
+        <p:spPr bwMode="auto">
+          <a:xfrm>
+            <a:off x="5452903" y="3447288"/>
+            <a:ext cx="6739097" cy="3410712"/>
+          </a:xfrm>
+          <a:prstGeom prst="rect">
+            <a:avLst/>
+          </a:prstGeom>
+          <a:noFill/>
+          <a:extLst>
+            <a:ext uri="{909E8E84-426E-40DD-AFC4-6F175D3DCCD1}">
+              <a14:hiddenFill xmlns:a14="http://schemas.microsoft.com/office/drawing/2010/main">
+                <a:solidFill>
+                  <a:srgbClr val="FFFFFF"/>
+                </a:solidFill>
+              </a14:hiddenFill>
+            </a:ext>
+          </a:extLst>
+        </p:spPr>
+      </p:pic>
+      <p:cxnSp>
+        <p:nvCxnSpPr>
+          <p:cNvPr id="5" name="Straight Connector 4">
+            <a:extLst>
+              <a:ext uri="{FF2B5EF4-FFF2-40B4-BE49-F238E27FC236}">
+                <a16:creationId xmlns:a16="http://schemas.microsoft.com/office/drawing/2014/main" id="{DE1713F3-A061-02C9-BA8F-ABA4E84356C4}"/>
+              </a:ext>
+            </a:extLst>
+          </p:cNvPr>
+          <p:cNvCxnSpPr>
+            <a:cxnSpLocks/>
+          </p:cNvCxnSpPr>
+          <p:nvPr/>
+        </p:nvCxnSpPr>
+        <p:spPr>
+          <a:xfrm flipH="1">
+            <a:off x="5452903" y="3428998"/>
+            <a:ext cx="6739097" cy="18290"/>
+          </a:xfrm>
+          <a:prstGeom prst="line">
+            <a:avLst/>
+          </a:prstGeom>
+          <a:ln w="57150">
+            <a:solidFill>
+              <a:schemeClr val="tx1"/>
+            </a:solidFill>
+          </a:ln>
+        </p:spPr>
+        <p:style>
+          <a:lnRef idx="1">
+            <a:schemeClr val="accent1"/>
+          </a:lnRef>
+          <a:fillRef idx="0">
+            <a:schemeClr val="accent1"/>
+          </a:fillRef>
+          <a:effectRef idx="0">
+            <a:schemeClr val="accent1"/>
+          </a:effectRef>
+          <a:fontRef idx="minor">
+            <a:schemeClr val="tx1"/>
+          </a:fontRef>
+        </p:style>
+      </p:cxnSp>
+      <p:cxnSp>
+        <p:nvCxnSpPr>
+          <p:cNvPr id="8" name="Straight Connector 7">
+            <a:extLst>
+              <a:ext uri="{FF2B5EF4-FFF2-40B4-BE49-F238E27FC236}">
+                <a16:creationId xmlns:a16="http://schemas.microsoft.com/office/drawing/2014/main" id="{E2668E73-A410-0AC3-C4A7-CBE128CAAAEC}"/>
+              </a:ext>
+            </a:extLst>
+          </p:cNvPr>
+          <p:cNvCxnSpPr>
+            <a:cxnSpLocks/>
+          </p:cNvCxnSpPr>
+          <p:nvPr/>
+        </p:nvCxnSpPr>
+        <p:spPr>
+          <a:xfrm flipV="1">
+            <a:off x="5452903" y="0"/>
+            <a:ext cx="0" cy="6858000"/>
+          </a:xfrm>
+          <a:prstGeom prst="line">
+            <a:avLst/>
+          </a:prstGeom>
+          <a:ln w="57150">
+            <a:solidFill>
+              <a:schemeClr val="tx1"/>
+            </a:solidFill>
+          </a:ln>
+        </p:spPr>
+        <p:style>
+          <a:lnRef idx="1">
+            <a:schemeClr val="accent1"/>
+          </a:lnRef>
+          <a:fillRef idx="0">
+            <a:schemeClr val="accent1"/>
+          </a:fillRef>
+          <a:effectRef idx="0">
+            <a:schemeClr val="accent1"/>
+          </a:effectRef>
+          <a:fontRef idx="minor">
+            <a:schemeClr val="tx1"/>
+          </a:fontRef>
+        </p:style>
+      </p:cxnSp>
     </p:spTree>
     <p:extLst>
       <p:ext uri="{BB962C8B-B14F-4D97-AF65-F5344CB8AC3E}">
@@ -6295,7 +7839,898 @@
 </p:sld>
 </file>
 
-<file path=ppt/slides/slide15.xml><?xml version="1.0" encoding="utf-8"?>
+<file path=ppt/slides/slide16.xml><?xml version="1.0" encoding="utf-8"?>
+<p:sld xmlns:a="http://schemas.openxmlformats.org/drawingml/2006/main" xmlns:r="http://schemas.openxmlformats.org/officeDocument/2006/relationships" xmlns:p="http://schemas.openxmlformats.org/presentationml/2006/main">
+  <p:cSld>
+    <p:bg>
+      <p:bgPr>
+        <a:solidFill>
+          <a:schemeClr val="bg1">
+            <a:lumMod val="95000"/>
+          </a:schemeClr>
+        </a:solidFill>
+        <a:effectLst/>
+      </p:bgPr>
+    </p:bg>
+    <p:spTree>
+      <p:nvGrpSpPr>
+        <p:cNvPr id="1" name=""/>
+        <p:cNvGrpSpPr/>
+        <p:nvPr/>
+      </p:nvGrpSpPr>
+      <p:grpSpPr>
+        <a:xfrm>
+          <a:off x="0" y="0"/>
+          <a:ext cx="0" cy="0"/>
+          <a:chOff x="0" y="0"/>
+          <a:chExt cx="0" cy="0"/>
+        </a:xfrm>
+      </p:grpSpPr>
+      <p:sp>
+        <p:nvSpPr>
+          <p:cNvPr id="2055" name="Rectangle 2054">
+            <a:extLst>
+              <a:ext uri="{FF2B5EF4-FFF2-40B4-BE49-F238E27FC236}">
+                <a16:creationId xmlns:a16="http://schemas.microsoft.com/office/drawing/2014/main" id="{65041AB2-A9B4-4D3F-B120-38E7860A8F1A}"/>
+              </a:ext>
+              <a:ext uri="{C183D7F6-B498-43B3-948B-1728B52AA6E4}">
+                <adec:decorative xmlns:adec="http://schemas.microsoft.com/office/drawing/2017/decorative" val="1"/>
+              </a:ext>
+            </a:extLst>
+          </p:cNvPr>
+          <p:cNvSpPr>
+            <a:spLocks noGrp="1" noRot="1" noChangeAspect="1" noMove="1" noResize="1" noEditPoints="1" noAdjustHandles="1" noChangeArrowheads="1" noChangeShapeType="1" noTextEdit="1"/>
+          </p:cNvSpPr>
+          <p:nvPr>
+            <p:extLst>
+              <p:ext uri="{386F3935-93C4-4BCD-93E2-E3B085C9AB24}">
+                <p16:designElem xmlns:p16="http://schemas.microsoft.com/office/powerpoint/2015/main" val="1"/>
+              </p:ext>
+            </p:extLst>
+          </p:nvPr>
+        </p:nvSpPr>
+        <p:spPr>
+          <a:xfrm>
+            <a:off x="804334" y="804334"/>
+            <a:ext cx="10583332" cy="5249332"/>
+          </a:xfrm>
+          <a:prstGeom prst="rect">
+            <a:avLst/>
+          </a:prstGeom>
+          <a:solidFill>
+            <a:srgbClr val="FFFFFF"/>
+          </a:solidFill>
+          <a:ln w="19050" cap="sq">
+            <a:solidFill>
+              <a:schemeClr val="tx1">
+                <a:lumMod val="75000"/>
+                <a:lumOff val="25000"/>
+              </a:schemeClr>
+            </a:solidFill>
+            <a:miter lim="800000"/>
+          </a:ln>
+        </p:spPr>
+        <p:style>
+          <a:lnRef idx="2">
+            <a:schemeClr val="accent1">
+              <a:shade val="50000"/>
+            </a:schemeClr>
+          </a:lnRef>
+          <a:fillRef idx="1">
+            <a:schemeClr val="accent1"/>
+          </a:fillRef>
+          <a:effectRef idx="0">
+            <a:schemeClr val="accent1"/>
+          </a:effectRef>
+          <a:fontRef idx="minor">
+            <a:schemeClr val="lt1"/>
+          </a:fontRef>
+        </p:style>
+        <p:txBody>
+          <a:bodyPr rtlCol="0" anchor="ctr"/>
+          <a:lstStyle/>
+          <a:p>
+            <a:pPr algn="ctr"/>
+            <a:endParaRPr lang="en-US"/>
+          </a:p>
+        </p:txBody>
+      </p:sp>
+      <p:pic>
+        <p:nvPicPr>
+          <p:cNvPr id="2050" name="Picture 2">
+            <a:extLst>
+              <a:ext uri="{FF2B5EF4-FFF2-40B4-BE49-F238E27FC236}">
+                <a16:creationId xmlns:a16="http://schemas.microsoft.com/office/drawing/2014/main" id="{6280D42E-0E3C-8328-A882-D458CF8BA8D6}"/>
+              </a:ext>
+            </a:extLst>
+          </p:cNvPr>
+          <p:cNvPicPr>
+            <a:picLocks noGrp="1" noChangeAspect="1" noChangeArrowheads="1"/>
+          </p:cNvPicPr>
+          <p:nvPr>
+            <p:ph idx="1"/>
+          </p:nvPr>
+        </p:nvPicPr>
+        <p:blipFill>
+          <a:blip r:embed="rId3">
+            <a:extLst>
+              <a:ext uri="{28A0092B-C50C-407E-A947-70E740481C1C}">
+                <a14:useLocalDpi xmlns:a14="http://schemas.microsoft.com/office/drawing/2010/main" val="0"/>
+              </a:ext>
+            </a:extLst>
+          </a:blip>
+          <a:stretch>
+            <a:fillRect/>
+          </a:stretch>
+        </p:blipFill>
+        <p:spPr bwMode="auto">
+          <a:xfrm>
+            <a:off x="1126236" y="1192607"/>
+            <a:ext cx="9939528" cy="4472786"/>
+          </a:xfrm>
+          <a:prstGeom prst="rect">
+            <a:avLst/>
+          </a:prstGeom>
+          <a:noFill/>
+          <a:extLst>
+            <a:ext uri="{909E8E84-426E-40DD-AFC4-6F175D3DCCD1}">
+              <a14:hiddenFill xmlns:a14="http://schemas.microsoft.com/office/drawing/2010/main">
+                <a:solidFill>
+                  <a:srgbClr val="FFFFFF"/>
+                </a:solidFill>
+              </a14:hiddenFill>
+            </a:ext>
+          </a:extLst>
+        </p:spPr>
+      </p:pic>
+    </p:spTree>
+    <p:extLst>
+      <p:ext uri="{BB962C8B-B14F-4D97-AF65-F5344CB8AC3E}">
+        <p14:creationId xmlns:p14="http://schemas.microsoft.com/office/powerpoint/2010/main" val="1457128146"/>
+      </p:ext>
+    </p:extLst>
+  </p:cSld>
+  <p:clrMapOvr>
+    <a:masterClrMapping/>
+  </p:clrMapOvr>
+</p:sld>
+</file>
+
+<file path=ppt/slides/slide17.xml><?xml version="1.0" encoding="utf-8"?>
+<p:sld xmlns:a="http://schemas.openxmlformats.org/drawingml/2006/main" xmlns:r="http://schemas.openxmlformats.org/officeDocument/2006/relationships" xmlns:p="http://schemas.openxmlformats.org/presentationml/2006/main">
+  <p:cSld>
+    <p:bg>
+      <p:bgPr>
+        <a:solidFill>
+          <a:schemeClr val="bg1">
+            <a:lumMod val="95000"/>
+          </a:schemeClr>
+        </a:solidFill>
+        <a:effectLst/>
+      </p:bgPr>
+    </p:bg>
+    <p:spTree>
+      <p:nvGrpSpPr>
+        <p:cNvPr id="1" name=""/>
+        <p:cNvGrpSpPr/>
+        <p:nvPr/>
+      </p:nvGrpSpPr>
+      <p:grpSpPr>
+        <a:xfrm>
+          <a:off x="0" y="0"/>
+          <a:ext cx="0" cy="0"/>
+          <a:chOff x="0" y="0"/>
+          <a:chExt cx="0" cy="0"/>
+        </a:xfrm>
+      </p:grpSpPr>
+      <p:sp>
+        <p:nvSpPr>
+          <p:cNvPr id="2" name="Title 1">
+            <a:extLst>
+              <a:ext uri="{FF2B5EF4-FFF2-40B4-BE49-F238E27FC236}">
+                <a16:creationId xmlns:a16="http://schemas.microsoft.com/office/drawing/2014/main" id="{AA77E46A-7627-AC51-2442-61975470BFBA}"/>
+              </a:ext>
+            </a:extLst>
+          </p:cNvPr>
+          <p:cNvSpPr>
+            <a:spLocks noGrp="1"/>
+          </p:cNvSpPr>
+          <p:nvPr>
+            <p:ph type="title"/>
+          </p:nvPr>
+        </p:nvSpPr>
+        <p:spPr>
+          <a:xfrm>
+            <a:off x="804672" y="964692"/>
+            <a:ext cx="3849624" cy="1188720"/>
+          </a:xfrm>
+        </p:spPr>
+        <p:txBody>
+          <a:bodyPr vert="horz" lIns="182880" tIns="182880" rIns="182880" bIns="182880" rtlCol="0" anchor="ctr">
+            <a:normAutofit/>
+          </a:bodyPr>
+          <a:lstStyle/>
+          <a:p>
+            <a:endParaRPr lang="en-US"/>
+          </a:p>
+        </p:txBody>
+      </p:sp>
+      <p:sp>
+        <p:nvSpPr>
+          <p:cNvPr id="3078" name="Content Placeholder 3079">
+            <a:extLst>
+              <a:ext uri="{FF2B5EF4-FFF2-40B4-BE49-F238E27FC236}">
+                <a16:creationId xmlns:a16="http://schemas.microsoft.com/office/drawing/2014/main" id="{1EFC4ECF-2189-7A89-36D7-A5BDA975F03C}"/>
+              </a:ext>
+            </a:extLst>
+          </p:cNvPr>
+          <p:cNvSpPr>
+            <a:spLocks noGrp="1"/>
+          </p:cNvSpPr>
+          <p:nvPr>
+            <p:ph sz="half" idx="1"/>
+          </p:nvPr>
+        </p:nvSpPr>
+        <p:spPr>
+          <a:xfrm>
+            <a:off x="804672" y="2638044"/>
+            <a:ext cx="3849624" cy="3101983"/>
+          </a:xfrm>
+        </p:spPr>
+        <p:txBody>
+          <a:bodyPr vert="horz" lIns="91440" tIns="45720" rIns="91440" bIns="45720" rtlCol="0">
+            <a:normAutofit/>
+          </a:bodyPr>
+          <a:lstStyle/>
+          <a:p>
+            <a:endParaRPr lang="en-US" dirty="0"/>
+          </a:p>
+        </p:txBody>
+      </p:sp>
+      <p:pic>
+        <p:nvPicPr>
+          <p:cNvPr id="3074" name="Picture 2">
+            <a:extLst>
+              <a:ext uri="{FF2B5EF4-FFF2-40B4-BE49-F238E27FC236}">
+                <a16:creationId xmlns:a16="http://schemas.microsoft.com/office/drawing/2014/main" id="{D5E964E1-9D47-A7F4-AF5B-1ED44B821D55}"/>
+              </a:ext>
+            </a:extLst>
+          </p:cNvPr>
+          <p:cNvPicPr>
+            <a:picLocks noChangeAspect="1" noChangeArrowheads="1"/>
+          </p:cNvPicPr>
+          <p:nvPr/>
+        </p:nvPicPr>
+        <p:blipFill rotWithShape="1">
+          <a:blip r:embed="rId2">
+            <a:extLst>
+              <a:ext uri="{28A0092B-C50C-407E-A947-70E740481C1C}">
+                <a14:useLocalDpi xmlns:a14="http://schemas.microsoft.com/office/drawing/2010/main" val="0"/>
+              </a:ext>
+            </a:extLst>
+          </a:blip>
+          <a:srcRect l="50"/>
+          <a:stretch>
+            <a:fillRect/>
+          </a:stretch>
+        </p:blipFill>
+        <p:spPr bwMode="auto">
+          <a:xfrm>
+            <a:off x="5090160" y="-2"/>
+            <a:ext cx="7102115" cy="3410712"/>
+          </a:xfrm>
+          <a:prstGeom prst="rect">
+            <a:avLst/>
+          </a:prstGeom>
+          <a:noFill/>
+          <a:extLst>
+            <a:ext uri="{909E8E84-426E-40DD-AFC4-6F175D3DCCD1}">
+              <a14:hiddenFill xmlns:a14="http://schemas.microsoft.com/office/drawing/2010/main">
+                <a:solidFill>
+                  <a:srgbClr val="FFFFFF"/>
+                </a:solidFill>
+              </a14:hiddenFill>
+            </a:ext>
+          </a:extLst>
+        </p:spPr>
+      </p:pic>
+      <p:pic>
+        <p:nvPicPr>
+          <p:cNvPr id="3076" name="Picture 4">
+            <a:extLst>
+              <a:ext uri="{FF2B5EF4-FFF2-40B4-BE49-F238E27FC236}">
+                <a16:creationId xmlns:a16="http://schemas.microsoft.com/office/drawing/2014/main" id="{A048A079-B0DF-B89B-E3E1-B06B643425DD}"/>
+              </a:ext>
+            </a:extLst>
+          </p:cNvPr>
+          <p:cNvPicPr>
+            <a:picLocks noGrp="1" noChangeAspect="1" noChangeArrowheads="1"/>
+          </p:cNvPicPr>
+          <p:nvPr>
+            <p:ph sz="half" idx="2"/>
+          </p:nvPr>
+        </p:nvPicPr>
+        <p:blipFill rotWithShape="1">
+          <a:blip r:embed="rId3">
+            <a:extLst>
+              <a:ext uri="{28A0092B-C50C-407E-A947-70E740481C1C}">
+                <a14:useLocalDpi xmlns:a14="http://schemas.microsoft.com/office/drawing/2010/main" val="0"/>
+              </a:ext>
+            </a:extLst>
+          </a:blip>
+          <a:srcRect l="1" r="-472"/>
+          <a:stretch>
+            <a:fillRect/>
+          </a:stretch>
+        </p:blipFill>
+        <p:spPr bwMode="auto">
+          <a:xfrm>
+            <a:off x="5089885" y="3447291"/>
+            <a:ext cx="7102115" cy="3410712"/>
+          </a:xfrm>
+          <a:prstGeom prst="rect">
+            <a:avLst/>
+          </a:prstGeom>
+          <a:noFill/>
+          <a:extLst>
+            <a:ext uri="{909E8E84-426E-40DD-AFC4-6F175D3DCCD1}">
+              <a14:hiddenFill xmlns:a14="http://schemas.microsoft.com/office/drawing/2010/main">
+                <a:solidFill>
+                  <a:srgbClr val="FFFFFF"/>
+                </a:solidFill>
+              </a14:hiddenFill>
+            </a:ext>
+          </a:extLst>
+        </p:spPr>
+      </p:pic>
+      <p:cxnSp>
+        <p:nvCxnSpPr>
+          <p:cNvPr id="7" name="Straight Connector 6">
+            <a:extLst>
+              <a:ext uri="{FF2B5EF4-FFF2-40B4-BE49-F238E27FC236}">
+                <a16:creationId xmlns:a16="http://schemas.microsoft.com/office/drawing/2014/main" id="{7C27443F-3897-7370-0306-8B7CB6289FF8}"/>
+              </a:ext>
+            </a:extLst>
+          </p:cNvPr>
+          <p:cNvCxnSpPr>
+            <a:cxnSpLocks/>
+          </p:cNvCxnSpPr>
+          <p:nvPr/>
+        </p:nvCxnSpPr>
+        <p:spPr>
+          <a:xfrm flipV="1">
+            <a:off x="5076708" y="0"/>
+            <a:ext cx="0" cy="6858000"/>
+          </a:xfrm>
+          <a:prstGeom prst="line">
+            <a:avLst/>
+          </a:prstGeom>
+          <a:ln w="57150">
+            <a:solidFill>
+              <a:schemeClr val="tx1"/>
+            </a:solidFill>
+          </a:ln>
+        </p:spPr>
+        <p:style>
+          <a:lnRef idx="1">
+            <a:schemeClr val="accent1"/>
+          </a:lnRef>
+          <a:fillRef idx="0">
+            <a:schemeClr val="accent1"/>
+          </a:fillRef>
+          <a:effectRef idx="0">
+            <a:schemeClr val="accent1"/>
+          </a:effectRef>
+          <a:fontRef idx="minor">
+            <a:schemeClr val="tx1"/>
+          </a:fontRef>
+        </p:style>
+      </p:cxnSp>
+      <p:cxnSp>
+        <p:nvCxnSpPr>
+          <p:cNvPr id="8" name="Straight Connector 7">
+            <a:extLst>
+              <a:ext uri="{FF2B5EF4-FFF2-40B4-BE49-F238E27FC236}">
+                <a16:creationId xmlns:a16="http://schemas.microsoft.com/office/drawing/2014/main" id="{9714A9EE-ECB4-954C-1103-DF4E46669A82}"/>
+              </a:ext>
+            </a:extLst>
+          </p:cNvPr>
+          <p:cNvCxnSpPr>
+            <a:cxnSpLocks/>
+          </p:cNvCxnSpPr>
+          <p:nvPr/>
+        </p:nvCxnSpPr>
+        <p:spPr>
+          <a:xfrm flipH="1">
+            <a:off x="5076708" y="3428998"/>
+            <a:ext cx="7115292" cy="18293"/>
+          </a:xfrm>
+          <a:prstGeom prst="line">
+            <a:avLst/>
+          </a:prstGeom>
+          <a:ln w="57150">
+            <a:solidFill>
+              <a:schemeClr val="tx1"/>
+            </a:solidFill>
+          </a:ln>
+        </p:spPr>
+        <p:style>
+          <a:lnRef idx="1">
+            <a:schemeClr val="accent1"/>
+          </a:lnRef>
+          <a:fillRef idx="0">
+            <a:schemeClr val="accent1"/>
+          </a:fillRef>
+          <a:effectRef idx="0">
+            <a:schemeClr val="accent1"/>
+          </a:effectRef>
+          <a:fontRef idx="minor">
+            <a:schemeClr val="tx1"/>
+          </a:fontRef>
+        </p:style>
+      </p:cxnSp>
+    </p:spTree>
+    <p:extLst>
+      <p:ext uri="{BB962C8B-B14F-4D97-AF65-F5344CB8AC3E}">
+        <p14:creationId xmlns:p14="http://schemas.microsoft.com/office/powerpoint/2010/main" val="451837092"/>
+      </p:ext>
+    </p:extLst>
+  </p:cSld>
+  <p:clrMapOvr>
+    <a:masterClrMapping/>
+  </p:clrMapOvr>
+</p:sld>
+</file>
+
+<file path=ppt/slides/slide18.xml><?xml version="1.0" encoding="utf-8"?>
+<p:sld xmlns:a="http://schemas.openxmlformats.org/drawingml/2006/main" xmlns:r="http://schemas.openxmlformats.org/officeDocument/2006/relationships" xmlns:p="http://schemas.openxmlformats.org/presentationml/2006/main">
+  <p:cSld>
+    <p:bg>
+      <p:bgPr>
+        <a:solidFill>
+          <a:schemeClr val="accent2"/>
+        </a:solidFill>
+        <a:effectLst/>
+      </p:bgPr>
+    </p:bg>
+    <p:spTree>
+      <p:nvGrpSpPr>
+        <p:cNvPr id="1" name=""/>
+        <p:cNvGrpSpPr/>
+        <p:nvPr/>
+      </p:nvGrpSpPr>
+      <p:grpSpPr>
+        <a:xfrm>
+          <a:off x="0" y="0"/>
+          <a:ext cx="0" cy="0"/>
+          <a:chOff x="0" y="0"/>
+          <a:chExt cx="0" cy="0"/>
+        </a:xfrm>
+      </p:grpSpPr>
+      <p:sp>
+        <p:nvSpPr>
+          <p:cNvPr id="2" name="Title 1">
+            <a:extLst>
+              <a:ext uri="{FF2B5EF4-FFF2-40B4-BE49-F238E27FC236}">
+                <a16:creationId xmlns:a16="http://schemas.microsoft.com/office/drawing/2014/main" id="{9CADE910-19F9-B467-1F97-530862803826}"/>
+              </a:ext>
+            </a:extLst>
+          </p:cNvPr>
+          <p:cNvSpPr>
+            <a:spLocks noGrp="1"/>
+          </p:cNvSpPr>
+          <p:nvPr>
+            <p:ph type="title"/>
+          </p:nvPr>
+        </p:nvSpPr>
+        <p:spPr>
+          <a:xfrm>
+            <a:off x="8502977" y="2610652"/>
+            <a:ext cx="3346515" cy="1636696"/>
+          </a:xfrm>
+        </p:spPr>
+        <p:txBody>
+          <a:bodyPr vert="horz" lIns="182880" tIns="182880" rIns="182880" bIns="182880" rtlCol="0" anchor="ctr">
+            <a:normAutofit/>
+          </a:bodyPr>
+          <a:lstStyle/>
+          <a:p>
+            <a:r>
+              <a:rPr lang="en-US" sz="2000" dirty="0"/>
+              <a:t>Scatter plot of Osiris and ace-fts coincident columns</a:t>
+            </a:r>
+          </a:p>
+        </p:txBody>
+      </p:sp>
+      <p:sp>
+        <p:nvSpPr>
+          <p:cNvPr id="4103" name="Rectangle 4102">
+            <a:extLst>
+              <a:ext uri="{FF2B5EF4-FFF2-40B4-BE49-F238E27FC236}">
+                <a16:creationId xmlns:a16="http://schemas.microsoft.com/office/drawing/2014/main" id="{B8AFBB67-2575-4F5A-96CF-CD2EB02A1EF0}"/>
+              </a:ext>
+              <a:ext uri="{C183D7F6-B498-43B3-948B-1728B52AA6E4}">
+                <adec:decorative xmlns:adec="http://schemas.microsoft.com/office/drawing/2017/decorative" val="1"/>
+              </a:ext>
+            </a:extLst>
+          </p:cNvPr>
+          <p:cNvSpPr>
+            <a:spLocks noGrp="1" noRot="1" noChangeAspect="1" noMove="1" noResize="1" noEditPoints="1" noAdjustHandles="1" noChangeArrowheads="1" noChangeShapeType="1" noTextEdit="1"/>
+          </p:cNvSpPr>
+          <p:nvPr>
+            <p:extLst>
+              <p:ext uri="{386F3935-93C4-4BCD-93E2-E3B085C9AB24}">
+                <p16:designElem xmlns:p16="http://schemas.microsoft.com/office/powerpoint/2015/main" val="1"/>
+              </p:ext>
+            </p:extLst>
+          </p:nvPr>
+        </p:nvSpPr>
+        <p:spPr>
+          <a:xfrm>
+            <a:off x="0" y="0"/>
+            <a:ext cx="8135425" cy="6858000"/>
+          </a:xfrm>
+          <a:prstGeom prst="rect">
+            <a:avLst/>
+          </a:prstGeom>
+          <a:solidFill>
+            <a:schemeClr val="bg1"/>
+          </a:solidFill>
+          <a:ln>
+            <a:noFill/>
+          </a:ln>
+        </p:spPr>
+        <p:style>
+          <a:lnRef idx="2">
+            <a:schemeClr val="accent1">
+              <a:shade val="50000"/>
+            </a:schemeClr>
+          </a:lnRef>
+          <a:fillRef idx="1">
+            <a:schemeClr val="accent1"/>
+          </a:fillRef>
+          <a:effectRef idx="0">
+            <a:schemeClr val="accent1"/>
+          </a:effectRef>
+          <a:fontRef idx="minor">
+            <a:schemeClr val="lt1"/>
+          </a:fontRef>
+        </p:style>
+        <p:txBody>
+          <a:bodyPr rtlCol="0" anchor="ctr"/>
+          <a:lstStyle/>
+          <a:p>
+            <a:pPr algn="ctr"/>
+            <a:endParaRPr lang="en-US"/>
+          </a:p>
+        </p:txBody>
+      </p:sp>
+      <p:pic>
+        <p:nvPicPr>
+          <p:cNvPr id="4098" name="Picture 2">
+            <a:extLst>
+              <a:ext uri="{FF2B5EF4-FFF2-40B4-BE49-F238E27FC236}">
+                <a16:creationId xmlns:a16="http://schemas.microsoft.com/office/drawing/2014/main" id="{3899A185-F3AB-88F3-44C9-8102094587D0}"/>
+              </a:ext>
+            </a:extLst>
+          </p:cNvPr>
+          <p:cNvPicPr>
+            <a:picLocks noGrp="1" noChangeAspect="1" noChangeArrowheads="1"/>
+          </p:cNvPicPr>
+          <p:nvPr>
+            <p:ph idx="1"/>
+          </p:nvPr>
+        </p:nvPicPr>
+        <p:blipFill>
+          <a:blip r:embed="rId2">
+            <a:extLst>
+              <a:ext uri="{28A0092B-C50C-407E-A947-70E740481C1C}">
+                <a14:useLocalDpi xmlns:a14="http://schemas.microsoft.com/office/drawing/2010/main" val="0"/>
+              </a:ext>
+            </a:extLst>
+          </a:blip>
+          <a:stretch>
+            <a:fillRect/>
+          </a:stretch>
+        </p:blipFill>
+        <p:spPr bwMode="auto">
+          <a:xfrm>
+            <a:off x="159354" y="1132840"/>
+            <a:ext cx="7816715" cy="4592320"/>
+          </a:xfrm>
+          <a:prstGeom prst="rect">
+            <a:avLst/>
+          </a:prstGeom>
+          <a:noFill/>
+          <a:extLst>
+            <a:ext uri="{909E8E84-426E-40DD-AFC4-6F175D3DCCD1}">
+              <a14:hiddenFill xmlns:a14="http://schemas.microsoft.com/office/drawing/2010/main">
+                <a:solidFill>
+                  <a:srgbClr val="FFFFFF"/>
+                </a:solidFill>
+              </a14:hiddenFill>
+            </a:ext>
+          </a:extLst>
+        </p:spPr>
+      </p:pic>
+      <p:sp>
+        <p:nvSpPr>
+          <p:cNvPr id="4" name="Content Placeholder 2">
+            <a:extLst>
+              <a:ext uri="{FF2B5EF4-FFF2-40B4-BE49-F238E27FC236}">
+                <a16:creationId xmlns:a16="http://schemas.microsoft.com/office/drawing/2014/main" id="{5B84E5B5-75C3-2E5B-9ED3-8566607119D6}"/>
+              </a:ext>
+            </a:extLst>
+          </p:cNvPr>
+          <p:cNvSpPr txBox="1">
+            <a:spLocks/>
+          </p:cNvSpPr>
+          <p:nvPr/>
+        </p:nvSpPr>
+        <p:spPr>
+          <a:xfrm>
+            <a:off x="5165030" y="4170822"/>
+            <a:ext cx="1093530" cy="360538"/>
+          </a:xfrm>
+          <a:prstGeom prst="rect">
+            <a:avLst/>
+          </a:prstGeom>
+          <a:ln>
+            <a:solidFill>
+              <a:schemeClr val="tx1"/>
+            </a:solidFill>
+          </a:ln>
+        </p:spPr>
+        <p:txBody>
+          <a:bodyPr vert="horz" lIns="91440" tIns="45720" rIns="91440" bIns="45720" rtlCol="0">
+            <a:noAutofit/>
+          </a:bodyPr>
+          <a:lstStyle>
+            <a:lvl1pPr marL="228600" indent="-228600" algn="l" defTabSz="914400" rtl="0" eaLnBrk="1" latinLnBrk="0" hangingPunct="1">
+              <a:lnSpc>
+                <a:spcPct val="100000"/>
+              </a:lnSpc>
+              <a:spcBef>
+                <a:spcPts val="1000"/>
+              </a:spcBef>
+              <a:buClr>
+                <a:schemeClr val="accent2"/>
+              </a:buClr>
+              <a:buFont typeface="Arial" panose="020B0604020202020204" pitchFamily="34" charset="0"/>
+              <a:buChar char="•"/>
+              <a:defRPr sz="1800" kern="1200">
+                <a:solidFill>
+                  <a:schemeClr val="tx1">
+                    <a:lumMod val="85000"/>
+                    <a:lumOff val="15000"/>
+                  </a:schemeClr>
+                </a:solidFill>
+                <a:latin typeface="+mn-lt"/>
+                <a:ea typeface="+mn-ea"/>
+                <a:cs typeface="+mn-cs"/>
+              </a:defRPr>
+            </a:lvl1pPr>
+            <a:lvl2pPr marL="457200" indent="-228600" algn="l" defTabSz="914400" rtl="0" eaLnBrk="1" latinLnBrk="0" hangingPunct="1">
+              <a:lnSpc>
+                <a:spcPct val="100000"/>
+              </a:lnSpc>
+              <a:spcBef>
+                <a:spcPts val="1000"/>
+              </a:spcBef>
+              <a:buClr>
+                <a:schemeClr val="accent2"/>
+              </a:buClr>
+              <a:buFont typeface="Arial" panose="020B0604020202020204" pitchFamily="34" charset="0"/>
+              <a:buChar char="•"/>
+              <a:defRPr sz="1600" kern="1200">
+                <a:solidFill>
+                  <a:schemeClr val="tx1">
+                    <a:lumMod val="85000"/>
+                    <a:lumOff val="15000"/>
+                  </a:schemeClr>
+                </a:solidFill>
+                <a:latin typeface="+mn-lt"/>
+                <a:ea typeface="+mn-ea"/>
+                <a:cs typeface="+mn-cs"/>
+              </a:defRPr>
+            </a:lvl2pPr>
+            <a:lvl3pPr marL="685800" indent="-228600" algn="l" defTabSz="914400" rtl="0" eaLnBrk="1" latinLnBrk="0" hangingPunct="1">
+              <a:lnSpc>
+                <a:spcPct val="100000"/>
+              </a:lnSpc>
+              <a:spcBef>
+                <a:spcPts val="1000"/>
+              </a:spcBef>
+              <a:buClr>
+                <a:schemeClr val="accent2"/>
+              </a:buClr>
+              <a:buFont typeface="Arial" panose="020B0604020202020204" pitchFamily="34" charset="0"/>
+              <a:buChar char="•"/>
+              <a:defRPr sz="1600" kern="1200">
+                <a:solidFill>
+                  <a:schemeClr val="tx1">
+                    <a:lumMod val="85000"/>
+                    <a:lumOff val="15000"/>
+                  </a:schemeClr>
+                </a:solidFill>
+                <a:latin typeface="+mn-lt"/>
+                <a:ea typeface="+mn-ea"/>
+                <a:cs typeface="+mn-cs"/>
+              </a:defRPr>
+            </a:lvl3pPr>
+            <a:lvl4pPr marL="914400" indent="-228600" algn="l" defTabSz="914400" rtl="0" eaLnBrk="1" latinLnBrk="0" hangingPunct="1">
+              <a:lnSpc>
+                <a:spcPct val="100000"/>
+              </a:lnSpc>
+              <a:spcBef>
+                <a:spcPts val="1000"/>
+              </a:spcBef>
+              <a:buClr>
+                <a:schemeClr val="accent2"/>
+              </a:buClr>
+              <a:buFont typeface="Arial" panose="020B0604020202020204" pitchFamily="34" charset="0"/>
+              <a:buChar char="•"/>
+              <a:defRPr sz="1600" kern="1200">
+                <a:solidFill>
+                  <a:schemeClr val="tx1">
+                    <a:lumMod val="85000"/>
+                    <a:lumOff val="15000"/>
+                  </a:schemeClr>
+                </a:solidFill>
+                <a:latin typeface="+mn-lt"/>
+                <a:ea typeface="+mn-ea"/>
+                <a:cs typeface="+mn-cs"/>
+              </a:defRPr>
+            </a:lvl4pPr>
+            <a:lvl5pPr marL="1143000" indent="-228600" algn="l" defTabSz="914400" rtl="0" eaLnBrk="1" latinLnBrk="0" hangingPunct="1">
+              <a:lnSpc>
+                <a:spcPct val="100000"/>
+              </a:lnSpc>
+              <a:spcBef>
+                <a:spcPts val="1000"/>
+              </a:spcBef>
+              <a:buClr>
+                <a:schemeClr val="accent2"/>
+              </a:buClr>
+              <a:buFont typeface="Arial" panose="020B0604020202020204" pitchFamily="34" charset="0"/>
+              <a:buChar char="•"/>
+              <a:defRPr sz="1600" kern="1200">
+                <a:solidFill>
+                  <a:schemeClr val="tx1">
+                    <a:lumMod val="85000"/>
+                    <a:lumOff val="15000"/>
+                  </a:schemeClr>
+                </a:solidFill>
+                <a:latin typeface="+mn-lt"/>
+                <a:ea typeface="+mn-ea"/>
+                <a:cs typeface="+mn-cs"/>
+              </a:defRPr>
+            </a:lvl5pPr>
+            <a:lvl6pPr marL="1312863" indent="-228600" algn="l" defTabSz="914400" rtl="0" eaLnBrk="1" latinLnBrk="0" hangingPunct="1">
+              <a:lnSpc>
+                <a:spcPct val="100000"/>
+              </a:lnSpc>
+              <a:spcBef>
+                <a:spcPts val="1000"/>
+              </a:spcBef>
+              <a:buClr>
+                <a:schemeClr val="accent2"/>
+              </a:buClr>
+              <a:buFont typeface="Arial" panose="020B0604020202020204" pitchFamily="34" charset="0"/>
+              <a:buChar char="•"/>
+              <a:defRPr sz="1600" kern="1200">
+                <a:solidFill>
+                  <a:schemeClr val="tx1"/>
+                </a:solidFill>
+                <a:latin typeface="+mn-lt"/>
+                <a:ea typeface="+mn-ea"/>
+                <a:cs typeface="+mn-cs"/>
+              </a:defRPr>
+            </a:lvl6pPr>
+            <a:lvl7pPr marL="1484313" indent="-228600" algn="l" defTabSz="914400" rtl="0" eaLnBrk="1" latinLnBrk="0" hangingPunct="1">
+              <a:lnSpc>
+                <a:spcPct val="100000"/>
+              </a:lnSpc>
+              <a:spcBef>
+                <a:spcPts val="1000"/>
+              </a:spcBef>
+              <a:buClr>
+                <a:schemeClr val="accent2"/>
+              </a:buClr>
+              <a:buFont typeface="Arial" panose="020B0604020202020204" pitchFamily="34" charset="0"/>
+              <a:buChar char="•"/>
+              <a:defRPr sz="1600" kern="1200">
+                <a:solidFill>
+                  <a:schemeClr val="tx1"/>
+                </a:solidFill>
+                <a:latin typeface="+mn-lt"/>
+                <a:ea typeface="+mn-ea"/>
+                <a:cs typeface="+mn-cs"/>
+              </a:defRPr>
+            </a:lvl7pPr>
+            <a:lvl8pPr marL="1657350" indent="-228600" algn="l" defTabSz="914400" rtl="0" eaLnBrk="1" latinLnBrk="0" hangingPunct="1">
+              <a:lnSpc>
+                <a:spcPct val="100000"/>
+              </a:lnSpc>
+              <a:spcBef>
+                <a:spcPts val="1000"/>
+              </a:spcBef>
+              <a:buClr>
+                <a:schemeClr val="accent2"/>
+              </a:buClr>
+              <a:buFont typeface="Arial" panose="020B0604020202020204" pitchFamily="34" charset="0"/>
+              <a:buChar char="•"/>
+              <a:defRPr sz="1600" kern="1200" baseline="0">
+                <a:solidFill>
+                  <a:schemeClr val="tx1"/>
+                </a:solidFill>
+                <a:latin typeface="+mn-lt"/>
+                <a:ea typeface="+mn-ea"/>
+                <a:cs typeface="+mn-cs"/>
+              </a:defRPr>
+            </a:lvl8pPr>
+            <a:lvl9pPr marL="1882775" indent="-228600" algn="l" defTabSz="914400" rtl="0" eaLnBrk="1" latinLnBrk="0" hangingPunct="1">
+              <a:lnSpc>
+                <a:spcPct val="100000"/>
+              </a:lnSpc>
+              <a:spcBef>
+                <a:spcPts val="1000"/>
+              </a:spcBef>
+              <a:buClr>
+                <a:schemeClr val="accent2"/>
+              </a:buClr>
+              <a:buFont typeface="Arial" panose="020B0604020202020204" pitchFamily="34" charset="0"/>
+              <a:buChar char="•"/>
+              <a:defRPr sz="1600" kern="1200" baseline="0">
+                <a:solidFill>
+                  <a:schemeClr val="tx1"/>
+                </a:solidFill>
+                <a:latin typeface="+mn-lt"/>
+                <a:ea typeface="+mn-ea"/>
+                <a:cs typeface="+mn-cs"/>
+              </a:defRPr>
+            </a:lvl9pPr>
+          </a:lstStyle>
+          <a:p>
+            <a:pPr marL="0" indent="0">
+              <a:buClr>
+                <a:schemeClr val="tx1"/>
+              </a:buClr>
+              <a:buNone/>
+            </a:pPr>
+            <a:r>
+              <a:rPr lang="en-US" sz="2000" dirty="0">
+                <a:solidFill>
+                  <a:schemeClr val="tx1"/>
+                </a:solidFill>
+              </a:rPr>
+              <a:t>r </a:t>
+            </a:r>
+            <a:r>
+              <a:rPr lang="en-CA" sz="2000" dirty="0">
+                <a:solidFill>
+                  <a:schemeClr val="tx1"/>
+                </a:solidFill>
+              </a:rPr>
+              <a:t>= 0.78</a:t>
+            </a:r>
+          </a:p>
+        </p:txBody>
+      </p:sp>
+    </p:spTree>
+    <p:extLst>
+      <p:ext uri="{BB962C8B-B14F-4D97-AF65-F5344CB8AC3E}">
+        <p14:creationId xmlns:p14="http://schemas.microsoft.com/office/powerpoint/2010/main" val="722023237"/>
+      </p:ext>
+    </p:extLst>
+  </p:cSld>
+  <p:clrMapOvr>
+    <a:masterClrMapping/>
+  </p:clrMapOvr>
+</p:sld>
+</file>
+
+<file path=ppt/slides/slide19.xml><?xml version="1.0" encoding="utf-8"?>
 <p:sld xmlns:a="http://schemas.openxmlformats.org/drawingml/2006/main" xmlns:r="http://schemas.openxmlformats.org/officeDocument/2006/relationships" xmlns:p="http://schemas.openxmlformats.org/presentationml/2006/main">
   <p:cSld>
     <p:spTree>
@@ -6361,7 +8796,7 @@
           <a:bodyPr/>
           <a:lstStyle/>
           <a:p>
-            <a:endParaRPr lang="en-CA"/>
+            <a:endParaRPr lang="en-CA" dirty="0"/>
           </a:p>
         </p:txBody>
       </p:sp>
@@ -6490,6 +8925,86 @@
 </p:sld>
 </file>
 
+<file path=ppt/slides/slide20.xml><?xml version="1.0" encoding="utf-8"?>
+<p:sld xmlns:a="http://schemas.openxmlformats.org/drawingml/2006/main" xmlns:r="http://schemas.openxmlformats.org/officeDocument/2006/relationships" xmlns:p="http://schemas.openxmlformats.org/presentationml/2006/main">
+  <p:cSld>
+    <p:spTree>
+      <p:nvGrpSpPr>
+        <p:cNvPr id="1" name=""/>
+        <p:cNvGrpSpPr/>
+        <p:nvPr/>
+      </p:nvGrpSpPr>
+      <p:grpSpPr>
+        <a:xfrm>
+          <a:off x="0" y="0"/>
+          <a:ext cx="0" cy="0"/>
+          <a:chOff x="0" y="0"/>
+          <a:chExt cx="0" cy="0"/>
+        </a:xfrm>
+      </p:grpSpPr>
+      <p:sp>
+        <p:nvSpPr>
+          <p:cNvPr id="2" name="Title 1">
+            <a:extLst>
+              <a:ext uri="{FF2B5EF4-FFF2-40B4-BE49-F238E27FC236}">
+                <a16:creationId xmlns:a16="http://schemas.microsoft.com/office/drawing/2014/main" id="{6E243608-8CEA-4E04-BE21-A9C272905225}"/>
+              </a:ext>
+            </a:extLst>
+          </p:cNvPr>
+          <p:cNvSpPr>
+            <a:spLocks noGrp="1"/>
+          </p:cNvSpPr>
+          <p:nvPr>
+            <p:ph type="title"/>
+          </p:nvPr>
+        </p:nvSpPr>
+        <p:spPr/>
+        <p:txBody>
+          <a:bodyPr/>
+          <a:lstStyle/>
+          <a:p>
+            <a:endParaRPr lang="en-CA"/>
+          </a:p>
+        </p:txBody>
+      </p:sp>
+      <p:sp>
+        <p:nvSpPr>
+          <p:cNvPr id="3" name="Content Placeholder 2">
+            <a:extLst>
+              <a:ext uri="{FF2B5EF4-FFF2-40B4-BE49-F238E27FC236}">
+                <a16:creationId xmlns:a16="http://schemas.microsoft.com/office/drawing/2014/main" id="{B5651CCE-FCCA-6E32-88A4-7E9693EDBF0C}"/>
+              </a:ext>
+            </a:extLst>
+          </p:cNvPr>
+          <p:cNvSpPr>
+            <a:spLocks noGrp="1"/>
+          </p:cNvSpPr>
+          <p:nvPr>
+            <p:ph idx="1"/>
+          </p:nvPr>
+        </p:nvSpPr>
+        <p:spPr/>
+        <p:txBody>
+          <a:bodyPr/>
+          <a:lstStyle/>
+          <a:p>
+            <a:endParaRPr lang="en-CA"/>
+          </a:p>
+        </p:txBody>
+      </p:sp>
+    </p:spTree>
+    <p:extLst>
+      <p:ext uri="{BB962C8B-B14F-4D97-AF65-F5344CB8AC3E}">
+        <p14:creationId xmlns:p14="http://schemas.microsoft.com/office/powerpoint/2010/main" val="1515333574"/>
+      </p:ext>
+    </p:extLst>
+  </p:cSld>
+  <p:clrMapOvr>
+    <a:masterClrMapping/>
+  </p:clrMapOvr>
+</p:sld>
+</file>
+
 <file path=ppt/slides/slide3.xml><?xml version="1.0" encoding="utf-8"?>
 <p:sld xmlns:a="http://schemas.openxmlformats.org/drawingml/2006/main" xmlns:r="http://schemas.openxmlformats.org/officeDocument/2006/relationships" xmlns:p="http://schemas.openxmlformats.org/presentationml/2006/main">
   <p:cSld>
@@ -6584,13 +9099,8 @@
           <a:p>
             <a:r>
               <a:rPr lang="en-CA" dirty="0"/>
-              <a:t>Approach: Compare measurements of the instruments against </a:t>
-            </a:r>
-            <a:r>
-              <a:rPr lang="en-CA" dirty="0" err="1"/>
-              <a:t>eachother</a:t>
-            </a:r>
-            <a:endParaRPr lang="en-CA" dirty="0"/>
+              <a:t>Approach: Compare measurements of the instruments against each other</a:t>
+            </a:r>
           </a:p>
           <a:p>
             <a:r>
@@ -7405,7 +9915,13 @@
           <a:p>
             <a:r>
               <a:rPr lang="en-CA" dirty="0"/>
-              <a:t>First Tasks: Read research papers and learn atmospheric chemistry</a:t>
+              <a:t>First Task: Read various research papers and familiarize myself with atmospheric chemistry</a:t>
+            </a:r>
+          </a:p>
+          <a:p>
+            <a:r>
+              <a:rPr lang="en-CA" dirty="0"/>
+              <a:t>Second Task:</a:t>
             </a:r>
           </a:p>
           <a:p>
@@ -8006,6 +10522,9 @@
   <wetp:taskpane dockstate="right" visibility="0" width="438" row="0">
     <wetp:webextensionref xmlns:r="http://schemas.openxmlformats.org/officeDocument/2006/relationships" r:id="rId1"/>
   </wetp:taskpane>
+  <wetp:taskpane dockstate="right" visibility="0" width="438" row="1">
+    <wetp:webextensionref xmlns:r="http://schemas.openxmlformats.org/officeDocument/2006/relationships" r:id="rId2"/>
+  </wetp:taskpane>
 </wetp:taskpanes>
 </file>
 
@@ -8028,6 +10547,18 @@
 </we:webextension>
 </file>
 
+<file path=ppt/webextensions/webextension2.xml><?xml version="1.0" encoding="utf-8"?>
+<we:webextension xmlns:we="http://schemas.microsoft.com/office/webextensions/webextension/2010/11" id="{E4D495C4-4BFC-4E24-948D-7B7E3E9DF14C}">
+  <we:reference id="4b785c87-866c-4bad-85d8-5d1ae467ac9a" version="3.18.2.0" store="EXCatalog" storeType="EXCatalog"/>
+  <we:alternateReferences>
+    <we:reference id="WA104381909" version="3.18.2.0" store="en-CA" storeType="OMEX"/>
+  </we:alternateReferences>
+  <we:properties/>
+  <we:bindings/>
+  <we:snapshot xmlns:r="http://schemas.openxmlformats.org/officeDocument/2006/relationships"/>
+</we:webextension>
+</file>
+
 <file path=docMetadata/LabelInfo.xml><?xml version="1.0" encoding="utf-8"?>
 <clbl:labelList xmlns:clbl="http://schemas.microsoft.com/office/2020/mipLabelMetadata">
   <clbl:label id="{78aac226-2f03-4b4d-9037-b46d56c55210}" enabled="0" method="" siteId="{78aac226-2f03-4b4d-9037-b46d56c55210}" removed="1"/>

</xml_diff>